<commit_message>
update Rscript and the LUE model results
</commit_message>
<xml_diff>
--- a/manuscript/figures/method_figures/Embed_stress_function.pptx
+++ b/manuscript/figures/method_figures/Embed_stress_function.pptx
@@ -6,6 +6,7 @@
   </p:sldMasterIdLst>
   <p:sldIdLst>
     <p:sldId id="256" r:id="rId2"/>
+    <p:sldId id="257" r:id="rId3"/>
   </p:sldIdLst>
   <p:sldSz cx="12192000" cy="8999538"/>
   <p:notesSz cx="6858000" cy="9144000"/>
@@ -104,6 +105,11 @@
       </a:defRPr>
     </a:lvl9pPr>
   </p:defaultTextStyle>
+  <p:extLst>
+    <p:ext uri="{EFAFB233-063F-42B5-8137-9DF3F51BA10A}">
+      <p15:sldGuideLst xmlns:p15="http://schemas.microsoft.com/office/powerpoint/2012/main"/>
+    </p:ext>
+  </p:extLst>
 </p:presentation>
 </file>
 
@@ -238,7 +244,7 @@
           <a:p>
             <a:fld id="{A4ED8F4A-81C1-4420-9091-99CAD06994B2}" type="datetimeFigureOut">
               <a:rPr lang="de-CH" smtClean="0"/>
-              <a:t>17.03.2022</a:t>
+              <a:t>13.04.2022</a:t>
             </a:fld>
             <a:endParaRPr lang="de-CH"/>
           </a:p>
@@ -408,7 +414,7 @@
           <a:p>
             <a:fld id="{A4ED8F4A-81C1-4420-9091-99CAD06994B2}" type="datetimeFigureOut">
               <a:rPr lang="de-CH" smtClean="0"/>
-              <a:t>17.03.2022</a:t>
+              <a:t>13.04.2022</a:t>
             </a:fld>
             <a:endParaRPr lang="de-CH"/>
           </a:p>
@@ -588,7 +594,7 @@
           <a:p>
             <a:fld id="{A4ED8F4A-81C1-4420-9091-99CAD06994B2}" type="datetimeFigureOut">
               <a:rPr lang="de-CH" smtClean="0"/>
-              <a:t>17.03.2022</a:t>
+              <a:t>13.04.2022</a:t>
             </a:fld>
             <a:endParaRPr lang="de-CH"/>
           </a:p>
@@ -758,7 +764,7 @@
           <a:p>
             <a:fld id="{A4ED8F4A-81C1-4420-9091-99CAD06994B2}" type="datetimeFigureOut">
               <a:rPr lang="de-CH" smtClean="0"/>
-              <a:t>17.03.2022</a:t>
+              <a:t>13.04.2022</a:t>
             </a:fld>
             <a:endParaRPr lang="de-CH"/>
           </a:p>
@@ -1002,7 +1008,7 @@
           <a:p>
             <a:fld id="{A4ED8F4A-81C1-4420-9091-99CAD06994B2}" type="datetimeFigureOut">
               <a:rPr lang="de-CH" smtClean="0"/>
-              <a:t>17.03.2022</a:t>
+              <a:t>13.04.2022</a:t>
             </a:fld>
             <a:endParaRPr lang="de-CH"/>
           </a:p>
@@ -1234,7 +1240,7 @@
           <a:p>
             <a:fld id="{A4ED8F4A-81C1-4420-9091-99CAD06994B2}" type="datetimeFigureOut">
               <a:rPr lang="de-CH" smtClean="0"/>
-              <a:t>17.03.2022</a:t>
+              <a:t>13.04.2022</a:t>
             </a:fld>
             <a:endParaRPr lang="de-CH"/>
           </a:p>
@@ -1601,7 +1607,7 @@
           <a:p>
             <a:fld id="{A4ED8F4A-81C1-4420-9091-99CAD06994B2}" type="datetimeFigureOut">
               <a:rPr lang="de-CH" smtClean="0"/>
-              <a:t>17.03.2022</a:t>
+              <a:t>13.04.2022</a:t>
             </a:fld>
             <a:endParaRPr lang="de-CH"/>
           </a:p>
@@ -1719,7 +1725,7 @@
           <a:p>
             <a:fld id="{A4ED8F4A-81C1-4420-9091-99CAD06994B2}" type="datetimeFigureOut">
               <a:rPr lang="de-CH" smtClean="0"/>
-              <a:t>17.03.2022</a:t>
+              <a:t>13.04.2022</a:t>
             </a:fld>
             <a:endParaRPr lang="de-CH"/>
           </a:p>
@@ -1814,7 +1820,7 @@
           <a:p>
             <a:fld id="{A4ED8F4A-81C1-4420-9091-99CAD06994B2}" type="datetimeFigureOut">
               <a:rPr lang="de-CH" smtClean="0"/>
-              <a:t>17.03.2022</a:t>
+              <a:t>13.04.2022</a:t>
             </a:fld>
             <a:endParaRPr lang="de-CH"/>
           </a:p>
@@ -2091,7 +2097,7 @@
           <a:p>
             <a:fld id="{A4ED8F4A-81C1-4420-9091-99CAD06994B2}" type="datetimeFigureOut">
               <a:rPr lang="de-CH" smtClean="0"/>
-              <a:t>17.03.2022</a:t>
+              <a:t>13.04.2022</a:t>
             </a:fld>
             <a:endParaRPr lang="de-CH"/>
           </a:p>
@@ -2348,7 +2354,7 @@
           <a:p>
             <a:fld id="{A4ED8F4A-81C1-4420-9091-99CAD06994B2}" type="datetimeFigureOut">
               <a:rPr lang="de-CH" smtClean="0"/>
-              <a:t>17.03.2022</a:t>
+              <a:t>13.04.2022</a:t>
             </a:fld>
             <a:endParaRPr lang="de-CH"/>
           </a:p>
@@ -2561,7 +2567,7 @@
           <a:p>
             <a:fld id="{A4ED8F4A-81C1-4420-9091-99CAD06994B2}" type="datetimeFigureOut">
               <a:rPr lang="de-CH" smtClean="0"/>
-              <a:t>17.03.2022</a:t>
+              <a:t>13.04.2022</a:t>
             </a:fld>
             <a:endParaRPr lang="de-CH"/>
           </a:p>
@@ -2980,7 +2986,7 @@
         </p:nvGrpSpPr>
         <p:grpSpPr>
           <a:xfrm>
-            <a:off x="1180731" y="1347462"/>
+            <a:off x="1180730" y="1355554"/>
             <a:ext cx="8362765" cy="6511785"/>
             <a:chOff x="1180730" y="276692"/>
             <a:chExt cx="8362765" cy="6511785"/>
@@ -3122,8 +3128,8 @@
             </a:p>
           </p:txBody>
         </p:sp>
-        <mc:AlternateContent xmlns:mc="http://schemas.openxmlformats.org/markup-compatibility/2006">
-          <mc:Choice xmlns:a14="http://schemas.microsoft.com/office/drawing/2010/main" Requires="a14">
+        <mc:AlternateContent xmlns:mc="http://schemas.openxmlformats.org/markup-compatibility/2006" xmlns:a14="http://schemas.microsoft.com/office/drawing/2010/main">
+          <mc:Choice Requires="a14">
             <p:sp>
               <p:nvSpPr>
                 <p:cNvPr id="15" name="TextBox 14">
@@ -3152,6 +3158,7 @@
                 </a:bodyPr>
                 <a:lstStyle/>
                 <a:p>
+                  <a:pPr/>
                   <a14:m>
                     <m:oMathPara xmlns:m="http://schemas.openxmlformats.org/officeDocument/2006/math">
                       <m:oMathParaPr>
@@ -3192,16 +3199,7 @@
                             </a:solidFill>
                             <a:latin typeface="Cambria Math" panose="02040503050406030204" pitchFamily="18" charset="0"/>
                           </a:rPr>
-                          <m:t>𝑇𝑚</m:t>
-                        </m:r>
-                        <m:r>
-                          <a:rPr lang="en-GB" i="1" baseline="-25000">
-                            <a:solidFill>
-                              <a:srgbClr val="339933"/>
-                            </a:solidFill>
-                            <a:latin typeface="Cambria Math" panose="02040503050406030204" pitchFamily="18" charset="0"/>
-                          </a:rPr>
-                          <m:t>𝑖𝑛</m:t>
+                          <m:t>𝑇𝑚𝑖𝑛</m:t>
                         </m:r>
                         <m:r>
                           <a:rPr lang="en-GB" i="1">
@@ -3426,7 +3424,7 @@
               </p:txBody>
             </p:sp>
           </mc:Choice>
-          <mc:Fallback>
+          <mc:Fallback xmlns="">
             <p:sp>
               <p:nvSpPr>
                 <p:cNvPr id="15" name="TextBox 14">
@@ -3471,8 +3469,8 @@
             </p:sp>
           </mc:Fallback>
         </mc:AlternateContent>
-        <mc:AlternateContent xmlns:mc="http://schemas.openxmlformats.org/markup-compatibility/2006">
-          <mc:Choice xmlns:a14="http://schemas.microsoft.com/office/drawing/2010/main" Requires="a14">
+        <mc:AlternateContent xmlns:mc="http://schemas.openxmlformats.org/markup-compatibility/2006" xmlns:a14="http://schemas.microsoft.com/office/drawing/2010/main">
+          <mc:Choice Requires="a14">
             <p:sp>
               <p:nvSpPr>
                 <p:cNvPr id="17" name="TextBox 16">
@@ -3501,6 +3499,7 @@
                 </a:bodyPr>
                 <a:lstStyle/>
                 <a:p>
+                  <a:pPr/>
                   <a14:m>
                     <m:oMathPara xmlns:m="http://schemas.openxmlformats.org/officeDocument/2006/math">
                       <m:oMathParaPr>
@@ -3541,16 +3540,7 @@
                             </a:solidFill>
                             <a:latin typeface="Cambria Math" panose="02040503050406030204" pitchFamily="18" charset="0"/>
                           </a:rPr>
-                          <m:t>𝑇𝑚</m:t>
-                        </m:r>
-                        <m:r>
-                          <a:rPr lang="en-GB" i="1" baseline="-25000">
-                            <a:solidFill>
-                              <a:srgbClr val="FF0000"/>
-                            </a:solidFill>
-                            <a:latin typeface="Cambria Math" panose="02040503050406030204" pitchFamily="18" charset="0"/>
-                          </a:rPr>
-                          <m:t>𝑖𝑛</m:t>
+                          <m:t>𝑇𝑚𝑖𝑛</m:t>
                         </m:r>
                         <m:r>
                           <a:rPr lang="en-GB" i="1">
@@ -3775,7 +3765,7 @@
               </p:txBody>
             </p:sp>
           </mc:Choice>
-          <mc:Fallback>
+          <mc:Fallback xmlns="">
             <p:sp>
               <p:nvSpPr>
                 <p:cNvPr id="17" name="TextBox 16">
@@ -3821,12 +3811,1790 @@
           </mc:Fallback>
         </mc:AlternateContent>
       </p:grpSp>
+      <p:grpSp>
+        <p:nvGrpSpPr>
+          <p:cNvPr id="14" name="Group 13">
+            <a:extLst>
+              <a:ext uri="{FF2B5EF4-FFF2-40B4-BE49-F238E27FC236}">
+                <a16:creationId xmlns:a16="http://schemas.microsoft.com/office/drawing/2014/main" id="{C7FF852E-62F9-4DC2-8633-CE6D7EF0DDC1}"/>
+              </a:ext>
+            </a:extLst>
+          </p:cNvPr>
+          <p:cNvGrpSpPr/>
+          <p:nvPr/>
+        </p:nvGrpSpPr>
+        <p:grpSpPr>
+          <a:xfrm>
+            <a:off x="2627453" y="6095302"/>
+            <a:ext cx="2672519" cy="941262"/>
+            <a:chOff x="2627453" y="6095302"/>
+            <a:chExt cx="2672519" cy="941262"/>
+          </a:xfrm>
+        </p:grpSpPr>
+        <p:cxnSp>
+          <p:nvCxnSpPr>
+            <p:cNvPr id="21" name="Straight Connector 20">
+              <a:extLst>
+                <a:ext uri="{FF2B5EF4-FFF2-40B4-BE49-F238E27FC236}">
+                  <a16:creationId xmlns:a16="http://schemas.microsoft.com/office/drawing/2014/main" id="{CEDAD0B6-770E-4F87-933E-2C46FBA591FF}"/>
+                </a:ext>
+              </a:extLst>
+            </p:cNvPr>
+            <p:cNvCxnSpPr>
+              <a:cxnSpLocks/>
+            </p:cNvCxnSpPr>
+            <p:nvPr/>
+          </p:nvCxnSpPr>
+          <p:spPr>
+            <a:xfrm>
+              <a:off x="5290326" y="6220141"/>
+              <a:ext cx="0" cy="319274"/>
+            </a:xfrm>
+            <a:prstGeom prst="line">
+              <a:avLst/>
+            </a:prstGeom>
+            <a:ln w="19050">
+              <a:solidFill>
+                <a:schemeClr val="tx1"/>
+              </a:solidFill>
+            </a:ln>
+          </p:spPr>
+          <p:style>
+            <a:lnRef idx="1">
+              <a:schemeClr val="accent1"/>
+            </a:lnRef>
+            <a:fillRef idx="0">
+              <a:schemeClr val="accent1"/>
+            </a:fillRef>
+            <a:effectRef idx="0">
+              <a:schemeClr val="accent1"/>
+            </a:effectRef>
+            <a:fontRef idx="minor">
+              <a:schemeClr val="tx1"/>
+            </a:fontRef>
+          </p:style>
+        </p:cxnSp>
+        <p:grpSp>
+          <p:nvGrpSpPr>
+            <p:cNvPr id="12" name="Group 11">
+              <a:extLst>
+                <a:ext uri="{FF2B5EF4-FFF2-40B4-BE49-F238E27FC236}">
+                  <a16:creationId xmlns:a16="http://schemas.microsoft.com/office/drawing/2014/main" id="{673C96B1-4C57-4CC3-8DB5-B034FE04DF73}"/>
+                </a:ext>
+              </a:extLst>
+            </p:cNvPr>
+            <p:cNvGrpSpPr/>
+            <p:nvPr/>
+          </p:nvGrpSpPr>
+          <p:grpSpPr>
+            <a:xfrm>
+              <a:off x="2627453" y="6095302"/>
+              <a:ext cx="2672519" cy="941262"/>
+              <a:chOff x="2627453" y="6095302"/>
+              <a:chExt cx="2672519" cy="941262"/>
+            </a:xfrm>
+          </p:grpSpPr>
+          <p:cxnSp>
+            <p:nvCxnSpPr>
+              <p:cNvPr id="20" name="Straight Connector 19">
+                <a:extLst>
+                  <a:ext uri="{FF2B5EF4-FFF2-40B4-BE49-F238E27FC236}">
+                    <a16:creationId xmlns:a16="http://schemas.microsoft.com/office/drawing/2014/main" id="{5217F54C-EA0B-47EC-8D8C-626BF8B114EC}"/>
+                  </a:ext>
+                </a:extLst>
+              </p:cNvPr>
+              <p:cNvCxnSpPr>
+                <a:cxnSpLocks/>
+              </p:cNvCxnSpPr>
+              <p:nvPr/>
+            </p:nvCxnSpPr>
+            <p:spPr>
+              <a:xfrm>
+                <a:off x="2627453" y="6220141"/>
+                <a:ext cx="0" cy="816423"/>
+              </a:xfrm>
+              <a:prstGeom prst="line">
+                <a:avLst/>
+              </a:prstGeom>
+              <a:ln w="19050">
+                <a:solidFill>
+                  <a:schemeClr val="tx1"/>
+                </a:solidFill>
+              </a:ln>
+            </p:spPr>
+            <p:style>
+              <a:lnRef idx="1">
+                <a:schemeClr val="accent1"/>
+              </a:lnRef>
+              <a:fillRef idx="0">
+                <a:schemeClr val="accent1"/>
+              </a:fillRef>
+              <a:effectRef idx="0">
+                <a:schemeClr val="accent1"/>
+              </a:effectRef>
+              <a:fontRef idx="minor">
+                <a:schemeClr val="tx1"/>
+              </a:fontRef>
+            </p:style>
+          </p:cxnSp>
+          <p:cxnSp>
+            <p:nvCxnSpPr>
+              <p:cNvPr id="37" name="Straight Arrow Connector 36">
+                <a:extLst>
+                  <a:ext uri="{FF2B5EF4-FFF2-40B4-BE49-F238E27FC236}">
+                    <a16:creationId xmlns:a16="http://schemas.microsoft.com/office/drawing/2014/main" id="{2583D65C-B1C4-4653-A8F3-CC5CAE3BCC2D}"/>
+                  </a:ext>
+                </a:extLst>
+              </p:cNvPr>
+              <p:cNvCxnSpPr>
+                <a:cxnSpLocks/>
+              </p:cNvCxnSpPr>
+              <p:nvPr/>
+            </p:nvCxnSpPr>
+            <p:spPr>
+              <a:xfrm>
+                <a:off x="2627453" y="6379778"/>
+                <a:ext cx="2672519" cy="0"/>
+              </a:xfrm>
+              <a:prstGeom prst="straightConnector1">
+                <a:avLst/>
+              </a:prstGeom>
+              <a:ln w="19050">
+                <a:solidFill>
+                  <a:schemeClr val="tx1"/>
+                </a:solidFill>
+                <a:headEnd type="triangle"/>
+                <a:tailEnd type="triangle"/>
+              </a:ln>
+            </p:spPr>
+            <p:style>
+              <a:lnRef idx="1">
+                <a:schemeClr val="accent1"/>
+              </a:lnRef>
+              <a:fillRef idx="0">
+                <a:schemeClr val="accent1"/>
+              </a:fillRef>
+              <a:effectRef idx="0">
+                <a:schemeClr val="accent1"/>
+              </a:effectRef>
+              <a:fontRef idx="minor">
+                <a:schemeClr val="tx1"/>
+              </a:fontRef>
+            </p:style>
+          </p:cxnSp>
+          <p:sp>
+            <p:nvSpPr>
+              <p:cNvPr id="42" name="Rectangle: Rounded Corners 41">
+                <a:extLst>
+                  <a:ext uri="{FF2B5EF4-FFF2-40B4-BE49-F238E27FC236}">
+                    <a16:creationId xmlns:a16="http://schemas.microsoft.com/office/drawing/2014/main" id="{7E8125E0-ED72-4F5B-B2B6-29AE42437AD0}"/>
+                  </a:ext>
+                </a:extLst>
+              </p:cNvPr>
+              <p:cNvSpPr/>
+              <p:nvPr/>
+            </p:nvSpPr>
+            <p:spPr>
+              <a:xfrm>
+                <a:off x="3246083" y="6095302"/>
+                <a:ext cx="1435260" cy="522651"/>
+              </a:xfrm>
+              <a:prstGeom prst="roundRect">
+                <a:avLst/>
+              </a:prstGeom>
+              <a:solidFill>
+                <a:srgbClr val="FFCCCC"/>
+              </a:solidFill>
+              <a:ln>
+                <a:noFill/>
+              </a:ln>
+            </p:spPr>
+            <p:style>
+              <a:lnRef idx="2">
+                <a:schemeClr val="accent1">
+                  <a:shade val="50000"/>
+                </a:schemeClr>
+              </a:lnRef>
+              <a:fillRef idx="1">
+                <a:schemeClr val="accent1"/>
+              </a:fillRef>
+              <a:effectRef idx="0">
+                <a:schemeClr val="accent1"/>
+              </a:effectRef>
+              <a:fontRef idx="minor">
+                <a:schemeClr val="lt1"/>
+              </a:fontRef>
+            </p:style>
+            <p:txBody>
+              <a:bodyPr rtlCol="0" anchor="ctr"/>
+              <a:lstStyle/>
+              <a:p>
+                <a:pPr algn="ctr"/>
+                <a:endParaRPr lang="de-CH"/>
+              </a:p>
+            </p:txBody>
+          </p:sp>
+          <p:sp>
+            <p:nvSpPr>
+              <p:cNvPr id="44" name="TextBox 43">
+                <a:extLst>
+                  <a:ext uri="{FF2B5EF4-FFF2-40B4-BE49-F238E27FC236}">
+                    <a16:creationId xmlns:a16="http://schemas.microsoft.com/office/drawing/2014/main" id="{3125CA82-2369-402F-A1E9-AAF8A802A5CA}"/>
+                  </a:ext>
+                </a:extLst>
+              </p:cNvPr>
+              <p:cNvSpPr txBox="1"/>
+              <p:nvPr/>
+            </p:nvSpPr>
+            <p:spPr>
+              <a:xfrm>
+                <a:off x="3507911" y="6194960"/>
+                <a:ext cx="993650" cy="369332"/>
+              </a:xfrm>
+              <a:prstGeom prst="rect">
+                <a:avLst/>
+              </a:prstGeom>
+              <a:noFill/>
+            </p:spPr>
+            <p:txBody>
+              <a:bodyPr wrap="square" rtlCol="0">
+                <a:spAutoFit/>
+              </a:bodyPr>
+              <a:lstStyle/>
+              <a:p>
+                <a:r>
+                  <a:rPr lang="en-GB" b="1" dirty="0"/>
+                  <a:t>Phase 1</a:t>
+                </a:r>
+                <a:endParaRPr lang="de-CH" b="1" dirty="0"/>
+              </a:p>
+            </p:txBody>
+          </p:sp>
+        </p:grpSp>
+      </p:grpSp>
+      <p:grpSp>
+        <p:nvGrpSpPr>
+          <p:cNvPr id="16" name="Group 15">
+            <a:extLst>
+              <a:ext uri="{FF2B5EF4-FFF2-40B4-BE49-F238E27FC236}">
+                <a16:creationId xmlns:a16="http://schemas.microsoft.com/office/drawing/2014/main" id="{ECA2C862-EB03-4D95-9A87-CFE101965785}"/>
+              </a:ext>
+            </a:extLst>
+          </p:cNvPr>
+          <p:cNvGrpSpPr/>
+          <p:nvPr/>
+        </p:nvGrpSpPr>
+        <p:grpSpPr>
+          <a:xfrm>
+            <a:off x="5362113" y="1738131"/>
+            <a:ext cx="3749092" cy="4879821"/>
+            <a:chOff x="5362113" y="1738131"/>
+            <a:chExt cx="3749092" cy="4879821"/>
+          </a:xfrm>
+        </p:grpSpPr>
+        <p:cxnSp>
+          <p:nvCxnSpPr>
+            <p:cNvPr id="28" name="Straight Connector 27">
+              <a:extLst>
+                <a:ext uri="{FF2B5EF4-FFF2-40B4-BE49-F238E27FC236}">
+                  <a16:creationId xmlns:a16="http://schemas.microsoft.com/office/drawing/2014/main" id="{A90AC91F-8522-4245-BDF1-50713A9DC6DB}"/>
+                </a:ext>
+              </a:extLst>
+            </p:cNvPr>
+            <p:cNvCxnSpPr>
+              <a:cxnSpLocks/>
+            </p:cNvCxnSpPr>
+            <p:nvPr/>
+          </p:nvCxnSpPr>
+          <p:spPr>
+            <a:xfrm>
+              <a:off x="9111205" y="1738131"/>
+              <a:ext cx="0" cy="4801284"/>
+            </a:xfrm>
+            <a:prstGeom prst="line">
+              <a:avLst/>
+            </a:prstGeom>
+            <a:ln w="19050">
+              <a:solidFill>
+                <a:schemeClr val="tx1"/>
+              </a:solidFill>
+            </a:ln>
+          </p:spPr>
+          <p:style>
+            <a:lnRef idx="1">
+              <a:schemeClr val="accent1"/>
+            </a:lnRef>
+            <a:fillRef idx="0">
+              <a:schemeClr val="accent1"/>
+            </a:fillRef>
+            <a:effectRef idx="0">
+              <a:schemeClr val="accent1"/>
+            </a:effectRef>
+            <a:fontRef idx="minor">
+              <a:schemeClr val="tx1"/>
+            </a:fontRef>
+          </p:style>
+        </p:cxnSp>
+        <p:cxnSp>
+          <p:nvCxnSpPr>
+            <p:cNvPr id="39" name="Straight Arrow Connector 38">
+              <a:extLst>
+                <a:ext uri="{FF2B5EF4-FFF2-40B4-BE49-F238E27FC236}">
+                  <a16:creationId xmlns:a16="http://schemas.microsoft.com/office/drawing/2014/main" id="{B2D1828C-A324-4026-B65A-516FD5E3EECA}"/>
+                </a:ext>
+              </a:extLst>
+            </p:cNvPr>
+            <p:cNvCxnSpPr>
+              <a:cxnSpLocks/>
+            </p:cNvCxnSpPr>
+            <p:nvPr/>
+          </p:nvCxnSpPr>
+          <p:spPr>
+            <a:xfrm>
+              <a:off x="5362113" y="6379778"/>
+              <a:ext cx="3749092" cy="0"/>
+            </a:xfrm>
+            <a:prstGeom prst="straightConnector1">
+              <a:avLst/>
+            </a:prstGeom>
+            <a:ln w="19050">
+              <a:solidFill>
+                <a:schemeClr val="tx1"/>
+              </a:solidFill>
+              <a:headEnd type="triangle"/>
+              <a:tailEnd type="triangle"/>
+            </a:ln>
+          </p:spPr>
+          <p:style>
+            <a:lnRef idx="1">
+              <a:schemeClr val="accent1"/>
+            </a:lnRef>
+            <a:fillRef idx="0">
+              <a:schemeClr val="accent1"/>
+            </a:fillRef>
+            <a:effectRef idx="0">
+              <a:schemeClr val="accent1"/>
+            </a:effectRef>
+            <a:fontRef idx="minor">
+              <a:schemeClr val="tx1"/>
+            </a:fontRef>
+          </p:style>
+        </p:cxnSp>
+        <p:sp>
+          <p:nvSpPr>
+            <p:cNvPr id="43" name="Rectangle: Rounded Corners 42">
+              <a:extLst>
+                <a:ext uri="{FF2B5EF4-FFF2-40B4-BE49-F238E27FC236}">
+                  <a16:creationId xmlns:a16="http://schemas.microsoft.com/office/drawing/2014/main" id="{B8E10230-01E5-4F66-BBBB-DE52B9C816E4}"/>
+                </a:ext>
+              </a:extLst>
+            </p:cNvPr>
+            <p:cNvSpPr/>
+            <p:nvPr/>
+          </p:nvSpPr>
+          <p:spPr>
+            <a:xfrm>
+              <a:off x="6204583" y="6095301"/>
+              <a:ext cx="2064152" cy="522651"/>
+            </a:xfrm>
+            <a:prstGeom prst="roundRect">
+              <a:avLst/>
+            </a:prstGeom>
+            <a:solidFill>
+              <a:schemeClr val="accent6">
+                <a:lumMod val="40000"/>
+                <a:lumOff val="60000"/>
+              </a:schemeClr>
+            </a:solidFill>
+            <a:ln>
+              <a:noFill/>
+            </a:ln>
+          </p:spPr>
+          <p:style>
+            <a:lnRef idx="2">
+              <a:schemeClr val="accent1">
+                <a:shade val="50000"/>
+              </a:schemeClr>
+            </a:lnRef>
+            <a:fillRef idx="1">
+              <a:schemeClr val="accent1"/>
+            </a:fillRef>
+            <a:effectRef idx="0">
+              <a:schemeClr val="accent1"/>
+            </a:effectRef>
+            <a:fontRef idx="minor">
+              <a:schemeClr val="lt1"/>
+            </a:fontRef>
+          </p:style>
+          <p:txBody>
+            <a:bodyPr rtlCol="0" anchor="ctr"/>
+            <a:lstStyle/>
+            <a:p>
+              <a:pPr algn="ctr"/>
+              <a:endParaRPr lang="de-CH"/>
+            </a:p>
+          </p:txBody>
+        </p:sp>
+        <p:sp>
+          <p:nvSpPr>
+            <p:cNvPr id="45" name="TextBox 44">
+              <a:extLst>
+                <a:ext uri="{FF2B5EF4-FFF2-40B4-BE49-F238E27FC236}">
+                  <a16:creationId xmlns:a16="http://schemas.microsoft.com/office/drawing/2014/main" id="{421F7FB2-F6A7-45CB-8E6A-654674173379}"/>
+                </a:ext>
+              </a:extLst>
+            </p:cNvPr>
+            <p:cNvSpPr txBox="1"/>
+            <p:nvPr/>
+          </p:nvSpPr>
+          <p:spPr>
+            <a:xfrm>
+              <a:off x="6750520" y="6194960"/>
+              <a:ext cx="938557" cy="369332"/>
+            </a:xfrm>
+            <a:prstGeom prst="rect">
+              <a:avLst/>
+            </a:prstGeom>
+            <a:noFill/>
+          </p:spPr>
+          <p:txBody>
+            <a:bodyPr wrap="square" rtlCol="0">
+              <a:spAutoFit/>
+            </a:bodyPr>
+            <a:lstStyle/>
+            <a:p>
+              <a:r>
+                <a:rPr lang="en-GB" b="1" dirty="0"/>
+                <a:t>Phase 2</a:t>
+              </a:r>
+              <a:endParaRPr lang="de-CH" b="1" dirty="0"/>
+            </a:p>
+          </p:txBody>
+        </p:sp>
+      </p:grpSp>
+    </p:spTree>
+    <p:extLst>
+      <p:ext uri="{BB962C8B-B14F-4D97-AF65-F5344CB8AC3E}">
+        <p14:creationId xmlns:p14="http://schemas.microsoft.com/office/powerpoint/2010/main" val="42234680"/>
+      </p:ext>
+    </p:extLst>
+  </p:cSld>
+  <p:clrMapOvr>
+    <a:masterClrMapping/>
+  </p:clrMapOvr>
+</p:sld>
+</file>
+
+<file path=ppt/slides/slide2.xml><?xml version="1.0" encoding="utf-8"?>
+<p:sld xmlns:a="http://schemas.openxmlformats.org/drawingml/2006/main" xmlns:r="http://schemas.openxmlformats.org/officeDocument/2006/relationships" xmlns:p="http://schemas.openxmlformats.org/presentationml/2006/main">
+  <p:cSld>
+    <p:spTree>
+      <p:nvGrpSpPr>
+        <p:cNvPr id="1" name=""/>
+        <p:cNvGrpSpPr/>
+        <p:nvPr/>
+      </p:nvGrpSpPr>
+      <p:grpSpPr>
+        <a:xfrm>
+          <a:off x="0" y="0"/>
+          <a:ext cx="0" cy="0"/>
+          <a:chOff x="0" y="0"/>
+          <a:chExt cx="0" cy="0"/>
+        </a:xfrm>
+      </p:grpSpPr>
+      <p:pic>
+        <p:nvPicPr>
+          <p:cNvPr id="6" name="Picture 5">
+            <a:extLst>
+              <a:ext uri="{FF2B5EF4-FFF2-40B4-BE49-F238E27FC236}">
+                <a16:creationId xmlns:a16="http://schemas.microsoft.com/office/drawing/2014/main" id="{C11FB5C5-4E72-4D55-9DEF-2B25653692EE}"/>
+              </a:ext>
+            </a:extLst>
+          </p:cNvPr>
+          <p:cNvPicPr>
+            <a:picLocks noChangeAspect="1"/>
+          </p:cNvPicPr>
+          <p:nvPr/>
+        </p:nvPicPr>
+        <p:blipFill>
+          <a:blip r:embed="rId2">
+            <a:extLst>
+              <a:ext uri="{28A0092B-C50C-407E-A947-70E740481C1C}">
+                <a14:useLocalDpi xmlns:a14="http://schemas.microsoft.com/office/drawing/2010/main" val="0"/>
+              </a:ext>
+            </a:extLst>
+          </a:blip>
+          <a:stretch>
+            <a:fillRect/>
+          </a:stretch>
+        </p:blipFill>
+        <p:spPr>
+          <a:xfrm>
+            <a:off x="787579" y="1221900"/>
+            <a:ext cx="8967995" cy="6522178"/>
+          </a:xfrm>
+          <a:prstGeom prst="rect">
+            <a:avLst/>
+          </a:prstGeom>
+        </p:spPr>
+      </p:pic>
+      <p:grpSp>
+        <p:nvGrpSpPr>
+          <p:cNvPr id="12" name="Group 11">
+            <a:extLst>
+              <a:ext uri="{FF2B5EF4-FFF2-40B4-BE49-F238E27FC236}">
+                <a16:creationId xmlns:a16="http://schemas.microsoft.com/office/drawing/2014/main" id="{E63891B1-B3C5-469F-B988-0FE2C9E06C63}"/>
+              </a:ext>
+            </a:extLst>
+          </p:cNvPr>
+          <p:cNvGrpSpPr/>
+          <p:nvPr/>
+        </p:nvGrpSpPr>
+        <p:grpSpPr>
+          <a:xfrm>
+            <a:off x="2599057" y="5815428"/>
+            <a:ext cx="2743793" cy="941262"/>
+            <a:chOff x="2627453" y="6095302"/>
+            <a:chExt cx="2743793" cy="941262"/>
+          </a:xfrm>
+        </p:grpSpPr>
+        <p:cxnSp>
+          <p:nvCxnSpPr>
+            <p:cNvPr id="13" name="Straight Connector 12">
+              <a:extLst>
+                <a:ext uri="{FF2B5EF4-FFF2-40B4-BE49-F238E27FC236}">
+                  <a16:creationId xmlns:a16="http://schemas.microsoft.com/office/drawing/2014/main" id="{B68D409C-AD57-4607-960A-76DE8569DAA4}"/>
+                </a:ext>
+              </a:extLst>
+            </p:cNvPr>
+            <p:cNvCxnSpPr>
+              <a:cxnSpLocks/>
+            </p:cNvCxnSpPr>
+            <p:nvPr/>
+          </p:nvCxnSpPr>
+          <p:spPr>
+            <a:xfrm>
+              <a:off x="5371246" y="6220141"/>
+              <a:ext cx="0" cy="319274"/>
+            </a:xfrm>
+            <a:prstGeom prst="line">
+              <a:avLst/>
+            </a:prstGeom>
+            <a:ln w="19050">
+              <a:solidFill>
+                <a:schemeClr val="tx1"/>
+              </a:solidFill>
+            </a:ln>
+          </p:spPr>
+          <p:style>
+            <a:lnRef idx="1">
+              <a:schemeClr val="accent1"/>
+            </a:lnRef>
+            <a:fillRef idx="0">
+              <a:schemeClr val="accent1"/>
+            </a:fillRef>
+            <a:effectRef idx="0">
+              <a:schemeClr val="accent1"/>
+            </a:effectRef>
+            <a:fontRef idx="minor">
+              <a:schemeClr val="tx1"/>
+            </a:fontRef>
+          </p:style>
+        </p:cxnSp>
+        <p:grpSp>
+          <p:nvGrpSpPr>
+            <p:cNvPr id="14" name="Group 13">
+              <a:extLst>
+                <a:ext uri="{FF2B5EF4-FFF2-40B4-BE49-F238E27FC236}">
+                  <a16:creationId xmlns:a16="http://schemas.microsoft.com/office/drawing/2014/main" id="{FE9B62F5-7792-4B42-A19E-2C21D12BDE25}"/>
+                </a:ext>
+              </a:extLst>
+            </p:cNvPr>
+            <p:cNvGrpSpPr/>
+            <p:nvPr/>
+          </p:nvGrpSpPr>
+          <p:grpSpPr>
+            <a:xfrm>
+              <a:off x="2627453" y="6095302"/>
+              <a:ext cx="2743793" cy="941262"/>
+              <a:chOff x="2627453" y="6095302"/>
+              <a:chExt cx="2743793" cy="941262"/>
+            </a:xfrm>
+          </p:grpSpPr>
+          <p:cxnSp>
+            <p:nvCxnSpPr>
+              <p:cNvPr id="15" name="Straight Connector 14">
+                <a:extLst>
+                  <a:ext uri="{FF2B5EF4-FFF2-40B4-BE49-F238E27FC236}">
+                    <a16:creationId xmlns:a16="http://schemas.microsoft.com/office/drawing/2014/main" id="{145442DE-1E4C-44ED-BBC1-0930D0DB5357}"/>
+                  </a:ext>
+                </a:extLst>
+              </p:cNvPr>
+              <p:cNvCxnSpPr>
+                <a:cxnSpLocks/>
+              </p:cNvCxnSpPr>
+              <p:nvPr/>
+            </p:nvCxnSpPr>
+            <p:spPr>
+              <a:xfrm>
+                <a:off x="2627453" y="6220141"/>
+                <a:ext cx="0" cy="816423"/>
+              </a:xfrm>
+              <a:prstGeom prst="line">
+                <a:avLst/>
+              </a:prstGeom>
+              <a:ln w="19050">
+                <a:solidFill>
+                  <a:schemeClr val="tx1"/>
+                </a:solidFill>
+              </a:ln>
+            </p:spPr>
+            <p:style>
+              <a:lnRef idx="1">
+                <a:schemeClr val="accent1"/>
+              </a:lnRef>
+              <a:fillRef idx="0">
+                <a:schemeClr val="accent1"/>
+              </a:fillRef>
+              <a:effectRef idx="0">
+                <a:schemeClr val="accent1"/>
+              </a:effectRef>
+              <a:fontRef idx="minor">
+                <a:schemeClr val="tx1"/>
+              </a:fontRef>
+            </p:style>
+          </p:cxnSp>
+          <p:cxnSp>
+            <p:nvCxnSpPr>
+              <p:cNvPr id="16" name="Straight Arrow Connector 15">
+                <a:extLst>
+                  <a:ext uri="{FF2B5EF4-FFF2-40B4-BE49-F238E27FC236}">
+                    <a16:creationId xmlns:a16="http://schemas.microsoft.com/office/drawing/2014/main" id="{AC279316-63D8-4AF3-A362-11D1253E0170}"/>
+                  </a:ext>
+                </a:extLst>
+              </p:cNvPr>
+              <p:cNvCxnSpPr>
+                <a:cxnSpLocks/>
+              </p:cNvCxnSpPr>
+              <p:nvPr/>
+            </p:nvCxnSpPr>
+            <p:spPr>
+              <a:xfrm>
+                <a:off x="2627453" y="6379778"/>
+                <a:ext cx="2743793" cy="0"/>
+              </a:xfrm>
+              <a:prstGeom prst="straightConnector1">
+                <a:avLst/>
+              </a:prstGeom>
+              <a:ln w="19050">
+                <a:solidFill>
+                  <a:schemeClr val="tx1"/>
+                </a:solidFill>
+                <a:headEnd type="triangle"/>
+                <a:tailEnd type="triangle"/>
+              </a:ln>
+            </p:spPr>
+            <p:style>
+              <a:lnRef idx="1">
+                <a:schemeClr val="accent1"/>
+              </a:lnRef>
+              <a:fillRef idx="0">
+                <a:schemeClr val="accent1"/>
+              </a:fillRef>
+              <a:effectRef idx="0">
+                <a:schemeClr val="accent1"/>
+              </a:effectRef>
+              <a:fontRef idx="minor">
+                <a:schemeClr val="tx1"/>
+              </a:fontRef>
+            </p:style>
+          </p:cxnSp>
+          <p:sp>
+            <p:nvSpPr>
+              <p:cNvPr id="17" name="Rectangle: Rounded Corners 16">
+                <a:extLst>
+                  <a:ext uri="{FF2B5EF4-FFF2-40B4-BE49-F238E27FC236}">
+                    <a16:creationId xmlns:a16="http://schemas.microsoft.com/office/drawing/2014/main" id="{804A30F3-A1C2-437A-B307-45A2FFC8DDED}"/>
+                  </a:ext>
+                </a:extLst>
+              </p:cNvPr>
+              <p:cNvSpPr/>
+              <p:nvPr/>
+            </p:nvSpPr>
+            <p:spPr>
+              <a:xfrm>
+                <a:off x="3246083" y="6095302"/>
+                <a:ext cx="1435260" cy="522651"/>
+              </a:xfrm>
+              <a:prstGeom prst="roundRect">
+                <a:avLst/>
+              </a:prstGeom>
+              <a:solidFill>
+                <a:srgbClr val="FFCCCC"/>
+              </a:solidFill>
+              <a:ln>
+                <a:noFill/>
+              </a:ln>
+            </p:spPr>
+            <p:style>
+              <a:lnRef idx="2">
+                <a:schemeClr val="accent1">
+                  <a:shade val="50000"/>
+                </a:schemeClr>
+              </a:lnRef>
+              <a:fillRef idx="1">
+                <a:schemeClr val="accent1"/>
+              </a:fillRef>
+              <a:effectRef idx="0">
+                <a:schemeClr val="accent1"/>
+              </a:effectRef>
+              <a:fontRef idx="minor">
+                <a:schemeClr val="lt1"/>
+              </a:fontRef>
+            </p:style>
+            <p:txBody>
+              <a:bodyPr rtlCol="0" anchor="ctr"/>
+              <a:lstStyle/>
+              <a:p>
+                <a:pPr algn="ctr"/>
+                <a:endParaRPr lang="de-CH"/>
+              </a:p>
+            </p:txBody>
+          </p:sp>
+          <p:sp>
+            <p:nvSpPr>
+              <p:cNvPr id="18" name="TextBox 17">
+                <a:extLst>
+                  <a:ext uri="{FF2B5EF4-FFF2-40B4-BE49-F238E27FC236}">
+                    <a16:creationId xmlns:a16="http://schemas.microsoft.com/office/drawing/2014/main" id="{780BCEEC-CD6F-494D-89A4-D8C70B638B78}"/>
+                  </a:ext>
+                </a:extLst>
+              </p:cNvPr>
+              <p:cNvSpPr txBox="1"/>
+              <p:nvPr/>
+            </p:nvSpPr>
+            <p:spPr>
+              <a:xfrm>
+                <a:off x="3507911" y="6194960"/>
+                <a:ext cx="993650" cy="369332"/>
+              </a:xfrm>
+              <a:prstGeom prst="rect">
+                <a:avLst/>
+              </a:prstGeom>
+              <a:noFill/>
+            </p:spPr>
+            <p:txBody>
+              <a:bodyPr wrap="square" rtlCol="0">
+                <a:spAutoFit/>
+              </a:bodyPr>
+              <a:lstStyle/>
+              <a:p>
+                <a:r>
+                  <a:rPr lang="en-GB" b="1" dirty="0"/>
+                  <a:t>Phase 1</a:t>
+                </a:r>
+                <a:endParaRPr lang="de-CH" b="1" dirty="0"/>
+              </a:p>
+            </p:txBody>
+          </p:sp>
+        </p:grpSp>
+      </p:grpSp>
+      <p:grpSp>
+        <p:nvGrpSpPr>
+          <p:cNvPr id="21" name="Group 20">
+            <a:extLst>
+              <a:ext uri="{FF2B5EF4-FFF2-40B4-BE49-F238E27FC236}">
+                <a16:creationId xmlns:a16="http://schemas.microsoft.com/office/drawing/2014/main" id="{C46D1EE7-22C4-4F2B-92F7-DD8AB0357FCC}"/>
+              </a:ext>
+            </a:extLst>
+          </p:cNvPr>
+          <p:cNvGrpSpPr/>
+          <p:nvPr/>
+        </p:nvGrpSpPr>
+        <p:grpSpPr>
+          <a:xfrm>
+            <a:off x="5114980" y="6379704"/>
+            <a:ext cx="2237171" cy="746318"/>
+            <a:chOff x="5060274" y="6594884"/>
+            <a:chExt cx="2237171" cy="746318"/>
+          </a:xfrm>
+        </p:grpSpPr>
+        <p:cxnSp>
+          <p:nvCxnSpPr>
+            <p:cNvPr id="19" name="Straight Arrow Connector 18">
+              <a:extLst>
+                <a:ext uri="{FF2B5EF4-FFF2-40B4-BE49-F238E27FC236}">
+                  <a16:creationId xmlns:a16="http://schemas.microsoft.com/office/drawing/2014/main" id="{248F079F-624B-4621-85E1-CFB50F06A124}"/>
+                </a:ext>
+              </a:extLst>
+            </p:cNvPr>
+            <p:cNvCxnSpPr>
+              <a:cxnSpLocks/>
+            </p:cNvCxnSpPr>
+            <p:nvPr/>
+          </p:nvCxnSpPr>
+          <p:spPr>
+            <a:xfrm flipV="1">
+              <a:off x="5299971" y="6594884"/>
+              <a:ext cx="0" cy="449773"/>
+            </a:xfrm>
+            <a:prstGeom prst="straightConnector1">
+              <a:avLst/>
+            </a:prstGeom>
+            <a:ln w="19050">
+              <a:solidFill>
+                <a:schemeClr val="tx1"/>
+              </a:solidFill>
+              <a:tailEnd type="triangle"/>
+            </a:ln>
+          </p:spPr>
+          <p:style>
+            <a:lnRef idx="1">
+              <a:schemeClr val="accent1"/>
+            </a:lnRef>
+            <a:fillRef idx="0">
+              <a:schemeClr val="accent1"/>
+            </a:fillRef>
+            <a:effectRef idx="0">
+              <a:schemeClr val="accent1"/>
+            </a:effectRef>
+            <a:fontRef idx="minor">
+              <a:schemeClr val="tx1"/>
+            </a:fontRef>
+          </p:style>
+        </p:cxnSp>
+        <p:sp>
+          <p:nvSpPr>
+            <p:cNvPr id="20" name="TextBox 19">
+              <a:extLst>
+                <a:ext uri="{FF2B5EF4-FFF2-40B4-BE49-F238E27FC236}">
+                  <a16:creationId xmlns:a16="http://schemas.microsoft.com/office/drawing/2014/main" id="{66ED8AC4-53CF-46E1-B164-1D89E251BBF2}"/>
+                </a:ext>
+              </a:extLst>
+            </p:cNvPr>
+            <p:cNvSpPr txBox="1"/>
+            <p:nvPr/>
+          </p:nvSpPr>
+          <p:spPr>
+            <a:xfrm>
+              <a:off x="5060274" y="6971870"/>
+              <a:ext cx="2237171" cy="369332"/>
+            </a:xfrm>
+            <a:prstGeom prst="rect">
+              <a:avLst/>
+            </a:prstGeom>
+            <a:noFill/>
+          </p:spPr>
+          <p:txBody>
+            <a:bodyPr wrap="square" rtlCol="0">
+              <a:spAutoFit/>
+            </a:bodyPr>
+            <a:lstStyle/>
+            <a:p>
+              <a:r>
+                <a:rPr lang="en-GB" dirty="0" err="1"/>
+                <a:t>GDD</a:t>
+              </a:r>
+              <a:r>
+                <a:rPr lang="en-GB" baseline="-25000" dirty="0" err="1"/>
+                <a:t>threshold</a:t>
+              </a:r>
+              <a:r>
+                <a:rPr lang="en-GB" baseline="-25000" dirty="0"/>
+                <a:t> </a:t>
+              </a:r>
+              <a:r>
+                <a:rPr lang="en-GB" dirty="0"/>
+                <a:t>(</a:t>
+              </a:r>
+              <a:r>
+                <a:rPr lang="en-GB" i="1" dirty="0"/>
+                <a:t>k</a:t>
+              </a:r>
+              <a:r>
+                <a:rPr lang="en-GB" dirty="0"/>
+                <a:t>)</a:t>
+              </a:r>
+              <a:endParaRPr lang="de-CH" dirty="0"/>
+            </a:p>
+          </p:txBody>
+        </p:sp>
+      </p:grpSp>
+      <p:grpSp>
+        <p:nvGrpSpPr>
+          <p:cNvPr id="25" name="Group 24">
+            <a:extLst>
+              <a:ext uri="{FF2B5EF4-FFF2-40B4-BE49-F238E27FC236}">
+                <a16:creationId xmlns:a16="http://schemas.microsoft.com/office/drawing/2014/main" id="{F4E780C3-8257-4CBA-9A74-96CB336F7499}"/>
+              </a:ext>
+            </a:extLst>
+          </p:cNvPr>
+          <p:cNvGrpSpPr/>
+          <p:nvPr/>
+        </p:nvGrpSpPr>
+        <p:grpSpPr>
+          <a:xfrm>
+            <a:off x="5354677" y="1641026"/>
+            <a:ext cx="3927117" cy="4801284"/>
+            <a:chOff x="5362113" y="1641026"/>
+            <a:chExt cx="3927117" cy="4801284"/>
+          </a:xfrm>
+        </p:grpSpPr>
+        <p:cxnSp>
+          <p:nvCxnSpPr>
+            <p:cNvPr id="26" name="Straight Connector 25">
+              <a:extLst>
+                <a:ext uri="{FF2B5EF4-FFF2-40B4-BE49-F238E27FC236}">
+                  <a16:creationId xmlns:a16="http://schemas.microsoft.com/office/drawing/2014/main" id="{913C3664-1F83-4F5D-875D-BCE9D1EC7FED}"/>
+                </a:ext>
+              </a:extLst>
+            </p:cNvPr>
+            <p:cNvCxnSpPr>
+              <a:cxnSpLocks/>
+            </p:cNvCxnSpPr>
+            <p:nvPr/>
+          </p:nvCxnSpPr>
+          <p:spPr>
+            <a:xfrm>
+              <a:off x="9289230" y="1641026"/>
+              <a:ext cx="0" cy="4801284"/>
+            </a:xfrm>
+            <a:prstGeom prst="line">
+              <a:avLst/>
+            </a:prstGeom>
+            <a:ln w="19050">
+              <a:solidFill>
+                <a:schemeClr val="tx1"/>
+              </a:solidFill>
+            </a:ln>
+          </p:spPr>
+          <p:style>
+            <a:lnRef idx="1">
+              <a:schemeClr val="accent1"/>
+            </a:lnRef>
+            <a:fillRef idx="0">
+              <a:schemeClr val="accent1"/>
+            </a:fillRef>
+            <a:effectRef idx="0">
+              <a:schemeClr val="accent1"/>
+            </a:effectRef>
+            <a:fontRef idx="minor">
+              <a:schemeClr val="tx1"/>
+            </a:fontRef>
+          </p:style>
+        </p:cxnSp>
+        <p:cxnSp>
+          <p:nvCxnSpPr>
+            <p:cNvPr id="27" name="Straight Arrow Connector 26">
+              <a:extLst>
+                <a:ext uri="{FF2B5EF4-FFF2-40B4-BE49-F238E27FC236}">
+                  <a16:creationId xmlns:a16="http://schemas.microsoft.com/office/drawing/2014/main" id="{FEFFFBF4-2FD3-43E6-A10B-363B68B3FEE0}"/>
+                </a:ext>
+              </a:extLst>
+            </p:cNvPr>
+            <p:cNvCxnSpPr>
+              <a:cxnSpLocks/>
+            </p:cNvCxnSpPr>
+            <p:nvPr/>
+          </p:nvCxnSpPr>
+          <p:spPr>
+            <a:xfrm>
+              <a:off x="5362113" y="6095301"/>
+              <a:ext cx="3927117" cy="0"/>
+            </a:xfrm>
+            <a:prstGeom prst="straightConnector1">
+              <a:avLst/>
+            </a:prstGeom>
+            <a:ln w="19050">
+              <a:solidFill>
+                <a:schemeClr val="tx1"/>
+              </a:solidFill>
+              <a:headEnd type="triangle"/>
+              <a:tailEnd type="triangle"/>
+            </a:ln>
+          </p:spPr>
+          <p:style>
+            <a:lnRef idx="1">
+              <a:schemeClr val="accent1"/>
+            </a:lnRef>
+            <a:fillRef idx="0">
+              <a:schemeClr val="accent1"/>
+            </a:fillRef>
+            <a:effectRef idx="0">
+              <a:schemeClr val="accent1"/>
+            </a:effectRef>
+            <a:fontRef idx="minor">
+              <a:schemeClr val="tx1"/>
+            </a:fontRef>
+          </p:style>
+        </p:cxnSp>
+        <p:sp>
+          <p:nvSpPr>
+            <p:cNvPr id="28" name="Rectangle: Rounded Corners 27">
+              <a:extLst>
+                <a:ext uri="{FF2B5EF4-FFF2-40B4-BE49-F238E27FC236}">
+                  <a16:creationId xmlns:a16="http://schemas.microsoft.com/office/drawing/2014/main" id="{728E9AFC-2091-4942-B2EB-307883CB206A}"/>
+                </a:ext>
+              </a:extLst>
+            </p:cNvPr>
+            <p:cNvSpPr/>
+            <p:nvPr/>
+          </p:nvSpPr>
+          <p:spPr>
+            <a:xfrm>
+              <a:off x="6355392" y="5815428"/>
+              <a:ext cx="2064152" cy="522651"/>
+            </a:xfrm>
+            <a:prstGeom prst="roundRect">
+              <a:avLst/>
+            </a:prstGeom>
+            <a:solidFill>
+              <a:schemeClr val="accent6">
+                <a:lumMod val="40000"/>
+                <a:lumOff val="60000"/>
+              </a:schemeClr>
+            </a:solidFill>
+            <a:ln>
+              <a:noFill/>
+            </a:ln>
+          </p:spPr>
+          <p:style>
+            <a:lnRef idx="2">
+              <a:schemeClr val="accent1">
+                <a:shade val="50000"/>
+              </a:schemeClr>
+            </a:lnRef>
+            <a:fillRef idx="1">
+              <a:schemeClr val="accent1"/>
+            </a:fillRef>
+            <a:effectRef idx="0">
+              <a:schemeClr val="accent1"/>
+            </a:effectRef>
+            <a:fontRef idx="minor">
+              <a:schemeClr val="lt1"/>
+            </a:fontRef>
+          </p:style>
+          <p:txBody>
+            <a:bodyPr rtlCol="0" anchor="ctr"/>
+            <a:lstStyle/>
+            <a:p>
+              <a:pPr algn="ctr"/>
+              <a:endParaRPr lang="de-CH"/>
+            </a:p>
+          </p:txBody>
+        </p:sp>
+        <p:sp>
+          <p:nvSpPr>
+            <p:cNvPr id="29" name="TextBox 28">
+              <a:extLst>
+                <a:ext uri="{FF2B5EF4-FFF2-40B4-BE49-F238E27FC236}">
+                  <a16:creationId xmlns:a16="http://schemas.microsoft.com/office/drawing/2014/main" id="{41DA9E8C-D7F0-4276-B014-F4CBE1538DB8}"/>
+                </a:ext>
+              </a:extLst>
+            </p:cNvPr>
+            <p:cNvSpPr txBox="1"/>
+            <p:nvPr/>
+          </p:nvSpPr>
+          <p:spPr>
+            <a:xfrm>
+              <a:off x="6901329" y="5915087"/>
+              <a:ext cx="938557" cy="369332"/>
+            </a:xfrm>
+            <a:prstGeom prst="rect">
+              <a:avLst/>
+            </a:prstGeom>
+            <a:noFill/>
+          </p:spPr>
+          <p:txBody>
+            <a:bodyPr wrap="square" rtlCol="0">
+              <a:spAutoFit/>
+            </a:bodyPr>
+            <a:lstStyle/>
+            <a:p>
+              <a:r>
+                <a:rPr lang="en-GB" b="1" dirty="0"/>
+                <a:t>Phase 2</a:t>
+              </a:r>
+              <a:endParaRPr lang="de-CH" b="1" dirty="0"/>
+            </a:p>
+          </p:txBody>
+        </p:sp>
+      </p:grpSp>
+      <mc:AlternateContent xmlns:mc="http://schemas.openxmlformats.org/markup-compatibility/2006" xmlns:a14="http://schemas.microsoft.com/office/drawing/2010/main">
+        <mc:Choice Requires="a14">
+          <p:sp>
+            <p:nvSpPr>
+              <p:cNvPr id="31" name="TextBox 30">
+                <a:extLst>
+                  <a:ext uri="{FF2B5EF4-FFF2-40B4-BE49-F238E27FC236}">
+                    <a16:creationId xmlns:a16="http://schemas.microsoft.com/office/drawing/2014/main" id="{5766AB27-9853-44C5-BD18-7352E87295F0}"/>
+                  </a:ext>
+                </a:extLst>
+              </p:cNvPr>
+              <p:cNvSpPr txBox="1"/>
+              <p:nvPr/>
+            </p:nvSpPr>
+            <p:spPr>
+              <a:xfrm>
+                <a:off x="2957862" y="2882843"/>
+                <a:ext cx="2895536" cy="529697"/>
+              </a:xfrm>
+              <a:prstGeom prst="rect">
+                <a:avLst/>
+              </a:prstGeom>
+              <a:noFill/>
+            </p:spPr>
+            <p:txBody>
+              <a:bodyPr wrap="none" lIns="0" tIns="0" rIns="0" bIns="0" rtlCol="0">
+                <a:spAutoFit/>
+              </a:bodyPr>
+              <a:lstStyle/>
+              <a:p>
+                <a:pPr/>
+                <a14:m>
+                  <m:oMathPara xmlns:m="http://schemas.openxmlformats.org/officeDocument/2006/math">
+                    <m:oMathParaPr>
+                      <m:jc m:val="centerGroup"/>
+                    </m:oMathParaPr>
+                    <m:oMath xmlns:m="http://schemas.openxmlformats.org/officeDocument/2006/math">
+                      <m:r>
+                        <a:rPr lang="en-GB" i="1" smtClean="0">
+                          <a:solidFill>
+                            <a:srgbClr val="339933"/>
+                          </a:solidFill>
+                          <a:latin typeface="Cambria Math" panose="02040503050406030204" pitchFamily="18" charset="0"/>
+                        </a:rPr>
+                        <m:t>𝑓</m:t>
+                      </m:r>
+                      <m:r>
+                        <a:rPr lang="en-GB" i="1" baseline="-25000">
+                          <a:solidFill>
+                            <a:srgbClr val="339933"/>
+                          </a:solidFill>
+                          <a:latin typeface="Cambria Math" panose="02040503050406030204" pitchFamily="18" charset="0"/>
+                        </a:rPr>
+                        <m:t>2</m:t>
+                      </m:r>
+                      <m:r>
+                        <a:rPr lang="en-GB" i="1">
+                          <a:solidFill>
+                            <a:srgbClr val="339933"/>
+                          </a:solidFill>
+                          <a:latin typeface="Cambria Math" panose="02040503050406030204" pitchFamily="18" charset="0"/>
+                        </a:rPr>
+                        <m:t>(</m:t>
+                      </m:r>
+                      <m:r>
+                        <a:rPr lang="de-CH" b="0" i="1" smtClean="0">
+                          <a:solidFill>
+                            <a:srgbClr val="339933"/>
+                          </a:solidFill>
+                          <a:latin typeface="Cambria Math" panose="02040503050406030204" pitchFamily="18" charset="0"/>
+                        </a:rPr>
+                        <m:t>𝐺𝐷𝐷</m:t>
+                      </m:r>
+                      <m:r>
+                        <a:rPr lang="en-GB" i="1">
+                          <a:solidFill>
+                            <a:srgbClr val="339933"/>
+                          </a:solidFill>
+                          <a:latin typeface="Cambria Math" panose="02040503050406030204" pitchFamily="18" charset="0"/>
+                        </a:rPr>
+                        <m:t>)</m:t>
+                      </m:r>
+                      <m:r>
+                        <a:rPr lang="en-US" i="1">
+                          <a:solidFill>
+                            <a:srgbClr val="339933"/>
+                          </a:solidFill>
+                          <a:latin typeface="Cambria Math" panose="02040503050406030204" pitchFamily="18" charset="0"/>
+                        </a:rPr>
+                        <m:t>=</m:t>
+                      </m:r>
+                      <m:f>
+                        <m:fPr>
+                          <m:ctrlPr>
+                            <a:rPr lang="en-US" i="1">
+                              <a:solidFill>
+                                <a:srgbClr val="339933"/>
+                              </a:solidFill>
+                              <a:latin typeface="Cambria Math" panose="02040503050406030204" pitchFamily="18" charset="0"/>
+                            </a:rPr>
+                          </m:ctrlPr>
+                        </m:fPr>
+                        <m:num>
+                          <m:r>
+                            <a:rPr lang="en-GB" i="1">
+                              <a:solidFill>
+                                <a:srgbClr val="339933"/>
+                              </a:solidFill>
+                              <a:latin typeface="Cambria Math" panose="02040503050406030204" pitchFamily="18" charset="0"/>
+                            </a:rPr>
+                            <m:t>1</m:t>
+                          </m:r>
+                        </m:num>
+                        <m:den>
+                          <m:r>
+                            <a:rPr lang="en-GB" i="1">
+                              <a:solidFill>
+                                <a:srgbClr val="339933"/>
+                              </a:solidFill>
+                              <a:latin typeface="Cambria Math" panose="02040503050406030204" pitchFamily="18" charset="0"/>
+                            </a:rPr>
+                            <m:t>1+</m:t>
+                          </m:r>
+                          <m:sSup>
+                            <m:sSupPr>
+                              <m:ctrlPr>
+                                <a:rPr lang="en-GB" i="1">
+                                  <a:solidFill>
+                                    <a:srgbClr val="339933"/>
+                                  </a:solidFill>
+                                  <a:latin typeface="Cambria Math" panose="02040503050406030204" pitchFamily="18" charset="0"/>
+                                </a:rPr>
+                              </m:ctrlPr>
+                            </m:sSupPr>
+                            <m:e>
+                              <m:r>
+                                <a:rPr lang="en-GB" i="1">
+                                  <a:solidFill>
+                                    <a:srgbClr val="339933"/>
+                                  </a:solidFill>
+                                  <a:latin typeface="Cambria Math" panose="02040503050406030204" pitchFamily="18" charset="0"/>
+                                </a:rPr>
+                                <m:t>𝑒</m:t>
+                              </m:r>
+                            </m:e>
+                            <m:sup>
+                              <m:r>
+                                <a:rPr lang="en-GB" i="1">
+                                  <a:solidFill>
+                                    <a:srgbClr val="339933"/>
+                                  </a:solidFill>
+                                  <a:latin typeface="Cambria Math" panose="02040503050406030204" pitchFamily="18" charset="0"/>
+                                </a:rPr>
+                                <m:t>−</m:t>
+                              </m:r>
+                              <m:sSub>
+                                <m:sSubPr>
+                                  <m:ctrlPr>
+                                    <a:rPr lang="en-GB" i="1">
+                                      <a:solidFill>
+                                        <a:srgbClr val="339933"/>
+                                      </a:solidFill>
+                                      <a:latin typeface="Cambria Math" panose="02040503050406030204" pitchFamily="18" charset="0"/>
+                                    </a:rPr>
+                                  </m:ctrlPr>
+                                </m:sSubPr>
+                                <m:e>
+                                  <m:r>
+                                    <a:rPr lang="en-GB" i="1">
+                                      <a:solidFill>
+                                        <a:srgbClr val="339933"/>
+                                      </a:solidFill>
+                                      <a:latin typeface="Cambria Math" panose="02040503050406030204" pitchFamily="18" charset="0"/>
+                                    </a:rPr>
+                                    <m:t>𝑏</m:t>
+                                  </m:r>
+                                </m:e>
+                                <m:sub>
+                                  <m:r>
+                                    <a:rPr lang="en-GB" i="1">
+                                      <a:solidFill>
+                                        <a:srgbClr val="339933"/>
+                                      </a:solidFill>
+                                      <a:latin typeface="Cambria Math" panose="02040503050406030204" pitchFamily="18" charset="0"/>
+                                    </a:rPr>
+                                    <m:t>2</m:t>
+                                  </m:r>
+                                </m:sub>
+                              </m:sSub>
+                              <m:r>
+                                <a:rPr lang="en-GB" i="1">
+                                  <a:solidFill>
+                                    <a:srgbClr val="339933"/>
+                                  </a:solidFill>
+                                  <a:latin typeface="Cambria Math" panose="02040503050406030204" pitchFamily="18" charset="0"/>
+                                </a:rPr>
+                                <m:t>(</m:t>
+                              </m:r>
+                              <m:r>
+                                <m:rPr>
+                                  <m:sty m:val="p"/>
+                                </m:rPr>
+                                <a:rPr lang="de-DE" altLang="zh-CN" i="1">
+                                  <a:solidFill>
+                                    <a:srgbClr val="339933"/>
+                                  </a:solidFill>
+                                  <a:latin typeface="Cambria Math" panose="02040503050406030204" pitchFamily="18" charset="0"/>
+                                </a:rPr>
+                                <m:t>GDD</m:t>
+                              </m:r>
+                              <m:r>
+                                <a:rPr lang="en-GB" i="1">
+                                  <a:solidFill>
+                                    <a:srgbClr val="339933"/>
+                                  </a:solidFill>
+                                  <a:latin typeface="Cambria Math" panose="02040503050406030204" pitchFamily="18" charset="0"/>
+                                </a:rPr>
+                                <m:t>−</m:t>
+                              </m:r>
+                              <m:sSub>
+                                <m:sSubPr>
+                                  <m:ctrlPr>
+                                    <a:rPr lang="en-GB" i="1">
+                                      <a:solidFill>
+                                        <a:srgbClr val="339933"/>
+                                      </a:solidFill>
+                                      <a:latin typeface="Cambria Math" panose="02040503050406030204" pitchFamily="18" charset="0"/>
+                                    </a:rPr>
+                                  </m:ctrlPr>
+                                </m:sSubPr>
+                                <m:e>
+                                  <m:r>
+                                    <a:rPr lang="en-GB" i="1">
+                                      <a:solidFill>
+                                        <a:srgbClr val="339933"/>
+                                      </a:solidFill>
+                                      <a:latin typeface="Cambria Math" panose="02040503050406030204" pitchFamily="18" charset="0"/>
+                                    </a:rPr>
+                                    <m:t>𝑎</m:t>
+                                  </m:r>
+                                </m:e>
+                                <m:sub>
+                                  <m:r>
+                                    <a:rPr lang="en-GB" i="1">
+                                      <a:solidFill>
+                                        <a:srgbClr val="339933"/>
+                                      </a:solidFill>
+                                      <a:latin typeface="Cambria Math" panose="02040503050406030204" pitchFamily="18" charset="0"/>
+                                    </a:rPr>
+                                    <m:t>2</m:t>
+                                  </m:r>
+                                </m:sub>
+                              </m:sSub>
+                              <m:r>
+                                <a:rPr lang="en-GB" i="1">
+                                  <a:solidFill>
+                                    <a:srgbClr val="339933"/>
+                                  </a:solidFill>
+                                  <a:latin typeface="Cambria Math" panose="02040503050406030204" pitchFamily="18" charset="0"/>
+                                </a:rPr>
+                                <m:t>)</m:t>
+                              </m:r>
+                            </m:sup>
+                          </m:sSup>
+                        </m:den>
+                      </m:f>
+                    </m:oMath>
+                  </m:oMathPara>
+                </a14:m>
+                <a:endParaRPr lang="de-CH" dirty="0"/>
+              </a:p>
+            </p:txBody>
+          </p:sp>
+        </mc:Choice>
+        <mc:Fallback xmlns="">
+          <p:sp>
+            <p:nvSpPr>
+              <p:cNvPr id="31" name="TextBox 30">
+                <a:extLst>
+                  <a:ext uri="{FF2B5EF4-FFF2-40B4-BE49-F238E27FC236}">
+                    <a16:creationId xmlns:a16="http://schemas.microsoft.com/office/drawing/2014/main" id="{5766AB27-9853-44C5-BD18-7352E87295F0}"/>
+                  </a:ext>
+                </a:extLst>
+              </p:cNvPr>
+              <p:cNvSpPr txBox="1">
+                <a:spLocks noRot="1" noChangeAspect="1" noMove="1" noResize="1" noEditPoints="1" noAdjustHandles="1" noChangeArrowheads="1" noChangeShapeType="1" noTextEdit="1"/>
+              </p:cNvSpPr>
+              <p:nvPr/>
+            </p:nvSpPr>
+            <p:spPr>
+              <a:xfrm>
+                <a:off x="2957862" y="2882843"/>
+                <a:ext cx="2895536" cy="529697"/>
+              </a:xfrm>
+              <a:prstGeom prst="rect">
+                <a:avLst/>
+              </a:prstGeom>
+              <a:blipFill>
+                <a:blip r:embed="rId3"/>
+                <a:stretch>
+                  <a:fillRect/>
+                </a:stretch>
+              </a:blipFill>
+            </p:spPr>
+            <p:txBody>
+              <a:bodyPr/>
+              <a:lstStyle/>
+              <a:p>
+                <a:r>
+                  <a:rPr lang="de-CH">
+                    <a:noFill/>
+                  </a:rPr>
+                  <a:t> </a:t>
+                </a:r>
+              </a:p>
+            </p:txBody>
+          </p:sp>
+        </mc:Fallback>
+      </mc:AlternateContent>
+      <mc:AlternateContent xmlns:mc="http://schemas.openxmlformats.org/markup-compatibility/2006">
+        <mc:Choice xmlns:a14="http://schemas.microsoft.com/office/drawing/2010/main" Requires="a14">
+          <p:sp>
+            <p:nvSpPr>
+              <p:cNvPr id="32" name="TextBox 31">
+                <a:extLst>
+                  <a:ext uri="{FF2B5EF4-FFF2-40B4-BE49-F238E27FC236}">
+                    <a16:creationId xmlns:a16="http://schemas.microsoft.com/office/drawing/2014/main" id="{9FB05A5C-8C91-4292-9632-302A3C4A7E39}"/>
+                  </a:ext>
+                </a:extLst>
+              </p:cNvPr>
+              <p:cNvSpPr txBox="1"/>
+              <p:nvPr/>
+            </p:nvSpPr>
+            <p:spPr>
+              <a:xfrm>
+                <a:off x="2718083" y="4788582"/>
+                <a:ext cx="2902974" cy="529697"/>
+              </a:xfrm>
+              <a:prstGeom prst="rect">
+                <a:avLst/>
+              </a:prstGeom>
+              <a:noFill/>
+            </p:spPr>
+            <p:txBody>
+              <a:bodyPr wrap="none" lIns="0" tIns="0" rIns="0" bIns="0" rtlCol="0">
+                <a:spAutoFit/>
+              </a:bodyPr>
+              <a:lstStyle/>
+              <a:p>
+                <a:pPr/>
+                <a14:m>
+                  <m:oMathPara xmlns:m="http://schemas.openxmlformats.org/officeDocument/2006/math">
+                    <m:oMathParaPr>
+                      <m:jc m:val="centerGroup"/>
+                    </m:oMathParaPr>
+                    <m:oMath xmlns:m="http://schemas.openxmlformats.org/officeDocument/2006/math">
+                      <m:r>
+                        <a:rPr lang="en-GB" i="1">
+                          <a:solidFill>
+                            <a:srgbClr val="FF0000"/>
+                          </a:solidFill>
+                          <a:latin typeface="Cambria Math" panose="02040503050406030204" pitchFamily="18" charset="0"/>
+                        </a:rPr>
+                        <m:t>𝑓</m:t>
+                      </m:r>
+                      <m:r>
+                        <a:rPr lang="en-GB" i="1" baseline="-25000">
+                          <a:solidFill>
+                            <a:srgbClr val="FF0000"/>
+                          </a:solidFill>
+                          <a:latin typeface="Cambria Math" panose="02040503050406030204" pitchFamily="18" charset="0"/>
+                        </a:rPr>
+                        <m:t>1</m:t>
+                      </m:r>
+                      <m:r>
+                        <a:rPr lang="en-GB" i="1">
+                          <a:solidFill>
+                            <a:srgbClr val="FF0000"/>
+                          </a:solidFill>
+                          <a:latin typeface="Cambria Math" panose="02040503050406030204" pitchFamily="18" charset="0"/>
+                        </a:rPr>
+                        <m:t>(</m:t>
+                      </m:r>
+                      <m:r>
+                        <a:rPr lang="en-GB" i="1">
+                          <a:solidFill>
+                            <a:srgbClr val="FF0000"/>
+                          </a:solidFill>
+                          <a:latin typeface="Cambria Math" panose="02040503050406030204" pitchFamily="18" charset="0"/>
+                        </a:rPr>
+                        <m:t>𝑇𝑚</m:t>
+                      </m:r>
+                      <m:r>
+                        <a:rPr lang="en-GB" i="1" baseline="-25000">
+                          <a:solidFill>
+                            <a:srgbClr val="FF0000"/>
+                          </a:solidFill>
+                          <a:latin typeface="Cambria Math" panose="02040503050406030204" pitchFamily="18" charset="0"/>
+                        </a:rPr>
+                        <m:t>𝑖𝑛</m:t>
+                      </m:r>
+                      <m:r>
+                        <a:rPr lang="en-GB" i="1">
+                          <a:solidFill>
+                            <a:srgbClr val="FF0000"/>
+                          </a:solidFill>
+                          <a:latin typeface="Cambria Math" panose="02040503050406030204" pitchFamily="18" charset="0"/>
+                        </a:rPr>
+                        <m:t>)</m:t>
+                      </m:r>
+                      <m:r>
+                        <a:rPr lang="en-US" i="1">
+                          <a:solidFill>
+                            <a:srgbClr val="FF0000"/>
+                          </a:solidFill>
+                          <a:latin typeface="Cambria Math" panose="02040503050406030204" pitchFamily="18" charset="0"/>
+                        </a:rPr>
+                        <m:t>=</m:t>
+                      </m:r>
+                      <m:f>
+                        <m:fPr>
+                          <m:ctrlPr>
+                            <a:rPr lang="en-US" i="1">
+                              <a:solidFill>
+                                <a:srgbClr val="FF0000"/>
+                              </a:solidFill>
+                              <a:latin typeface="Cambria Math" panose="02040503050406030204" pitchFamily="18" charset="0"/>
+                            </a:rPr>
+                          </m:ctrlPr>
+                        </m:fPr>
+                        <m:num>
+                          <m:r>
+                            <a:rPr lang="en-GB" i="1">
+                              <a:solidFill>
+                                <a:srgbClr val="FF0000"/>
+                              </a:solidFill>
+                              <a:latin typeface="Cambria Math" panose="02040503050406030204" pitchFamily="18" charset="0"/>
+                            </a:rPr>
+                            <m:t>1</m:t>
+                          </m:r>
+                        </m:num>
+                        <m:den>
+                          <m:r>
+                            <a:rPr lang="en-GB" i="1">
+                              <a:solidFill>
+                                <a:srgbClr val="FF0000"/>
+                              </a:solidFill>
+                              <a:latin typeface="Cambria Math" panose="02040503050406030204" pitchFamily="18" charset="0"/>
+                            </a:rPr>
+                            <m:t>1+</m:t>
+                          </m:r>
+                          <m:sSup>
+                            <m:sSupPr>
+                              <m:ctrlPr>
+                                <a:rPr lang="en-GB" i="1">
+                                  <a:solidFill>
+                                    <a:srgbClr val="FF0000"/>
+                                  </a:solidFill>
+                                  <a:latin typeface="Cambria Math" panose="02040503050406030204" pitchFamily="18" charset="0"/>
+                                </a:rPr>
+                              </m:ctrlPr>
+                            </m:sSupPr>
+                            <m:e>
+                              <m:r>
+                                <a:rPr lang="en-GB" i="1">
+                                  <a:solidFill>
+                                    <a:srgbClr val="FF0000"/>
+                                  </a:solidFill>
+                                  <a:latin typeface="Cambria Math" panose="02040503050406030204" pitchFamily="18" charset="0"/>
+                                </a:rPr>
+                                <m:t>𝑒</m:t>
+                              </m:r>
+                            </m:e>
+                            <m:sup>
+                              <m:r>
+                                <a:rPr lang="en-GB" i="1">
+                                  <a:solidFill>
+                                    <a:srgbClr val="FF0000"/>
+                                  </a:solidFill>
+                                  <a:latin typeface="Cambria Math" panose="02040503050406030204" pitchFamily="18" charset="0"/>
+                                </a:rPr>
+                                <m:t>−</m:t>
+                              </m:r>
+                              <m:sSub>
+                                <m:sSubPr>
+                                  <m:ctrlPr>
+                                    <a:rPr lang="en-GB" i="1">
+                                      <a:solidFill>
+                                        <a:srgbClr val="FF0000"/>
+                                      </a:solidFill>
+                                      <a:latin typeface="Cambria Math" panose="02040503050406030204" pitchFamily="18" charset="0"/>
+                                    </a:rPr>
+                                  </m:ctrlPr>
+                                </m:sSubPr>
+                                <m:e>
+                                  <m:r>
+                                    <a:rPr lang="en-GB" i="1">
+                                      <a:solidFill>
+                                        <a:srgbClr val="FF0000"/>
+                                      </a:solidFill>
+                                      <a:latin typeface="Cambria Math" panose="02040503050406030204" pitchFamily="18" charset="0"/>
+                                    </a:rPr>
+                                    <m:t>𝑏</m:t>
+                                  </m:r>
+                                </m:e>
+                                <m:sub>
+                                  <m:r>
+                                    <a:rPr lang="en-GB" i="1">
+                                      <a:solidFill>
+                                        <a:srgbClr val="FF0000"/>
+                                      </a:solidFill>
+                                      <a:latin typeface="Cambria Math" panose="02040503050406030204" pitchFamily="18" charset="0"/>
+                                    </a:rPr>
+                                    <m:t>1</m:t>
+                                  </m:r>
+                                </m:sub>
+                              </m:sSub>
+                              <m:r>
+                                <a:rPr lang="en-GB" i="1">
+                                  <a:solidFill>
+                                    <a:srgbClr val="FF0000"/>
+                                  </a:solidFill>
+                                  <a:latin typeface="Cambria Math" panose="02040503050406030204" pitchFamily="18" charset="0"/>
+                                </a:rPr>
+                                <m:t>(</m:t>
+                              </m:r>
+                              <m:sSub>
+                                <m:sSubPr>
+                                  <m:ctrlPr>
+                                    <a:rPr lang="en-GB" i="1">
+                                      <a:solidFill>
+                                        <a:srgbClr val="FF0000"/>
+                                      </a:solidFill>
+                                      <a:latin typeface="Cambria Math" panose="02040503050406030204" pitchFamily="18" charset="0"/>
+                                    </a:rPr>
+                                  </m:ctrlPr>
+                                </m:sSubPr>
+                                <m:e>
+                                  <m:r>
+                                    <a:rPr lang="en-GB" i="1">
+                                      <a:solidFill>
+                                        <a:srgbClr val="FF0000"/>
+                                      </a:solidFill>
+                                      <a:latin typeface="Cambria Math" panose="02040503050406030204" pitchFamily="18" charset="0"/>
+                                    </a:rPr>
+                                    <m:t>𝑇</m:t>
+                                  </m:r>
+                                </m:e>
+                                <m:sub>
+                                  <m:r>
+                                    <a:rPr lang="en-GB" i="1">
+                                      <a:solidFill>
+                                        <a:srgbClr val="FF0000"/>
+                                      </a:solidFill>
+                                      <a:latin typeface="Cambria Math" panose="02040503050406030204" pitchFamily="18" charset="0"/>
+                                    </a:rPr>
+                                    <m:t>𝑚𝑖𝑛</m:t>
+                                  </m:r>
+                                </m:sub>
+                              </m:sSub>
+                              <m:r>
+                                <a:rPr lang="en-GB" i="1">
+                                  <a:solidFill>
+                                    <a:srgbClr val="FF0000"/>
+                                  </a:solidFill>
+                                  <a:latin typeface="Cambria Math" panose="02040503050406030204" pitchFamily="18" charset="0"/>
+                                </a:rPr>
+                                <m:t> −</m:t>
+                              </m:r>
+                              <m:sSub>
+                                <m:sSubPr>
+                                  <m:ctrlPr>
+                                    <a:rPr lang="en-GB" i="1">
+                                      <a:solidFill>
+                                        <a:srgbClr val="FF0000"/>
+                                      </a:solidFill>
+                                      <a:latin typeface="Cambria Math" panose="02040503050406030204" pitchFamily="18" charset="0"/>
+                                    </a:rPr>
+                                  </m:ctrlPr>
+                                </m:sSubPr>
+                                <m:e>
+                                  <m:r>
+                                    <a:rPr lang="en-GB" i="1">
+                                      <a:solidFill>
+                                        <a:srgbClr val="FF0000"/>
+                                      </a:solidFill>
+                                      <a:latin typeface="Cambria Math" panose="02040503050406030204" pitchFamily="18" charset="0"/>
+                                    </a:rPr>
+                                    <m:t>𝑎</m:t>
+                                  </m:r>
+                                </m:e>
+                                <m:sub>
+                                  <m:r>
+                                    <a:rPr lang="en-GB" i="1">
+                                      <a:solidFill>
+                                        <a:srgbClr val="FF0000"/>
+                                      </a:solidFill>
+                                      <a:latin typeface="Cambria Math" panose="02040503050406030204" pitchFamily="18" charset="0"/>
+                                    </a:rPr>
+                                    <m:t>1</m:t>
+                                  </m:r>
+                                </m:sub>
+                              </m:sSub>
+                              <m:r>
+                                <a:rPr lang="en-GB" i="1">
+                                  <a:solidFill>
+                                    <a:srgbClr val="FF0000"/>
+                                  </a:solidFill>
+                                  <a:latin typeface="Cambria Math" panose="02040503050406030204" pitchFamily="18" charset="0"/>
+                                </a:rPr>
+                                <m:t>)</m:t>
+                              </m:r>
+                            </m:sup>
+                          </m:sSup>
+                        </m:den>
+                      </m:f>
+                    </m:oMath>
+                  </m:oMathPara>
+                </a14:m>
+                <a:endParaRPr lang="de-CH" dirty="0"/>
+              </a:p>
+            </p:txBody>
+          </p:sp>
+        </mc:Choice>
+        <mc:Fallback>
+          <p:sp>
+            <p:nvSpPr>
+              <p:cNvPr id="32" name="TextBox 31">
+                <a:extLst>
+                  <a:ext uri="{FF2B5EF4-FFF2-40B4-BE49-F238E27FC236}">
+                    <a16:creationId xmlns:a16="http://schemas.microsoft.com/office/drawing/2014/main" id="{9FB05A5C-8C91-4292-9632-302A3C4A7E39}"/>
+                  </a:ext>
+                </a:extLst>
+              </p:cNvPr>
+              <p:cNvSpPr txBox="1">
+                <a:spLocks noRot="1" noChangeAspect="1" noMove="1" noResize="1" noEditPoints="1" noAdjustHandles="1" noChangeArrowheads="1" noChangeShapeType="1" noTextEdit="1"/>
+              </p:cNvSpPr>
+              <p:nvPr/>
+            </p:nvSpPr>
+            <p:spPr>
+              <a:xfrm>
+                <a:off x="2718083" y="4788582"/>
+                <a:ext cx="2902974" cy="529697"/>
+              </a:xfrm>
+              <a:prstGeom prst="rect">
+                <a:avLst/>
+              </a:prstGeom>
+              <a:blipFill>
+                <a:blip r:embed="rId4"/>
+                <a:stretch>
+                  <a:fillRect/>
+                </a:stretch>
+              </a:blipFill>
+            </p:spPr>
+            <p:txBody>
+              <a:bodyPr/>
+              <a:lstStyle/>
+              <a:p>
+                <a:r>
+                  <a:rPr lang="de-CH">
+                    <a:noFill/>
+                  </a:rPr>
+                  <a:t> </a:t>
+                </a:r>
+              </a:p>
+            </p:txBody>
+          </p:sp>
+        </mc:Fallback>
+      </mc:AlternateContent>
       <p:cxnSp>
         <p:nvCxnSpPr>
-          <p:cNvPr id="20" name="Straight Connector 19">
+          <p:cNvPr id="22" name="Straight Arrow Connector 21">
             <a:extLst>
               <a:ext uri="{FF2B5EF4-FFF2-40B4-BE49-F238E27FC236}">
-                <a16:creationId xmlns:a16="http://schemas.microsoft.com/office/drawing/2014/main" id="{5217F54C-EA0B-47EC-8D8C-626BF8B114EC}"/>
+                <a16:creationId xmlns:a16="http://schemas.microsoft.com/office/drawing/2014/main" id="{3068E15A-17EB-4588-96BD-1D56C37D5CD6}"/>
               </a:ext>
             </a:extLst>
           </p:cNvPr>
@@ -3836,138 +5604,9 @@
           <p:nvPr/>
         </p:nvCxnSpPr>
         <p:spPr>
-          <a:xfrm>
-            <a:off x="2627453" y="6220141"/>
-            <a:ext cx="0" cy="816423"/>
-          </a:xfrm>
-          <a:prstGeom prst="line">
-            <a:avLst/>
-          </a:prstGeom>
-          <a:ln w="19050">
-            <a:solidFill>
-              <a:schemeClr val="tx1"/>
-            </a:solidFill>
-          </a:ln>
-        </p:spPr>
-        <p:style>
-          <a:lnRef idx="1">
-            <a:schemeClr val="accent1"/>
-          </a:lnRef>
-          <a:fillRef idx="0">
-            <a:schemeClr val="accent1"/>
-          </a:fillRef>
-          <a:effectRef idx="0">
-            <a:schemeClr val="accent1"/>
-          </a:effectRef>
-          <a:fontRef idx="minor">
-            <a:schemeClr val="tx1"/>
-          </a:fontRef>
-        </p:style>
-      </p:cxnSp>
-      <p:cxnSp>
-        <p:nvCxnSpPr>
-          <p:cNvPr id="21" name="Straight Connector 20">
-            <a:extLst>
-              <a:ext uri="{FF2B5EF4-FFF2-40B4-BE49-F238E27FC236}">
-                <a16:creationId xmlns:a16="http://schemas.microsoft.com/office/drawing/2014/main" id="{CEDAD0B6-770E-4F87-933E-2C46FBA591FF}"/>
-              </a:ext>
-            </a:extLst>
-          </p:cNvPr>
-          <p:cNvCxnSpPr>
-            <a:cxnSpLocks/>
-          </p:cNvCxnSpPr>
-          <p:nvPr/>
-        </p:nvCxnSpPr>
-        <p:spPr>
-          <a:xfrm>
-            <a:off x="5290326" y="6220141"/>
-            <a:ext cx="0" cy="319274"/>
-          </a:xfrm>
-          <a:prstGeom prst="line">
-            <a:avLst/>
-          </a:prstGeom>
-          <a:ln w="19050">
-            <a:solidFill>
-              <a:schemeClr val="tx1"/>
-            </a:solidFill>
-          </a:ln>
-        </p:spPr>
-        <p:style>
-          <a:lnRef idx="1">
-            <a:schemeClr val="accent1"/>
-          </a:lnRef>
-          <a:fillRef idx="0">
-            <a:schemeClr val="accent1"/>
-          </a:fillRef>
-          <a:effectRef idx="0">
-            <a:schemeClr val="accent1"/>
-          </a:effectRef>
-          <a:fontRef idx="minor">
-            <a:schemeClr val="tx1"/>
-          </a:fontRef>
-        </p:style>
-      </p:cxnSp>
-      <p:cxnSp>
-        <p:nvCxnSpPr>
-          <p:cNvPr id="28" name="Straight Connector 27">
-            <a:extLst>
-              <a:ext uri="{FF2B5EF4-FFF2-40B4-BE49-F238E27FC236}">
-                <a16:creationId xmlns:a16="http://schemas.microsoft.com/office/drawing/2014/main" id="{A90AC91F-8522-4245-BDF1-50713A9DC6DB}"/>
-              </a:ext>
-            </a:extLst>
-          </p:cNvPr>
-          <p:cNvCxnSpPr>
-            <a:cxnSpLocks/>
-          </p:cNvCxnSpPr>
-          <p:nvPr/>
-        </p:nvCxnSpPr>
-        <p:spPr>
-          <a:xfrm>
-            <a:off x="9111205" y="1738131"/>
-            <a:ext cx="0" cy="4801284"/>
-          </a:xfrm>
-          <a:prstGeom prst="line">
-            <a:avLst/>
-          </a:prstGeom>
-          <a:ln w="19050">
-            <a:solidFill>
-              <a:schemeClr val="tx1"/>
-            </a:solidFill>
-          </a:ln>
-        </p:spPr>
-        <p:style>
-          <a:lnRef idx="1">
-            <a:schemeClr val="accent1"/>
-          </a:lnRef>
-          <a:fillRef idx="0">
-            <a:schemeClr val="accent1"/>
-          </a:fillRef>
-          <a:effectRef idx="0">
-            <a:schemeClr val="accent1"/>
-          </a:effectRef>
-          <a:fontRef idx="minor">
-            <a:schemeClr val="tx1"/>
-          </a:fontRef>
-        </p:style>
-      </p:cxnSp>
-      <p:cxnSp>
-        <p:nvCxnSpPr>
-          <p:cNvPr id="37" name="Straight Arrow Connector 36">
-            <a:extLst>
-              <a:ext uri="{FF2B5EF4-FFF2-40B4-BE49-F238E27FC236}">
-                <a16:creationId xmlns:a16="http://schemas.microsoft.com/office/drawing/2014/main" id="{2583D65C-B1C4-4653-A8F3-CC5CAE3BCC2D}"/>
-              </a:ext>
-            </a:extLst>
-          </p:cNvPr>
-          <p:cNvCxnSpPr>
-            <a:cxnSpLocks/>
-          </p:cNvCxnSpPr>
-          <p:nvPr/>
-        </p:nvCxnSpPr>
-        <p:spPr>
-          <a:xfrm>
-            <a:off x="2627453" y="6379778"/>
-            <a:ext cx="2672519" cy="0"/>
+          <a:xfrm flipV="1">
+            <a:off x="8479797" y="1641026"/>
+            <a:ext cx="801997" cy="667096"/>
           </a:xfrm>
           <a:prstGeom prst="straightConnector1">
             <a:avLst/>
@@ -3976,7 +5615,6 @@
             <a:solidFill>
               <a:schemeClr val="tx1"/>
             </a:solidFill>
-            <a:headEnd type="triangle"/>
             <a:tailEnd type="triangle"/>
           </a:ln>
         </p:spPr>
@@ -3995,164 +5633,12 @@
           </a:fontRef>
         </p:style>
       </p:cxnSp>
-      <p:cxnSp>
-        <p:nvCxnSpPr>
-          <p:cNvPr id="39" name="Straight Arrow Connector 38">
+      <p:sp>
+        <p:nvSpPr>
+          <p:cNvPr id="23" name="TextBox 22">
             <a:extLst>
               <a:ext uri="{FF2B5EF4-FFF2-40B4-BE49-F238E27FC236}">
-                <a16:creationId xmlns:a16="http://schemas.microsoft.com/office/drawing/2014/main" id="{B2D1828C-A324-4026-B65A-516FD5E3EECA}"/>
-              </a:ext>
-            </a:extLst>
-          </p:cNvPr>
-          <p:cNvCxnSpPr>
-            <a:cxnSpLocks/>
-          </p:cNvCxnSpPr>
-          <p:nvPr/>
-        </p:nvCxnSpPr>
-        <p:spPr>
-          <a:xfrm>
-            <a:off x="5362113" y="6379778"/>
-            <a:ext cx="3749092" cy="0"/>
-          </a:xfrm>
-          <a:prstGeom prst="straightConnector1">
-            <a:avLst/>
-          </a:prstGeom>
-          <a:ln w="19050">
-            <a:solidFill>
-              <a:schemeClr val="tx1"/>
-            </a:solidFill>
-            <a:headEnd type="triangle"/>
-            <a:tailEnd type="triangle"/>
-          </a:ln>
-        </p:spPr>
-        <p:style>
-          <a:lnRef idx="1">
-            <a:schemeClr val="accent1"/>
-          </a:lnRef>
-          <a:fillRef idx="0">
-            <a:schemeClr val="accent1"/>
-          </a:fillRef>
-          <a:effectRef idx="0">
-            <a:schemeClr val="accent1"/>
-          </a:effectRef>
-          <a:fontRef idx="minor">
-            <a:schemeClr val="tx1"/>
-          </a:fontRef>
-        </p:style>
-      </p:cxnSp>
-      <p:sp>
-        <p:nvSpPr>
-          <p:cNvPr id="42" name="Rectangle: Rounded Corners 41">
-            <a:extLst>
-              <a:ext uri="{FF2B5EF4-FFF2-40B4-BE49-F238E27FC236}">
-                <a16:creationId xmlns:a16="http://schemas.microsoft.com/office/drawing/2014/main" id="{7E8125E0-ED72-4F5B-B2B6-29AE42437AD0}"/>
-              </a:ext>
-            </a:extLst>
-          </p:cNvPr>
-          <p:cNvSpPr/>
-          <p:nvPr/>
-        </p:nvSpPr>
-        <p:spPr>
-          <a:xfrm>
-            <a:off x="3246083" y="6095302"/>
-            <a:ext cx="1435260" cy="522651"/>
-          </a:xfrm>
-          <a:prstGeom prst="roundRect">
-            <a:avLst/>
-          </a:prstGeom>
-          <a:solidFill>
-            <a:srgbClr val="FFCCCC"/>
-          </a:solidFill>
-          <a:ln>
-            <a:noFill/>
-          </a:ln>
-        </p:spPr>
-        <p:style>
-          <a:lnRef idx="2">
-            <a:schemeClr val="accent1">
-              <a:shade val="50000"/>
-            </a:schemeClr>
-          </a:lnRef>
-          <a:fillRef idx="1">
-            <a:schemeClr val="accent1"/>
-          </a:fillRef>
-          <a:effectRef idx="0">
-            <a:schemeClr val="accent1"/>
-          </a:effectRef>
-          <a:fontRef idx="minor">
-            <a:schemeClr val="lt1"/>
-          </a:fontRef>
-        </p:style>
-        <p:txBody>
-          <a:bodyPr rtlCol="0" anchor="ctr"/>
-          <a:lstStyle/>
-          <a:p>
-            <a:pPr algn="ctr"/>
-            <a:endParaRPr lang="de-CH"/>
-          </a:p>
-        </p:txBody>
-      </p:sp>
-      <p:sp>
-        <p:nvSpPr>
-          <p:cNvPr id="43" name="Rectangle: Rounded Corners 42">
-            <a:extLst>
-              <a:ext uri="{FF2B5EF4-FFF2-40B4-BE49-F238E27FC236}">
-                <a16:creationId xmlns:a16="http://schemas.microsoft.com/office/drawing/2014/main" id="{B8E10230-01E5-4F66-BBBB-DE52B9C816E4}"/>
-              </a:ext>
-            </a:extLst>
-          </p:cNvPr>
-          <p:cNvSpPr/>
-          <p:nvPr/>
-        </p:nvSpPr>
-        <p:spPr>
-          <a:xfrm>
-            <a:off x="6204583" y="6095301"/>
-            <a:ext cx="2064152" cy="522651"/>
-          </a:xfrm>
-          <a:prstGeom prst="roundRect">
-            <a:avLst/>
-          </a:prstGeom>
-          <a:solidFill>
-            <a:schemeClr val="accent6">
-              <a:lumMod val="40000"/>
-              <a:lumOff val="60000"/>
-            </a:schemeClr>
-          </a:solidFill>
-          <a:ln>
-            <a:noFill/>
-          </a:ln>
-        </p:spPr>
-        <p:style>
-          <a:lnRef idx="2">
-            <a:schemeClr val="accent1">
-              <a:shade val="50000"/>
-            </a:schemeClr>
-          </a:lnRef>
-          <a:fillRef idx="1">
-            <a:schemeClr val="accent1"/>
-          </a:fillRef>
-          <a:effectRef idx="0">
-            <a:schemeClr val="accent1"/>
-          </a:effectRef>
-          <a:fontRef idx="minor">
-            <a:schemeClr val="lt1"/>
-          </a:fontRef>
-        </p:style>
-        <p:txBody>
-          <a:bodyPr rtlCol="0" anchor="ctr"/>
-          <a:lstStyle/>
-          <a:p>
-            <a:pPr algn="ctr"/>
-            <a:endParaRPr lang="de-CH"/>
-          </a:p>
-        </p:txBody>
-      </p:sp>
-      <p:sp>
-        <p:nvSpPr>
-          <p:cNvPr id="44" name="TextBox 43">
-            <a:extLst>
-              <a:ext uri="{FF2B5EF4-FFF2-40B4-BE49-F238E27FC236}">
-                <a16:creationId xmlns:a16="http://schemas.microsoft.com/office/drawing/2014/main" id="{3125CA82-2369-402F-A1E9-AAF8A802A5CA}"/>
+                <a16:creationId xmlns:a16="http://schemas.microsoft.com/office/drawing/2014/main" id="{98CC8F19-43E1-4927-8A4D-0EEBF70B93F0}"/>
               </a:ext>
             </a:extLst>
           </p:cNvPr>
@@ -4161,8 +5647,8 @@
         </p:nvSpPr>
         <p:spPr>
           <a:xfrm>
-            <a:off x="3507911" y="6194960"/>
-            <a:ext cx="993650" cy="369332"/>
+            <a:off x="7677800" y="2248702"/>
+            <a:ext cx="1603994" cy="369332"/>
           </a:xfrm>
           <a:prstGeom prst="rect">
             <a:avLst/>
@@ -4177,43 +5663,7 @@
           <a:p>
             <a:r>
               <a:rPr lang="en-GB" b="1" dirty="0"/>
-              <a:t>Phase 1</a:t>
-            </a:r>
-            <a:endParaRPr lang="de-CH" b="1" dirty="0"/>
-          </a:p>
-        </p:txBody>
-      </p:sp>
-      <p:sp>
-        <p:nvSpPr>
-          <p:cNvPr id="45" name="TextBox 44">
-            <a:extLst>
-              <a:ext uri="{FF2B5EF4-FFF2-40B4-BE49-F238E27FC236}">
-                <a16:creationId xmlns:a16="http://schemas.microsoft.com/office/drawing/2014/main" id="{421F7FB2-F6A7-45CB-8E6A-654674173379}"/>
-              </a:ext>
-            </a:extLst>
-          </p:cNvPr>
-          <p:cNvSpPr txBox="1"/>
-          <p:nvPr/>
-        </p:nvSpPr>
-        <p:spPr>
-          <a:xfrm>
-            <a:off x="6750520" y="6194960"/>
-            <a:ext cx="938557" cy="369332"/>
-          </a:xfrm>
-          <a:prstGeom prst="rect">
-            <a:avLst/>
-          </a:prstGeom>
-          <a:noFill/>
-        </p:spPr>
-        <p:txBody>
-          <a:bodyPr wrap="square" rtlCol="0">
-            <a:spAutoFit/>
-          </a:bodyPr>
-          <a:lstStyle/>
-          <a:p>
-            <a:r>
-              <a:rPr lang="en-GB" b="1" dirty="0"/>
-              <a:t>Phase 2</a:t>
+              <a:t>peak of season</a:t>
             </a:r>
             <a:endParaRPr lang="de-CH" b="1" dirty="0"/>
           </a:p>
@@ -4222,7 +5672,7 @@
     </p:spTree>
     <p:extLst>
       <p:ext uri="{BB962C8B-B14F-4D97-AF65-F5344CB8AC3E}">
-        <p14:creationId xmlns:p14="http://schemas.microsoft.com/office/powerpoint/2010/main" val="42234680"/>
+        <p14:creationId xmlns:p14="http://schemas.microsoft.com/office/powerpoint/2010/main" val="3674435732"/>
       </p:ext>
     </p:extLst>
   </p:cSld>

</xml_diff>

<commit_message>
update the R code
</commit_message>
<xml_diff>
--- a/manuscript/figures/method_figures/Embed_stress_function.pptx
+++ b/manuscript/figures/method_figures/Embed_stress_function.pptx
@@ -2,13 +2,14 @@
 <file path=ppt/presentation.xml><?xml version="1.0" encoding="utf-8"?>
 <p:presentation xmlns:a="http://schemas.openxmlformats.org/drawingml/2006/main" xmlns:r="http://schemas.openxmlformats.org/officeDocument/2006/relationships" xmlns:p="http://schemas.openxmlformats.org/presentationml/2006/main" saveSubsetFonts="1">
   <p:sldMasterIdLst>
-    <p:sldMasterId id="2147483660" r:id="rId1"/>
+    <p:sldMasterId id="2147483684" r:id="rId1"/>
   </p:sldMasterIdLst>
   <p:sldIdLst>
     <p:sldId id="256" r:id="rId2"/>
     <p:sldId id="257" r:id="rId3"/>
+    <p:sldId id="258" r:id="rId4"/>
   </p:sldIdLst>
-  <p:sldSz cx="12192000" cy="8999538"/>
+  <p:sldSz cx="12599988" cy="8999538"/>
   <p:notesSz cx="6858000" cy="9144000"/>
   <p:defaultTextStyle>
     <a:defPPr>
@@ -142,8 +143,8 @@
         </p:nvSpPr>
         <p:spPr>
           <a:xfrm>
-            <a:off x="914400" y="1472842"/>
-            <a:ext cx="10363200" cy="3133172"/>
+            <a:off x="944999" y="1472842"/>
+            <a:ext cx="10709990" cy="3133172"/>
           </a:xfrm>
         </p:spPr>
         <p:txBody>
@@ -174,8 +175,8 @@
         </p:nvSpPr>
         <p:spPr>
           <a:xfrm>
-            <a:off x="1524000" y="4726842"/>
-            <a:ext cx="9144000" cy="2172804"/>
+            <a:off x="1574999" y="4726842"/>
+            <a:ext cx="9449991" cy="2172804"/>
           </a:xfrm>
         </p:spPr>
         <p:txBody>
@@ -244,7 +245,7 @@
           <a:p>
             <a:fld id="{A4ED8F4A-81C1-4420-9091-99CAD06994B2}" type="datetimeFigureOut">
               <a:rPr lang="de-CH" smtClean="0"/>
-              <a:t>13.04.2022</a:t>
+              <a:t>07.05.2022</a:t>
             </a:fld>
             <a:endParaRPr lang="de-CH"/>
           </a:p>
@@ -295,7 +296,7 @@
     </p:spTree>
     <p:extLst>
       <p:ext uri="{BB962C8B-B14F-4D97-AF65-F5344CB8AC3E}">
-        <p14:creationId xmlns:p14="http://schemas.microsoft.com/office/powerpoint/2010/main" val="1148344387"/>
+        <p14:creationId xmlns:p14="http://schemas.microsoft.com/office/powerpoint/2010/main" val="218196832"/>
       </p:ext>
     </p:extLst>
   </p:cSld>
@@ -414,7 +415,7 @@
           <a:p>
             <a:fld id="{A4ED8F4A-81C1-4420-9091-99CAD06994B2}" type="datetimeFigureOut">
               <a:rPr lang="de-CH" smtClean="0"/>
-              <a:t>13.04.2022</a:t>
+              <a:t>07.05.2022</a:t>
             </a:fld>
             <a:endParaRPr lang="de-CH"/>
           </a:p>
@@ -465,7 +466,7 @@
     </p:spTree>
     <p:extLst>
       <p:ext uri="{BB962C8B-B14F-4D97-AF65-F5344CB8AC3E}">
-        <p14:creationId xmlns:p14="http://schemas.microsoft.com/office/powerpoint/2010/main" val="260224431"/>
+        <p14:creationId xmlns:p14="http://schemas.microsoft.com/office/powerpoint/2010/main" val="3612133214"/>
       </p:ext>
     </p:extLst>
   </p:cSld>
@@ -504,8 +505,8 @@
         </p:nvSpPr>
         <p:spPr>
           <a:xfrm>
-            <a:off x="8724901" y="479142"/>
-            <a:ext cx="2628900" cy="7626692"/>
+            <a:off x="9016867" y="479142"/>
+            <a:ext cx="2716872" cy="7626692"/>
           </a:xfrm>
         </p:spPr>
         <p:txBody>
@@ -532,8 +533,8 @@
         </p:nvSpPr>
         <p:spPr>
           <a:xfrm>
-            <a:off x="838201" y="479142"/>
-            <a:ext cx="7734300" cy="7626692"/>
+            <a:off x="866250" y="479142"/>
+            <a:ext cx="7993117" cy="7626692"/>
           </a:xfrm>
         </p:spPr>
         <p:txBody>
@@ -594,7 +595,7 @@
           <a:p>
             <a:fld id="{A4ED8F4A-81C1-4420-9091-99CAD06994B2}" type="datetimeFigureOut">
               <a:rPr lang="de-CH" smtClean="0"/>
-              <a:t>13.04.2022</a:t>
+              <a:t>07.05.2022</a:t>
             </a:fld>
             <a:endParaRPr lang="de-CH"/>
           </a:p>
@@ -645,7 +646,7 @@
     </p:spTree>
     <p:extLst>
       <p:ext uri="{BB962C8B-B14F-4D97-AF65-F5344CB8AC3E}">
-        <p14:creationId xmlns:p14="http://schemas.microsoft.com/office/powerpoint/2010/main" val="3199709907"/>
+        <p14:creationId xmlns:p14="http://schemas.microsoft.com/office/powerpoint/2010/main" val="3340634855"/>
       </p:ext>
     </p:extLst>
   </p:cSld>
@@ -764,7 +765,7 @@
           <a:p>
             <a:fld id="{A4ED8F4A-81C1-4420-9091-99CAD06994B2}" type="datetimeFigureOut">
               <a:rPr lang="de-CH" smtClean="0"/>
-              <a:t>13.04.2022</a:t>
+              <a:t>07.05.2022</a:t>
             </a:fld>
             <a:endParaRPr lang="de-CH"/>
           </a:p>
@@ -815,7 +816,7 @@
     </p:spTree>
     <p:extLst>
       <p:ext uri="{BB962C8B-B14F-4D97-AF65-F5344CB8AC3E}">
-        <p14:creationId xmlns:p14="http://schemas.microsoft.com/office/powerpoint/2010/main" val="2476830823"/>
+        <p14:creationId xmlns:p14="http://schemas.microsoft.com/office/powerpoint/2010/main" val="1993943702"/>
       </p:ext>
     </p:extLst>
   </p:cSld>
@@ -854,8 +855,8 @@
         </p:nvSpPr>
         <p:spPr>
           <a:xfrm>
-            <a:off x="831851" y="2243638"/>
-            <a:ext cx="10515600" cy="3743557"/>
+            <a:off x="859687" y="2243638"/>
+            <a:ext cx="10867490" cy="3743557"/>
           </a:xfrm>
         </p:spPr>
         <p:txBody>
@@ -886,8 +887,8 @@
         </p:nvSpPr>
         <p:spPr>
           <a:xfrm>
-            <a:off x="831851" y="6022610"/>
-            <a:ext cx="10515600" cy="1968648"/>
+            <a:off x="859687" y="6022610"/>
+            <a:ext cx="10867490" cy="1968648"/>
           </a:xfrm>
         </p:spPr>
         <p:txBody>
@@ -1008,7 +1009,7 @@
           <a:p>
             <a:fld id="{A4ED8F4A-81C1-4420-9091-99CAD06994B2}" type="datetimeFigureOut">
               <a:rPr lang="de-CH" smtClean="0"/>
-              <a:t>13.04.2022</a:t>
+              <a:t>07.05.2022</a:t>
             </a:fld>
             <a:endParaRPr lang="de-CH"/>
           </a:p>
@@ -1059,7 +1060,7 @@
     </p:spTree>
     <p:extLst>
       <p:ext uri="{BB962C8B-B14F-4D97-AF65-F5344CB8AC3E}">
-        <p14:creationId xmlns:p14="http://schemas.microsoft.com/office/powerpoint/2010/main" val="1983635433"/>
+        <p14:creationId xmlns:p14="http://schemas.microsoft.com/office/powerpoint/2010/main" val="539148387"/>
       </p:ext>
     </p:extLst>
   </p:cSld>
@@ -1121,8 +1122,8 @@
         </p:nvSpPr>
         <p:spPr>
           <a:xfrm>
-            <a:off x="838200" y="2395710"/>
-            <a:ext cx="5181600" cy="5710124"/>
+            <a:off x="866249" y="2395710"/>
+            <a:ext cx="5354995" cy="5710124"/>
           </a:xfrm>
         </p:spPr>
         <p:txBody>
@@ -1178,8 +1179,8 @@
         </p:nvSpPr>
         <p:spPr>
           <a:xfrm>
-            <a:off x="6172200" y="2395710"/>
-            <a:ext cx="5181600" cy="5710124"/>
+            <a:off x="6378744" y="2395710"/>
+            <a:ext cx="5354995" cy="5710124"/>
           </a:xfrm>
         </p:spPr>
         <p:txBody>
@@ -1240,7 +1241,7 @@
           <a:p>
             <a:fld id="{A4ED8F4A-81C1-4420-9091-99CAD06994B2}" type="datetimeFigureOut">
               <a:rPr lang="de-CH" smtClean="0"/>
-              <a:t>13.04.2022</a:t>
+              <a:t>07.05.2022</a:t>
             </a:fld>
             <a:endParaRPr lang="de-CH"/>
           </a:p>
@@ -1291,7 +1292,7 @@
     </p:spTree>
     <p:extLst>
       <p:ext uri="{BB962C8B-B14F-4D97-AF65-F5344CB8AC3E}">
-        <p14:creationId xmlns:p14="http://schemas.microsoft.com/office/powerpoint/2010/main" val="2805292721"/>
+        <p14:creationId xmlns:p14="http://schemas.microsoft.com/office/powerpoint/2010/main" val="1067239521"/>
       </p:ext>
     </p:extLst>
   </p:cSld>
@@ -1330,8 +1331,8 @@
         </p:nvSpPr>
         <p:spPr>
           <a:xfrm>
-            <a:off x="839788" y="479144"/>
-            <a:ext cx="10515600" cy="1739495"/>
+            <a:off x="867890" y="479144"/>
+            <a:ext cx="10867490" cy="1739495"/>
           </a:xfrm>
         </p:spPr>
         <p:txBody>
@@ -1358,8 +1359,8 @@
         </p:nvSpPr>
         <p:spPr>
           <a:xfrm>
-            <a:off x="839789" y="2206137"/>
-            <a:ext cx="5157787" cy="1081194"/>
+            <a:off x="867892" y="2206137"/>
+            <a:ext cx="5330385" cy="1081194"/>
           </a:xfrm>
         </p:spPr>
         <p:txBody>
@@ -1423,8 +1424,8 @@
         </p:nvSpPr>
         <p:spPr>
           <a:xfrm>
-            <a:off x="839789" y="3287331"/>
-            <a:ext cx="5157787" cy="4835169"/>
+            <a:off x="867892" y="3287331"/>
+            <a:ext cx="5330385" cy="4835169"/>
           </a:xfrm>
         </p:spPr>
         <p:txBody>
@@ -1480,8 +1481,8 @@
         </p:nvSpPr>
         <p:spPr>
           <a:xfrm>
-            <a:off x="6172201" y="2206137"/>
-            <a:ext cx="5183188" cy="1081194"/>
+            <a:off x="6378745" y="2206137"/>
+            <a:ext cx="5356636" cy="1081194"/>
           </a:xfrm>
         </p:spPr>
         <p:txBody>
@@ -1545,8 +1546,8 @@
         </p:nvSpPr>
         <p:spPr>
           <a:xfrm>
-            <a:off x="6172201" y="3287331"/>
-            <a:ext cx="5183188" cy="4835169"/>
+            <a:off x="6378745" y="3287331"/>
+            <a:ext cx="5356636" cy="4835169"/>
           </a:xfrm>
         </p:spPr>
         <p:txBody>
@@ -1607,7 +1608,7 @@
           <a:p>
             <a:fld id="{A4ED8F4A-81C1-4420-9091-99CAD06994B2}" type="datetimeFigureOut">
               <a:rPr lang="de-CH" smtClean="0"/>
-              <a:t>13.04.2022</a:t>
+              <a:t>07.05.2022</a:t>
             </a:fld>
             <a:endParaRPr lang="de-CH"/>
           </a:p>
@@ -1658,7 +1659,7 @@
     </p:spTree>
     <p:extLst>
       <p:ext uri="{BB962C8B-B14F-4D97-AF65-F5344CB8AC3E}">
-        <p14:creationId xmlns:p14="http://schemas.microsoft.com/office/powerpoint/2010/main" val="3197863806"/>
+        <p14:creationId xmlns:p14="http://schemas.microsoft.com/office/powerpoint/2010/main" val="2209969875"/>
       </p:ext>
     </p:extLst>
   </p:cSld>
@@ -1725,7 +1726,7 @@
           <a:p>
             <a:fld id="{A4ED8F4A-81C1-4420-9091-99CAD06994B2}" type="datetimeFigureOut">
               <a:rPr lang="de-CH" smtClean="0"/>
-              <a:t>13.04.2022</a:t>
+              <a:t>07.05.2022</a:t>
             </a:fld>
             <a:endParaRPr lang="de-CH"/>
           </a:p>
@@ -1776,7 +1777,7 @@
     </p:spTree>
     <p:extLst>
       <p:ext uri="{BB962C8B-B14F-4D97-AF65-F5344CB8AC3E}">
-        <p14:creationId xmlns:p14="http://schemas.microsoft.com/office/powerpoint/2010/main" val="3200441826"/>
+        <p14:creationId xmlns:p14="http://schemas.microsoft.com/office/powerpoint/2010/main" val="3123079880"/>
       </p:ext>
     </p:extLst>
   </p:cSld>
@@ -1820,7 +1821,7 @@
           <a:p>
             <a:fld id="{A4ED8F4A-81C1-4420-9091-99CAD06994B2}" type="datetimeFigureOut">
               <a:rPr lang="de-CH" smtClean="0"/>
-              <a:t>13.04.2022</a:t>
+              <a:t>07.05.2022</a:t>
             </a:fld>
             <a:endParaRPr lang="de-CH"/>
           </a:p>
@@ -1871,7 +1872,7 @@
     </p:spTree>
     <p:extLst>
       <p:ext uri="{BB962C8B-B14F-4D97-AF65-F5344CB8AC3E}">
-        <p14:creationId xmlns:p14="http://schemas.microsoft.com/office/powerpoint/2010/main" val="2603879620"/>
+        <p14:creationId xmlns:p14="http://schemas.microsoft.com/office/powerpoint/2010/main" val="1135316084"/>
       </p:ext>
     </p:extLst>
   </p:cSld>
@@ -1910,8 +1911,8 @@
         </p:nvSpPr>
         <p:spPr>
           <a:xfrm>
-            <a:off x="839788" y="599969"/>
-            <a:ext cx="3932237" cy="2099892"/>
+            <a:off x="867890" y="599969"/>
+            <a:ext cx="4063824" cy="2099892"/>
           </a:xfrm>
         </p:spPr>
         <p:txBody>
@@ -1942,8 +1943,8 @@
         </p:nvSpPr>
         <p:spPr>
           <a:xfrm>
-            <a:off x="5183188" y="1295769"/>
-            <a:ext cx="6172200" cy="6395505"/>
+            <a:off x="5356636" y="1295769"/>
+            <a:ext cx="6378744" cy="6395505"/>
           </a:xfrm>
         </p:spPr>
         <p:txBody>
@@ -2027,8 +2028,8 @@
         </p:nvSpPr>
         <p:spPr>
           <a:xfrm>
-            <a:off x="839788" y="2699862"/>
-            <a:ext cx="3932237" cy="5001827"/>
+            <a:off x="867890" y="2699862"/>
+            <a:ext cx="4063824" cy="5001827"/>
           </a:xfrm>
         </p:spPr>
         <p:txBody>
@@ -2097,7 +2098,7 @@
           <a:p>
             <a:fld id="{A4ED8F4A-81C1-4420-9091-99CAD06994B2}" type="datetimeFigureOut">
               <a:rPr lang="de-CH" smtClean="0"/>
-              <a:t>13.04.2022</a:t>
+              <a:t>07.05.2022</a:t>
             </a:fld>
             <a:endParaRPr lang="de-CH"/>
           </a:p>
@@ -2148,7 +2149,7 @@
     </p:spTree>
     <p:extLst>
       <p:ext uri="{BB962C8B-B14F-4D97-AF65-F5344CB8AC3E}">
-        <p14:creationId xmlns:p14="http://schemas.microsoft.com/office/powerpoint/2010/main" val="1971603274"/>
+        <p14:creationId xmlns:p14="http://schemas.microsoft.com/office/powerpoint/2010/main" val="2060783252"/>
       </p:ext>
     </p:extLst>
   </p:cSld>
@@ -2187,8 +2188,8 @@
         </p:nvSpPr>
         <p:spPr>
           <a:xfrm>
-            <a:off x="839788" y="599969"/>
-            <a:ext cx="3932237" cy="2099892"/>
+            <a:off x="867890" y="599969"/>
+            <a:ext cx="4063824" cy="2099892"/>
           </a:xfrm>
         </p:spPr>
         <p:txBody>
@@ -2219,8 +2220,8 @@
         </p:nvSpPr>
         <p:spPr>
           <a:xfrm>
-            <a:off x="5183188" y="1295769"/>
-            <a:ext cx="6172200" cy="6395505"/>
+            <a:off x="5356636" y="1295769"/>
+            <a:ext cx="6378744" cy="6395505"/>
           </a:xfrm>
         </p:spPr>
         <p:txBody>
@@ -2284,8 +2285,8 @@
         </p:nvSpPr>
         <p:spPr>
           <a:xfrm>
-            <a:off x="839788" y="2699862"/>
-            <a:ext cx="3932237" cy="5001827"/>
+            <a:off x="867890" y="2699862"/>
+            <a:ext cx="4063824" cy="5001827"/>
           </a:xfrm>
         </p:spPr>
         <p:txBody>
@@ -2354,7 +2355,7 @@
           <a:p>
             <a:fld id="{A4ED8F4A-81C1-4420-9091-99CAD06994B2}" type="datetimeFigureOut">
               <a:rPr lang="de-CH" smtClean="0"/>
-              <a:t>13.04.2022</a:t>
+              <a:t>07.05.2022</a:t>
             </a:fld>
             <a:endParaRPr lang="de-CH"/>
           </a:p>
@@ -2405,7 +2406,7 @@
     </p:spTree>
     <p:extLst>
       <p:ext uri="{BB962C8B-B14F-4D97-AF65-F5344CB8AC3E}">
-        <p14:creationId xmlns:p14="http://schemas.microsoft.com/office/powerpoint/2010/main" val="2751068545"/>
+        <p14:creationId xmlns:p14="http://schemas.microsoft.com/office/powerpoint/2010/main" val="191828503"/>
       </p:ext>
     </p:extLst>
   </p:cSld>
@@ -2449,8 +2450,8 @@
         </p:nvSpPr>
         <p:spPr>
           <a:xfrm>
-            <a:off x="838200" y="479144"/>
-            <a:ext cx="10515600" cy="1739495"/>
+            <a:off x="866249" y="479144"/>
+            <a:ext cx="10867490" cy="1739495"/>
           </a:xfrm>
           <a:prstGeom prst="rect">
             <a:avLst/>
@@ -2482,8 +2483,8 @@
         </p:nvSpPr>
         <p:spPr>
           <a:xfrm>
-            <a:off x="838200" y="2395710"/>
-            <a:ext cx="10515600" cy="5710124"/>
+            <a:off x="866249" y="2395710"/>
+            <a:ext cx="10867490" cy="5710124"/>
           </a:xfrm>
           <a:prstGeom prst="rect">
             <a:avLst/>
@@ -2544,8 +2545,8 @@
         </p:nvSpPr>
         <p:spPr>
           <a:xfrm>
-            <a:off x="838200" y="8341240"/>
-            <a:ext cx="2743200" cy="479142"/>
+            <a:off x="866249" y="8341240"/>
+            <a:ext cx="2834997" cy="479142"/>
           </a:xfrm>
           <a:prstGeom prst="rect">
             <a:avLst/>
@@ -2567,7 +2568,7 @@
           <a:p>
             <a:fld id="{A4ED8F4A-81C1-4420-9091-99CAD06994B2}" type="datetimeFigureOut">
               <a:rPr lang="de-CH" smtClean="0"/>
-              <a:t>13.04.2022</a:t>
+              <a:t>07.05.2022</a:t>
             </a:fld>
             <a:endParaRPr lang="de-CH"/>
           </a:p>
@@ -2585,8 +2586,8 @@
         </p:nvSpPr>
         <p:spPr>
           <a:xfrm>
-            <a:off x="4038600" y="8341240"/>
-            <a:ext cx="4114800" cy="479142"/>
+            <a:off x="4173746" y="8341240"/>
+            <a:ext cx="4252496" cy="479142"/>
           </a:xfrm>
           <a:prstGeom prst="rect">
             <a:avLst/>
@@ -2622,8 +2623,8 @@
         </p:nvSpPr>
         <p:spPr>
           <a:xfrm>
-            <a:off x="8610600" y="8341240"/>
-            <a:ext cx="2743200" cy="479142"/>
+            <a:off x="8898742" y="8341240"/>
+            <a:ext cx="2834997" cy="479142"/>
           </a:xfrm>
           <a:prstGeom prst="rect">
             <a:avLst/>
@@ -2654,23 +2655,23 @@
     </p:spTree>
     <p:extLst>
       <p:ext uri="{BB962C8B-B14F-4D97-AF65-F5344CB8AC3E}">
-        <p14:creationId xmlns:p14="http://schemas.microsoft.com/office/powerpoint/2010/main" val="2631725099"/>
+        <p14:creationId xmlns:p14="http://schemas.microsoft.com/office/powerpoint/2010/main" val="1849512562"/>
       </p:ext>
     </p:extLst>
   </p:cSld>
   <p:clrMap bg1="lt1" tx1="dk1" bg2="lt2" tx2="dk2" accent1="accent1" accent2="accent2" accent3="accent3" accent4="accent4" accent5="accent5" accent6="accent6" hlink="hlink" folHlink="folHlink"/>
   <p:sldLayoutIdLst>
-    <p:sldLayoutId id="2147483661" r:id="rId1"/>
-    <p:sldLayoutId id="2147483662" r:id="rId2"/>
-    <p:sldLayoutId id="2147483663" r:id="rId3"/>
-    <p:sldLayoutId id="2147483664" r:id="rId4"/>
-    <p:sldLayoutId id="2147483665" r:id="rId5"/>
-    <p:sldLayoutId id="2147483666" r:id="rId6"/>
-    <p:sldLayoutId id="2147483667" r:id="rId7"/>
-    <p:sldLayoutId id="2147483668" r:id="rId8"/>
-    <p:sldLayoutId id="2147483669" r:id="rId9"/>
-    <p:sldLayoutId id="2147483670" r:id="rId10"/>
-    <p:sldLayoutId id="2147483671" r:id="rId11"/>
+    <p:sldLayoutId id="2147483685" r:id="rId1"/>
+    <p:sldLayoutId id="2147483686" r:id="rId2"/>
+    <p:sldLayoutId id="2147483687" r:id="rId3"/>
+    <p:sldLayoutId id="2147483688" r:id="rId4"/>
+    <p:sldLayoutId id="2147483689" r:id="rId5"/>
+    <p:sldLayoutId id="2147483690" r:id="rId6"/>
+    <p:sldLayoutId id="2147483691" r:id="rId7"/>
+    <p:sldLayoutId id="2147483692" r:id="rId8"/>
+    <p:sldLayoutId id="2147483693" r:id="rId9"/>
+    <p:sldLayoutId id="2147483694" r:id="rId10"/>
+    <p:sldLayoutId id="2147483695" r:id="rId11"/>
   </p:sldLayoutIdLst>
   <p:txStyles>
     <p:titleStyle>
@@ -2986,8 +2987,8 @@
         </p:nvGrpSpPr>
         <p:grpSpPr>
           <a:xfrm>
-            <a:off x="1180730" y="1355554"/>
-            <a:ext cx="8362765" cy="6511785"/>
+            <a:off x="1336084" y="1324441"/>
+            <a:ext cx="8445522" cy="6576225"/>
             <a:chOff x="1180730" y="276692"/>
             <a:chExt cx="8362765" cy="6511785"/>
           </a:xfrm>
@@ -3101,35 +3102,35 @@
             <a:lstStyle/>
             <a:p>
               <a:r>
-                <a:rPr lang="en-GB" dirty="0" err="1"/>
+                <a:rPr lang="en-GB" sz="1818" dirty="0" err="1"/>
                 <a:t>GDD</a:t>
               </a:r>
               <a:r>
-                <a:rPr lang="en-GB" baseline="-25000" dirty="0" err="1"/>
+                <a:rPr lang="en-GB" sz="1818" baseline="-25000" dirty="0" err="1"/>
                 <a:t>threshold</a:t>
               </a:r>
               <a:r>
-                <a:rPr lang="en-GB" baseline="-25000" dirty="0"/>
+                <a:rPr lang="en-GB" sz="1818" baseline="-25000" dirty="0"/>
                 <a:t> </a:t>
               </a:r>
               <a:r>
-                <a:rPr lang="en-GB" dirty="0"/>
+                <a:rPr lang="en-GB" sz="1818" dirty="0"/>
                 <a:t>(</a:t>
               </a:r>
               <a:r>
-                <a:rPr lang="en-GB" i="1" dirty="0"/>
+                <a:rPr lang="en-GB" sz="1818" i="1" dirty="0"/>
                 <a:t>k</a:t>
               </a:r>
               <a:r>
-                <a:rPr lang="en-GB" dirty="0"/>
+                <a:rPr lang="en-GB" sz="1818" dirty="0"/>
                 <a:t>)</a:t>
               </a:r>
-              <a:endParaRPr lang="de-CH" dirty="0"/>
+              <a:endParaRPr lang="de-CH" sz="1818" dirty="0"/>
             </a:p>
           </p:txBody>
         </p:sp>
-        <mc:AlternateContent xmlns:mc="http://schemas.openxmlformats.org/markup-compatibility/2006" xmlns:a14="http://schemas.microsoft.com/office/drawing/2010/main">
-          <mc:Choice Requires="a14">
+        <mc:AlternateContent xmlns:mc="http://schemas.openxmlformats.org/markup-compatibility/2006">
+          <mc:Choice xmlns:a14="http://schemas.microsoft.com/office/drawing/2010/main" Requires="a14">
             <p:sp>
               <p:nvSpPr>
                 <p:cNvPr id="15" name="TextBox 14">
@@ -3145,7 +3146,7 @@
               <p:spPr>
                 <a:xfrm>
                   <a:off x="2822996" y="2607820"/>
-                  <a:ext cx="2902974" cy="529697"/>
+                  <a:ext cx="3067828" cy="535211"/>
                 </a:xfrm>
                 <a:prstGeom prst="rect">
                   <a:avLst/>
@@ -3166,7 +3167,7 @@
                       </m:oMathParaPr>
                       <m:oMath xmlns:m="http://schemas.openxmlformats.org/officeDocument/2006/math">
                         <m:r>
-                          <a:rPr lang="en-GB" i="1">
+                          <a:rPr lang="en-GB" sz="1818" i="1">
                             <a:solidFill>
                               <a:srgbClr val="339933"/>
                             </a:solidFill>
@@ -3175,7 +3176,7 @@
                           <m:t>𝑓</m:t>
                         </m:r>
                         <m:r>
-                          <a:rPr lang="en-GB" i="1" baseline="-25000">
+                          <a:rPr lang="en-GB" sz="1818" i="1" baseline="-25000">
                             <a:solidFill>
                               <a:srgbClr val="339933"/>
                             </a:solidFill>
@@ -3184,7 +3185,7 @@
                           <m:t>2</m:t>
                         </m:r>
                         <m:r>
-                          <a:rPr lang="en-GB" i="1">
+                          <a:rPr lang="en-GB" sz="1818" i="1">
                             <a:solidFill>
                               <a:srgbClr val="339933"/>
                             </a:solidFill>
@@ -3193,7 +3194,7 @@
                           <m:t>(</m:t>
                         </m:r>
                         <m:r>
-                          <a:rPr lang="en-GB" i="1">
+                          <a:rPr lang="en-GB" sz="1818" i="1">
                             <a:solidFill>
                               <a:srgbClr val="339933"/>
                             </a:solidFill>
@@ -3202,27 +3203,18 @@
                           <m:t>𝑇𝑚𝑖𝑛</m:t>
                         </m:r>
                         <m:r>
-                          <a:rPr lang="en-GB" i="1">
+                          <a:rPr lang="en-GB" sz="1818" i="1">
                             <a:solidFill>
                               <a:srgbClr val="339933"/>
                             </a:solidFill>
                             <a:latin typeface="Cambria Math" panose="02040503050406030204" pitchFamily="18" charset="0"/>
                           </a:rPr>
-                          <m:t>)</m:t>
-                        </m:r>
-                        <m:r>
-                          <a:rPr lang="en-US" i="1">
-                            <a:solidFill>
-                              <a:srgbClr val="339933"/>
-                            </a:solidFill>
-                            <a:latin typeface="Cambria Math" panose="02040503050406030204" pitchFamily="18" charset="0"/>
-                          </a:rPr>
-                          <m:t>=</m:t>
+                          <m:t>)=</m:t>
                         </m:r>
                         <m:f>
                           <m:fPr>
                             <m:ctrlPr>
-                              <a:rPr lang="en-US" i="1">
+                              <a:rPr lang="en-US" sz="1818" i="1">
                                 <a:solidFill>
                                   <a:srgbClr val="339933"/>
                                 </a:solidFill>
@@ -3232,7 +3224,7 @@
                           </m:fPr>
                           <m:num>
                             <m:r>
-                              <a:rPr lang="en-GB" i="1">
+                              <a:rPr lang="en-GB" sz="1818" i="1">
                                 <a:solidFill>
                                   <a:srgbClr val="339933"/>
                                 </a:solidFill>
@@ -3243,7 +3235,7 @@
                           </m:num>
                           <m:den>
                             <m:r>
-                              <a:rPr lang="en-GB" i="1">
+                              <a:rPr lang="en-GB" sz="1818" i="1">
                                 <a:solidFill>
                                   <a:srgbClr val="339933"/>
                                 </a:solidFill>
@@ -3254,7 +3246,7 @@
                             <m:sSup>
                               <m:sSupPr>
                                 <m:ctrlPr>
-                                  <a:rPr lang="en-GB" i="1">
+                                  <a:rPr lang="en-GB" sz="1818" i="1">
                                     <a:solidFill>
                                       <a:srgbClr val="339933"/>
                                     </a:solidFill>
@@ -3264,7 +3256,7 @@
                               </m:sSupPr>
                               <m:e>
                                 <m:r>
-                                  <a:rPr lang="en-GB" i="1">
+                                  <a:rPr lang="en-GB" sz="1818" i="1">
                                     <a:solidFill>
                                       <a:srgbClr val="339933"/>
                                     </a:solidFill>
@@ -3275,7 +3267,7 @@
                               </m:e>
                               <m:sup>
                                 <m:r>
-                                  <a:rPr lang="en-GB" i="1">
+                                  <a:rPr lang="en-GB" sz="1818" i="1">
                                     <a:solidFill>
                                       <a:srgbClr val="339933"/>
                                     </a:solidFill>
@@ -3286,7 +3278,7 @@
                                 <m:sSub>
                                   <m:sSubPr>
                                     <m:ctrlPr>
-                                      <a:rPr lang="en-GB" i="1">
+                                      <a:rPr lang="en-GB" sz="1818" i="1">
                                         <a:solidFill>
                                           <a:srgbClr val="339933"/>
                                         </a:solidFill>
@@ -3296,7 +3288,7 @@
                                   </m:sSubPr>
                                   <m:e>
                                     <m:r>
-                                      <a:rPr lang="en-GB" i="1">
+                                      <a:rPr lang="en-GB" sz="1818" i="1">
                                         <a:solidFill>
                                           <a:srgbClr val="339933"/>
                                         </a:solidFill>
@@ -3307,7 +3299,7 @@
                                   </m:e>
                                   <m:sub>
                                     <m:r>
-                                      <a:rPr lang="en-GB" i="1">
+                                      <a:rPr lang="en-GB" sz="1818" i="1">
                                         <a:solidFill>
                                           <a:srgbClr val="339933"/>
                                         </a:solidFill>
@@ -3318,7 +3310,7 @@
                                   </m:sub>
                                 </m:sSub>
                                 <m:r>
-                                  <a:rPr lang="en-GB" i="1">
+                                  <a:rPr lang="en-GB" sz="1818" i="1">
                                     <a:solidFill>
                                       <a:srgbClr val="339933"/>
                                     </a:solidFill>
@@ -3329,7 +3321,7 @@
                                 <m:sSub>
                                   <m:sSubPr>
                                     <m:ctrlPr>
-                                      <a:rPr lang="en-GB" i="1">
+                                      <a:rPr lang="en-GB" sz="1818" i="1">
                                         <a:solidFill>
                                           <a:srgbClr val="339933"/>
                                         </a:solidFill>
@@ -3339,7 +3331,7 @@
                                   </m:sSubPr>
                                   <m:e>
                                     <m:r>
-                                      <a:rPr lang="en-GB" i="1">
+                                      <a:rPr lang="en-GB" sz="1818" i="1">
                                         <a:solidFill>
                                           <a:srgbClr val="339933"/>
                                         </a:solidFill>
@@ -3350,7 +3342,7 @@
                                   </m:e>
                                   <m:sub>
                                     <m:r>
-                                      <a:rPr lang="en-GB" i="1">
+                                      <a:rPr lang="en-GB" sz="1818" i="1">
                                         <a:solidFill>
                                           <a:srgbClr val="339933"/>
                                         </a:solidFill>
@@ -3361,7 +3353,7 @@
                                   </m:sub>
                                 </m:sSub>
                                 <m:r>
-                                  <a:rPr lang="en-GB" i="1">
+                                  <a:rPr lang="en-GB" sz="1818" i="1">
                                     <a:solidFill>
                                       <a:srgbClr val="339933"/>
                                     </a:solidFill>
@@ -3372,7 +3364,7 @@
                                 <m:sSub>
                                   <m:sSubPr>
                                     <m:ctrlPr>
-                                      <a:rPr lang="en-GB" i="1">
+                                      <a:rPr lang="en-GB" sz="1818" i="1">
                                         <a:solidFill>
                                           <a:srgbClr val="339933"/>
                                         </a:solidFill>
@@ -3382,7 +3374,7 @@
                                   </m:sSubPr>
                                   <m:e>
                                     <m:r>
-                                      <a:rPr lang="en-GB" i="1">
+                                      <a:rPr lang="en-GB" sz="1818" i="1">
                                         <a:solidFill>
                                           <a:srgbClr val="339933"/>
                                         </a:solidFill>
@@ -3393,7 +3385,7 @@
                                   </m:e>
                                   <m:sub>
                                     <m:r>
-                                      <a:rPr lang="en-GB" i="1">
+                                      <a:rPr lang="en-GB" sz="1818" i="1">
                                         <a:solidFill>
                                           <a:srgbClr val="339933"/>
                                         </a:solidFill>
@@ -3404,7 +3396,7 @@
                                   </m:sub>
                                 </m:sSub>
                                 <m:r>
-                                  <a:rPr lang="en-GB" i="1">
+                                  <a:rPr lang="en-GB" sz="1818" i="1">
                                     <a:solidFill>
                                       <a:srgbClr val="339933"/>
                                     </a:solidFill>
@@ -3419,12 +3411,12 @@
                       </m:oMath>
                     </m:oMathPara>
                   </a14:m>
-                  <a:endParaRPr lang="de-CH" dirty="0"/>
+                  <a:endParaRPr lang="de-CH" sz="1818" dirty="0"/>
                 </a:p>
               </p:txBody>
             </p:sp>
           </mc:Choice>
-          <mc:Fallback xmlns="">
+          <mc:Fallback>
             <p:sp>
               <p:nvSpPr>
                 <p:cNvPr id="15" name="TextBox 14">
@@ -3442,7 +3434,7 @@
               <p:spPr>
                 <a:xfrm>
                   <a:off x="2822996" y="2607820"/>
-                  <a:ext cx="2902974" cy="529697"/>
+                  <a:ext cx="3067828" cy="535211"/>
                 </a:xfrm>
                 <a:prstGeom prst="rect">
                   <a:avLst/>
@@ -3469,8 +3461,8 @@
             </p:sp>
           </mc:Fallback>
         </mc:AlternateContent>
-        <mc:AlternateContent xmlns:mc="http://schemas.openxmlformats.org/markup-compatibility/2006" xmlns:a14="http://schemas.microsoft.com/office/drawing/2010/main">
-          <mc:Choice Requires="a14">
+        <mc:AlternateContent xmlns:mc="http://schemas.openxmlformats.org/markup-compatibility/2006">
+          <mc:Choice xmlns:a14="http://schemas.microsoft.com/office/drawing/2010/main" Requires="a14">
             <p:sp>
               <p:nvSpPr>
                 <p:cNvPr id="17" name="TextBox 16">
@@ -3486,7 +3478,7 @@
               <p:spPr>
                 <a:xfrm>
                   <a:off x="2459138" y="4321922"/>
-                  <a:ext cx="2902974" cy="529697"/>
+                  <a:ext cx="3067828" cy="535211"/>
                 </a:xfrm>
                 <a:prstGeom prst="rect">
                   <a:avLst/>
@@ -3507,7 +3499,7 @@
                       </m:oMathParaPr>
                       <m:oMath xmlns:m="http://schemas.openxmlformats.org/officeDocument/2006/math">
                         <m:r>
-                          <a:rPr lang="en-GB" i="1">
+                          <a:rPr lang="en-GB" sz="1818" i="1">
                             <a:solidFill>
                               <a:srgbClr val="FF0000"/>
                             </a:solidFill>
@@ -3516,7 +3508,7 @@
                           <m:t>𝑓</m:t>
                         </m:r>
                         <m:r>
-                          <a:rPr lang="en-GB" i="1" baseline="-25000">
+                          <a:rPr lang="en-GB" sz="1818" i="1" baseline="-25000">
                             <a:solidFill>
                               <a:srgbClr val="FF0000"/>
                             </a:solidFill>
@@ -3525,7 +3517,7 @@
                           <m:t>1</m:t>
                         </m:r>
                         <m:r>
-                          <a:rPr lang="en-GB" i="1">
+                          <a:rPr lang="en-GB" sz="1818" i="1">
                             <a:solidFill>
                               <a:srgbClr val="FF0000"/>
                             </a:solidFill>
@@ -3534,7 +3526,7 @@
                           <m:t>(</m:t>
                         </m:r>
                         <m:r>
-                          <a:rPr lang="en-GB" i="1">
+                          <a:rPr lang="en-GB" sz="1818" i="1">
                             <a:solidFill>
                               <a:srgbClr val="FF0000"/>
                             </a:solidFill>
@@ -3543,27 +3535,18 @@
                           <m:t>𝑇𝑚𝑖𝑛</m:t>
                         </m:r>
                         <m:r>
-                          <a:rPr lang="en-GB" i="1">
+                          <a:rPr lang="en-GB" sz="1818" i="1">
                             <a:solidFill>
                               <a:srgbClr val="FF0000"/>
                             </a:solidFill>
                             <a:latin typeface="Cambria Math" panose="02040503050406030204" pitchFamily="18" charset="0"/>
                           </a:rPr>
-                          <m:t>)</m:t>
-                        </m:r>
-                        <m:r>
-                          <a:rPr lang="en-US" i="1">
-                            <a:solidFill>
-                              <a:srgbClr val="FF0000"/>
-                            </a:solidFill>
-                            <a:latin typeface="Cambria Math" panose="02040503050406030204" pitchFamily="18" charset="0"/>
-                          </a:rPr>
-                          <m:t>=</m:t>
+                          <m:t>)=</m:t>
                         </m:r>
                         <m:f>
                           <m:fPr>
                             <m:ctrlPr>
-                              <a:rPr lang="en-US" i="1">
+                              <a:rPr lang="en-US" sz="1818" i="1">
                                 <a:solidFill>
                                   <a:srgbClr val="FF0000"/>
                                 </a:solidFill>
@@ -3573,7 +3556,7 @@
                           </m:fPr>
                           <m:num>
                             <m:r>
-                              <a:rPr lang="en-GB" i="1">
+                              <a:rPr lang="en-GB" sz="1818" i="1">
                                 <a:solidFill>
                                   <a:srgbClr val="FF0000"/>
                                 </a:solidFill>
@@ -3584,7 +3567,7 @@
                           </m:num>
                           <m:den>
                             <m:r>
-                              <a:rPr lang="en-GB" i="1">
+                              <a:rPr lang="en-GB" sz="1818" i="1">
                                 <a:solidFill>
                                   <a:srgbClr val="FF0000"/>
                                 </a:solidFill>
@@ -3595,7 +3578,7 @@
                             <m:sSup>
                               <m:sSupPr>
                                 <m:ctrlPr>
-                                  <a:rPr lang="en-GB" i="1">
+                                  <a:rPr lang="en-GB" sz="1818" i="1">
                                     <a:solidFill>
                                       <a:srgbClr val="FF0000"/>
                                     </a:solidFill>
@@ -3605,7 +3588,7 @@
                               </m:sSupPr>
                               <m:e>
                                 <m:r>
-                                  <a:rPr lang="en-GB" i="1">
+                                  <a:rPr lang="en-GB" sz="1818" i="1">
                                     <a:solidFill>
                                       <a:srgbClr val="FF0000"/>
                                     </a:solidFill>
@@ -3616,7 +3599,7 @@
                               </m:e>
                               <m:sup>
                                 <m:r>
-                                  <a:rPr lang="en-GB" i="1">
+                                  <a:rPr lang="en-GB" sz="1818" i="1">
                                     <a:solidFill>
                                       <a:srgbClr val="FF0000"/>
                                     </a:solidFill>
@@ -3627,7 +3610,7 @@
                                 <m:sSub>
                                   <m:sSubPr>
                                     <m:ctrlPr>
-                                      <a:rPr lang="en-GB" i="1">
+                                      <a:rPr lang="en-GB" sz="1818" i="1">
                                         <a:solidFill>
                                           <a:srgbClr val="FF0000"/>
                                         </a:solidFill>
@@ -3637,7 +3620,7 @@
                                   </m:sSubPr>
                                   <m:e>
                                     <m:r>
-                                      <a:rPr lang="en-GB" i="1">
+                                      <a:rPr lang="en-GB" sz="1818" i="1">
                                         <a:solidFill>
                                           <a:srgbClr val="FF0000"/>
                                         </a:solidFill>
@@ -3648,7 +3631,7 @@
                                   </m:e>
                                   <m:sub>
                                     <m:r>
-                                      <a:rPr lang="en-GB" i="1">
+                                      <a:rPr lang="en-GB" sz="1818" i="1">
                                         <a:solidFill>
                                           <a:srgbClr val="FF0000"/>
                                         </a:solidFill>
@@ -3659,7 +3642,7 @@
                                   </m:sub>
                                 </m:sSub>
                                 <m:r>
-                                  <a:rPr lang="en-GB" i="1">
+                                  <a:rPr lang="en-GB" sz="1818" i="1">
                                     <a:solidFill>
                                       <a:srgbClr val="FF0000"/>
                                     </a:solidFill>
@@ -3670,7 +3653,7 @@
                                 <m:sSub>
                                   <m:sSubPr>
                                     <m:ctrlPr>
-                                      <a:rPr lang="en-GB" i="1">
+                                      <a:rPr lang="en-GB" sz="1818" i="1">
                                         <a:solidFill>
                                           <a:srgbClr val="FF0000"/>
                                         </a:solidFill>
@@ -3680,7 +3663,7 @@
                                   </m:sSubPr>
                                   <m:e>
                                     <m:r>
-                                      <a:rPr lang="en-GB" i="1">
+                                      <a:rPr lang="en-GB" sz="1818" i="1">
                                         <a:solidFill>
                                           <a:srgbClr val="FF0000"/>
                                         </a:solidFill>
@@ -3691,7 +3674,7 @@
                                   </m:e>
                                   <m:sub>
                                     <m:r>
-                                      <a:rPr lang="en-GB" i="1">
+                                      <a:rPr lang="en-GB" sz="1818" i="1">
                                         <a:solidFill>
                                           <a:srgbClr val="FF0000"/>
                                         </a:solidFill>
@@ -3702,7 +3685,7 @@
                                   </m:sub>
                                 </m:sSub>
                                 <m:r>
-                                  <a:rPr lang="en-GB" i="1">
+                                  <a:rPr lang="en-GB" sz="1818" i="1">
                                     <a:solidFill>
                                       <a:srgbClr val="FF0000"/>
                                     </a:solidFill>
@@ -3713,7 +3696,7 @@
                                 <m:sSub>
                                   <m:sSubPr>
                                     <m:ctrlPr>
-                                      <a:rPr lang="en-GB" i="1">
+                                      <a:rPr lang="en-GB" sz="1818" i="1">
                                         <a:solidFill>
                                           <a:srgbClr val="FF0000"/>
                                         </a:solidFill>
@@ -3723,7 +3706,7 @@
                                   </m:sSubPr>
                                   <m:e>
                                     <m:r>
-                                      <a:rPr lang="en-GB" i="1">
+                                      <a:rPr lang="en-GB" sz="1818" i="1">
                                         <a:solidFill>
                                           <a:srgbClr val="FF0000"/>
                                         </a:solidFill>
@@ -3734,7 +3717,7 @@
                                   </m:e>
                                   <m:sub>
                                     <m:r>
-                                      <a:rPr lang="en-GB" i="1">
+                                      <a:rPr lang="en-GB" sz="1818" i="1">
                                         <a:solidFill>
                                           <a:srgbClr val="FF0000"/>
                                         </a:solidFill>
@@ -3745,7 +3728,7 @@
                                   </m:sub>
                                 </m:sSub>
                                 <m:r>
-                                  <a:rPr lang="en-GB" i="1">
+                                  <a:rPr lang="en-GB" sz="1818" i="1">
                                     <a:solidFill>
                                       <a:srgbClr val="FF0000"/>
                                     </a:solidFill>
@@ -3760,12 +3743,12 @@
                       </m:oMath>
                     </m:oMathPara>
                   </a14:m>
-                  <a:endParaRPr lang="de-CH" dirty="0"/>
+                  <a:endParaRPr lang="de-CH" sz="1818" dirty="0"/>
                 </a:p>
               </p:txBody>
             </p:sp>
           </mc:Choice>
-          <mc:Fallback xmlns="">
+          <mc:Fallback>
             <p:sp>
               <p:nvSpPr>
                 <p:cNvPr id="17" name="TextBox 16">
@@ -3783,7 +3766,7 @@
               <p:spPr>
                 <a:xfrm>
                   <a:off x="2459138" y="4321922"/>
-                  <a:ext cx="2902974" cy="529697"/>
+                  <a:ext cx="3067828" cy="535211"/>
                 </a:xfrm>
                 <a:prstGeom prst="rect">
                   <a:avLst/>
@@ -3825,8 +3808,8 @@
         </p:nvGrpSpPr>
         <p:grpSpPr>
           <a:xfrm>
-            <a:off x="2627453" y="6095302"/>
-            <a:ext cx="2672519" cy="941262"/>
+            <a:off x="2797123" y="6111092"/>
+            <a:ext cx="2698966" cy="950577"/>
             <a:chOff x="2627453" y="6095302"/>
             <a:chExt cx="2672519" cy="941262"/>
           </a:xfrm>
@@ -4030,7 +4013,7 @@
               <a:lstStyle/>
               <a:p>
                 <a:pPr algn="ctr"/>
-                <a:endParaRPr lang="de-CH"/>
+                <a:endParaRPr lang="de-CH" sz="1818"/>
               </a:p>
             </p:txBody>
           </p:sp>
@@ -4063,10 +4046,10 @@
               <a:lstStyle/>
               <a:p>
                 <a:r>
-                  <a:rPr lang="en-GB" b="1" dirty="0"/>
+                  <a:rPr lang="en-GB" sz="1818" b="1" dirty="0"/>
                   <a:t>Phase 1</a:t>
                 </a:r>
-                <a:endParaRPr lang="de-CH" b="1" dirty="0"/>
+                <a:endParaRPr lang="de-CH" sz="1818" b="1" dirty="0"/>
               </a:p>
             </p:txBody>
           </p:sp>
@@ -4086,8 +4069,8 @@
         </p:nvGrpSpPr>
         <p:grpSpPr>
           <a:xfrm>
-            <a:off x="5362113" y="1738131"/>
-            <a:ext cx="3749092" cy="4879821"/>
+            <a:off x="5558845" y="1710804"/>
+            <a:ext cx="3786192" cy="4928111"/>
             <a:chOff x="5362113" y="1738131"/>
             <a:chExt cx="3749092" cy="4879821"/>
           </a:xfrm>
@@ -4231,7 +4214,7 @@
             <a:lstStyle/>
             <a:p>
               <a:pPr algn="ctr"/>
-              <a:endParaRPr lang="de-CH"/>
+              <a:endParaRPr lang="de-CH" sz="1818"/>
             </a:p>
           </p:txBody>
         </p:sp>
@@ -4264,10 +4247,10 @@
             <a:lstStyle/>
             <a:p>
               <a:r>
-                <a:rPr lang="en-GB" b="1" dirty="0"/>
+                <a:rPr lang="en-GB" sz="1818" b="1" dirty="0"/>
                 <a:t>Phase 2</a:t>
               </a:r>
-              <a:endParaRPr lang="de-CH" b="1" dirty="0"/>
+              <a:endParaRPr lang="de-CH" sz="1818" b="1" dirty="0"/>
             </a:p>
           </p:txBody>
         </p:sp>
@@ -4330,8 +4313,8 @@
         </p:blipFill>
         <p:spPr>
           <a:xfrm>
-            <a:off x="787579" y="1221900"/>
-            <a:ext cx="8967995" cy="6522178"/>
+            <a:off x="939043" y="1189463"/>
+            <a:ext cx="9056741" cy="6586720"/>
           </a:xfrm>
           <a:prstGeom prst="rect">
             <a:avLst/>
@@ -4352,8 +4335,8 @@
         </p:nvGrpSpPr>
         <p:grpSpPr>
           <a:xfrm>
-            <a:off x="2599057" y="5815428"/>
-            <a:ext cx="2743793" cy="941262"/>
+            <a:off x="2768447" y="5828448"/>
+            <a:ext cx="2770945" cy="950577"/>
             <a:chOff x="2627453" y="6095302"/>
             <a:chExt cx="2743793" cy="941262"/>
           </a:xfrm>
@@ -4557,7 +4540,7 @@
               <a:lstStyle/>
               <a:p>
                 <a:pPr algn="ctr"/>
-                <a:endParaRPr lang="de-CH"/>
+                <a:endParaRPr lang="de-CH" sz="1818"/>
               </a:p>
             </p:txBody>
           </p:sp>
@@ -4590,10 +4573,10 @@
               <a:lstStyle/>
               <a:p>
                 <a:r>
-                  <a:rPr lang="en-GB" b="1" dirty="0"/>
+                  <a:rPr lang="en-GB" sz="1818" b="1" dirty="0"/>
                   <a:t>Phase 1</a:t>
                 </a:r>
-                <a:endParaRPr lang="de-CH" b="1" dirty="0"/>
+                <a:endParaRPr lang="de-CH" sz="1818" b="1" dirty="0"/>
               </a:p>
             </p:txBody>
           </p:sp>
@@ -4613,8 +4596,8 @@
         </p:nvGrpSpPr>
         <p:grpSpPr>
           <a:xfrm>
-            <a:off x="5114980" y="6379704"/>
-            <a:ext cx="2237171" cy="746318"/>
+            <a:off x="5309266" y="6398309"/>
+            <a:ext cx="2259310" cy="753703"/>
             <a:chOff x="5060274" y="6594884"/>
             <a:chExt cx="2237171" cy="746318"/>
           </a:xfrm>
@@ -4692,30 +4675,30 @@
             <a:lstStyle/>
             <a:p>
               <a:r>
-                <a:rPr lang="en-GB" dirty="0" err="1"/>
+                <a:rPr lang="en-GB" sz="1818" dirty="0" err="1"/>
                 <a:t>GDD</a:t>
               </a:r>
               <a:r>
-                <a:rPr lang="en-GB" baseline="-25000" dirty="0" err="1"/>
+                <a:rPr lang="en-GB" sz="1818" baseline="-25000" dirty="0" err="1"/>
                 <a:t>threshold</a:t>
               </a:r>
               <a:r>
-                <a:rPr lang="en-GB" baseline="-25000" dirty="0"/>
+                <a:rPr lang="en-GB" sz="1818" baseline="-25000" dirty="0"/>
                 <a:t> </a:t>
               </a:r>
               <a:r>
-                <a:rPr lang="en-GB" dirty="0"/>
+                <a:rPr lang="en-GB" sz="1818" dirty="0"/>
                 <a:t>(</a:t>
               </a:r>
               <a:r>
-                <a:rPr lang="en-GB" i="1" dirty="0"/>
+                <a:rPr lang="en-GB" sz="1818" i="1" dirty="0"/>
                 <a:t>k</a:t>
               </a:r>
               <a:r>
-                <a:rPr lang="en-GB" dirty="0"/>
+                <a:rPr lang="en-GB" sz="1818" dirty="0"/>
                 <a:t>)</a:t>
               </a:r>
-              <a:endParaRPr lang="de-CH" dirty="0"/>
+              <a:endParaRPr lang="de-CH" sz="1818" dirty="0"/>
             </a:p>
           </p:txBody>
         </p:sp>
@@ -4734,8 +4717,8 @@
         </p:nvGrpSpPr>
         <p:grpSpPr>
           <a:xfrm>
-            <a:off x="5354677" y="1641026"/>
-            <a:ext cx="3927117" cy="4801284"/>
+            <a:off x="5551337" y="1612737"/>
+            <a:ext cx="3965979" cy="4848797"/>
             <a:chOff x="5362113" y="1641026"/>
             <a:chExt cx="3927117" cy="4801284"/>
           </a:xfrm>
@@ -4879,7 +4862,7 @@
             <a:lstStyle/>
             <a:p>
               <a:pPr algn="ctr"/>
-              <a:endParaRPr lang="de-CH"/>
+              <a:endParaRPr lang="de-CH" sz="1818"/>
             </a:p>
           </p:txBody>
         </p:sp>
@@ -4912,16 +4895,16 @@
             <a:lstStyle/>
             <a:p>
               <a:r>
-                <a:rPr lang="en-GB" b="1" dirty="0"/>
+                <a:rPr lang="en-GB" sz="1818" b="1" dirty="0"/>
                 <a:t>Phase 2</a:t>
               </a:r>
-              <a:endParaRPr lang="de-CH" b="1" dirty="0"/>
+              <a:endParaRPr lang="de-CH" sz="1818" b="1" dirty="0"/>
             </a:p>
           </p:txBody>
         </p:sp>
       </p:grpSp>
-      <mc:AlternateContent xmlns:mc="http://schemas.openxmlformats.org/markup-compatibility/2006" xmlns:a14="http://schemas.microsoft.com/office/drawing/2010/main">
-        <mc:Choice Requires="a14">
+      <mc:AlternateContent xmlns:mc="http://schemas.openxmlformats.org/markup-compatibility/2006">
+        <mc:Choice xmlns:a14="http://schemas.microsoft.com/office/drawing/2010/main" Requires="a14">
           <p:sp>
             <p:nvSpPr>
               <p:cNvPr id="31" name="TextBox 30">
@@ -4936,8 +4919,8 @@
             </p:nvSpPr>
             <p:spPr>
               <a:xfrm>
-                <a:off x="2957862" y="2882843"/>
-                <a:ext cx="2895536" cy="529697"/>
+                <a:off x="3130802" y="2866844"/>
+                <a:ext cx="2954754" cy="540507"/>
               </a:xfrm>
               <a:prstGeom prst="rect">
                 <a:avLst/>
@@ -4958,7 +4941,7 @@
                     </m:oMathParaPr>
                     <m:oMath xmlns:m="http://schemas.openxmlformats.org/officeDocument/2006/math">
                       <m:r>
-                        <a:rPr lang="en-GB" i="1" smtClean="0">
+                        <a:rPr lang="en-GB" sz="1818" i="1">
                           <a:solidFill>
                             <a:srgbClr val="339933"/>
                           </a:solidFill>
@@ -4967,7 +4950,7 @@
                         <m:t>𝑓</m:t>
                       </m:r>
                       <m:r>
-                        <a:rPr lang="en-GB" i="1" baseline="-25000">
+                        <a:rPr lang="en-GB" sz="1818" i="1" baseline="-25000">
                           <a:solidFill>
                             <a:srgbClr val="339933"/>
                           </a:solidFill>
@@ -4976,7 +4959,7 @@
                         <m:t>2</m:t>
                       </m:r>
                       <m:r>
-                        <a:rPr lang="en-GB" i="1">
+                        <a:rPr lang="en-GB" sz="1818" i="1">
                           <a:solidFill>
                             <a:srgbClr val="339933"/>
                           </a:solidFill>
@@ -4985,7 +4968,7 @@
                         <m:t>(</m:t>
                       </m:r>
                       <m:r>
-                        <a:rPr lang="de-CH" b="0" i="1" smtClean="0">
+                        <a:rPr lang="de-CH" sz="1818" i="1">
                           <a:solidFill>
                             <a:srgbClr val="339933"/>
                           </a:solidFill>
@@ -4994,7 +4977,7 @@
                         <m:t>𝐺𝐷𝐷</m:t>
                       </m:r>
                       <m:r>
-                        <a:rPr lang="en-GB" i="1">
+                        <a:rPr lang="en-GB" sz="1818" i="1">
                           <a:solidFill>
                             <a:srgbClr val="339933"/>
                           </a:solidFill>
@@ -5003,7 +4986,7 @@
                         <m:t>)</m:t>
                       </m:r>
                       <m:r>
-                        <a:rPr lang="en-US" i="1">
+                        <a:rPr lang="en-US" sz="1818" i="1">
                           <a:solidFill>
                             <a:srgbClr val="339933"/>
                           </a:solidFill>
@@ -5014,7 +4997,7 @@
                       <m:f>
                         <m:fPr>
                           <m:ctrlPr>
-                            <a:rPr lang="en-US" i="1">
+                            <a:rPr lang="en-US" sz="1818" i="1">
                               <a:solidFill>
                                 <a:srgbClr val="339933"/>
                               </a:solidFill>
@@ -5024,7 +5007,7 @@
                         </m:fPr>
                         <m:num>
                           <m:r>
-                            <a:rPr lang="en-GB" i="1">
+                            <a:rPr lang="en-GB" sz="1818" i="1">
                               <a:solidFill>
                                 <a:srgbClr val="339933"/>
                               </a:solidFill>
@@ -5035,7 +5018,7 @@
                         </m:num>
                         <m:den>
                           <m:r>
-                            <a:rPr lang="en-GB" i="1">
+                            <a:rPr lang="en-GB" sz="1818" i="1">
                               <a:solidFill>
                                 <a:srgbClr val="339933"/>
                               </a:solidFill>
@@ -5046,7 +5029,7 @@
                           <m:sSup>
                             <m:sSupPr>
                               <m:ctrlPr>
-                                <a:rPr lang="en-GB" i="1">
+                                <a:rPr lang="en-GB" sz="1818" i="1">
                                   <a:solidFill>
                                     <a:srgbClr val="339933"/>
                                   </a:solidFill>
@@ -5056,7 +5039,7 @@
                             </m:sSupPr>
                             <m:e>
                               <m:r>
-                                <a:rPr lang="en-GB" i="1">
+                                <a:rPr lang="en-GB" sz="1818" i="1">
                                   <a:solidFill>
                                     <a:srgbClr val="339933"/>
                                   </a:solidFill>
@@ -5067,7 +5050,7 @@
                             </m:e>
                             <m:sup>
                               <m:r>
-                                <a:rPr lang="en-GB" i="1">
+                                <a:rPr lang="en-GB" sz="1818" i="1">
                                   <a:solidFill>
                                     <a:srgbClr val="339933"/>
                                   </a:solidFill>
@@ -5078,7 +5061,7 @@
                               <m:sSub>
                                 <m:sSubPr>
                                   <m:ctrlPr>
-                                    <a:rPr lang="en-GB" i="1">
+                                    <a:rPr lang="en-GB" sz="1818" i="1">
                                       <a:solidFill>
                                         <a:srgbClr val="339933"/>
                                       </a:solidFill>
@@ -5088,7 +5071,7 @@
                                 </m:sSubPr>
                                 <m:e>
                                   <m:r>
-                                    <a:rPr lang="en-GB" i="1">
+                                    <a:rPr lang="en-GB" sz="1818" i="1">
                                       <a:solidFill>
                                         <a:srgbClr val="339933"/>
                                       </a:solidFill>
@@ -5099,7 +5082,7 @@
                                 </m:e>
                                 <m:sub>
                                   <m:r>
-                                    <a:rPr lang="en-GB" i="1">
+                                    <a:rPr lang="en-GB" sz="1818" i="1">
                                       <a:solidFill>
                                         <a:srgbClr val="339933"/>
                                       </a:solidFill>
@@ -5110,7 +5093,7 @@
                                 </m:sub>
                               </m:sSub>
                               <m:r>
-                                <a:rPr lang="en-GB" i="1">
+                                <a:rPr lang="en-GB" sz="1818" i="1">
                                   <a:solidFill>
                                     <a:srgbClr val="339933"/>
                                   </a:solidFill>
@@ -5122,7 +5105,7 @@
                                 <m:rPr>
                                   <m:sty m:val="p"/>
                                 </m:rPr>
-                                <a:rPr lang="de-DE" altLang="zh-CN" i="1">
+                                <a:rPr lang="de-DE" altLang="zh-CN" sz="1818" i="1">
                                   <a:solidFill>
                                     <a:srgbClr val="339933"/>
                                   </a:solidFill>
@@ -5131,7 +5114,7 @@
                                 <m:t>GDD</m:t>
                               </m:r>
                               <m:r>
-                                <a:rPr lang="en-GB" i="1">
+                                <a:rPr lang="en-GB" sz="1818" i="1">
                                   <a:solidFill>
                                     <a:srgbClr val="339933"/>
                                   </a:solidFill>
@@ -5142,7 +5125,7 @@
                               <m:sSub>
                                 <m:sSubPr>
                                   <m:ctrlPr>
-                                    <a:rPr lang="en-GB" i="1">
+                                    <a:rPr lang="en-GB" sz="1818" i="1">
                                       <a:solidFill>
                                         <a:srgbClr val="339933"/>
                                       </a:solidFill>
@@ -5152,7 +5135,7 @@
                                 </m:sSubPr>
                                 <m:e>
                                   <m:r>
-                                    <a:rPr lang="en-GB" i="1">
+                                    <a:rPr lang="en-GB" sz="1818" i="1">
                                       <a:solidFill>
                                         <a:srgbClr val="339933"/>
                                       </a:solidFill>
@@ -5163,7 +5146,7 @@
                                 </m:e>
                                 <m:sub>
                                   <m:r>
-                                    <a:rPr lang="en-GB" i="1">
+                                    <a:rPr lang="en-GB" sz="1818" i="1">
                                       <a:solidFill>
                                         <a:srgbClr val="339933"/>
                                       </a:solidFill>
@@ -5174,7 +5157,7 @@
                                 </m:sub>
                               </m:sSub>
                               <m:r>
-                                <a:rPr lang="en-GB" i="1">
+                                <a:rPr lang="en-GB" sz="1818" i="1">
                                   <a:solidFill>
                                     <a:srgbClr val="339933"/>
                                   </a:solidFill>
@@ -5189,12 +5172,12 @@
                     </m:oMath>
                   </m:oMathPara>
                 </a14:m>
-                <a:endParaRPr lang="de-CH" dirty="0"/>
+                <a:endParaRPr lang="de-CH" sz="1818" dirty="0"/>
               </a:p>
             </p:txBody>
           </p:sp>
         </mc:Choice>
-        <mc:Fallback xmlns="">
+        <mc:Fallback>
           <p:sp>
             <p:nvSpPr>
               <p:cNvPr id="31" name="TextBox 30">
@@ -5211,8 +5194,8 @@
             </p:nvSpPr>
             <p:spPr>
               <a:xfrm>
-                <a:off x="2957862" y="2882843"/>
-                <a:ext cx="2895536" cy="529697"/>
+                <a:off x="3130802" y="2866844"/>
+                <a:ext cx="2954754" cy="540507"/>
               </a:xfrm>
               <a:prstGeom prst="rect">
                 <a:avLst/>
@@ -5255,8 +5238,8 @@
             </p:nvSpPr>
             <p:spPr>
               <a:xfrm>
-                <a:off x="2718083" y="4788582"/>
-                <a:ext cx="2902974" cy="529697"/>
+                <a:off x="2888651" y="4791442"/>
+                <a:ext cx="3030193" cy="540507"/>
               </a:xfrm>
               <a:prstGeom prst="rect">
                 <a:avLst/>
@@ -5277,7 +5260,7 @@
                     </m:oMathParaPr>
                     <m:oMath xmlns:m="http://schemas.openxmlformats.org/officeDocument/2006/math">
                       <m:r>
-                        <a:rPr lang="en-GB" i="1">
+                        <a:rPr lang="en-GB" sz="1818" i="1">
                           <a:solidFill>
                             <a:srgbClr val="FF0000"/>
                           </a:solidFill>
@@ -5286,7 +5269,7 @@
                         <m:t>𝑓</m:t>
                       </m:r>
                       <m:r>
-                        <a:rPr lang="en-GB" i="1" baseline="-25000">
+                        <a:rPr lang="en-GB" sz="1818" i="1" baseline="-25000">
                           <a:solidFill>
                             <a:srgbClr val="FF0000"/>
                           </a:solidFill>
@@ -5295,7 +5278,7 @@
                         <m:t>1</m:t>
                       </m:r>
                       <m:r>
-                        <a:rPr lang="en-GB" i="1">
+                        <a:rPr lang="en-GB" sz="1818" i="1">
                           <a:solidFill>
                             <a:srgbClr val="FF0000"/>
                           </a:solidFill>
@@ -5304,25 +5287,25 @@
                         <m:t>(</m:t>
                       </m:r>
                       <m:r>
-                        <a:rPr lang="en-GB" i="1">
+                        <a:rPr lang="en-GB" sz="1818" i="1">
                           <a:solidFill>
                             <a:srgbClr val="FF0000"/>
                           </a:solidFill>
                           <a:latin typeface="Cambria Math" panose="02040503050406030204" pitchFamily="18" charset="0"/>
                         </a:rPr>
-                        <m:t>𝑇𝑚</m:t>
+                        <m:t>𝑇𝑚𝑖</m:t>
                       </m:r>
                       <m:r>
-                        <a:rPr lang="en-GB" i="1" baseline="-25000">
+                        <a:rPr lang="en-GB" sz="1818" i="1" baseline="-25000">
                           <a:solidFill>
                             <a:srgbClr val="FF0000"/>
                           </a:solidFill>
                           <a:latin typeface="Cambria Math" panose="02040503050406030204" pitchFamily="18" charset="0"/>
                         </a:rPr>
-                        <m:t>𝑖𝑛</m:t>
+                        <m:t>𝑛</m:t>
                       </m:r>
                       <m:r>
-                        <a:rPr lang="en-GB" i="1">
+                        <a:rPr lang="en-GB" sz="1818" i="1">
                           <a:solidFill>
                             <a:srgbClr val="FF0000"/>
                           </a:solidFill>
@@ -5331,7 +5314,7 @@
                         <m:t>)</m:t>
                       </m:r>
                       <m:r>
-                        <a:rPr lang="en-US" i="1">
+                        <a:rPr lang="en-US" sz="1818" i="1">
                           <a:solidFill>
                             <a:srgbClr val="FF0000"/>
                           </a:solidFill>
@@ -5342,7 +5325,7 @@
                       <m:f>
                         <m:fPr>
                           <m:ctrlPr>
-                            <a:rPr lang="en-US" i="1">
+                            <a:rPr lang="en-US" sz="1818" i="1">
                               <a:solidFill>
                                 <a:srgbClr val="FF0000"/>
                               </a:solidFill>
@@ -5352,7 +5335,7 @@
                         </m:fPr>
                         <m:num>
                           <m:r>
-                            <a:rPr lang="en-GB" i="1">
+                            <a:rPr lang="en-GB" sz="1818" i="1">
                               <a:solidFill>
                                 <a:srgbClr val="FF0000"/>
                               </a:solidFill>
@@ -5363,7 +5346,7 @@
                         </m:num>
                         <m:den>
                           <m:r>
-                            <a:rPr lang="en-GB" i="1">
+                            <a:rPr lang="en-GB" sz="1818" i="1">
                               <a:solidFill>
                                 <a:srgbClr val="FF0000"/>
                               </a:solidFill>
@@ -5374,7 +5357,7 @@
                           <m:sSup>
                             <m:sSupPr>
                               <m:ctrlPr>
-                                <a:rPr lang="en-GB" i="1">
+                                <a:rPr lang="en-GB" sz="1818" i="1">
                                   <a:solidFill>
                                     <a:srgbClr val="FF0000"/>
                                   </a:solidFill>
@@ -5384,7 +5367,7 @@
                             </m:sSupPr>
                             <m:e>
                               <m:r>
-                                <a:rPr lang="en-GB" i="1">
+                                <a:rPr lang="en-GB" sz="1818" i="1">
                                   <a:solidFill>
                                     <a:srgbClr val="FF0000"/>
                                   </a:solidFill>
@@ -5395,7 +5378,7 @@
                             </m:e>
                             <m:sup>
                               <m:r>
-                                <a:rPr lang="en-GB" i="1">
+                                <a:rPr lang="en-GB" sz="1818" i="1">
                                   <a:solidFill>
                                     <a:srgbClr val="FF0000"/>
                                   </a:solidFill>
@@ -5406,7 +5389,7 @@
                               <m:sSub>
                                 <m:sSubPr>
                                   <m:ctrlPr>
-                                    <a:rPr lang="en-GB" i="1">
+                                    <a:rPr lang="en-GB" sz="1818" i="1">
                                       <a:solidFill>
                                         <a:srgbClr val="FF0000"/>
                                       </a:solidFill>
@@ -5416,7 +5399,7 @@
                                 </m:sSubPr>
                                 <m:e>
                                   <m:r>
-                                    <a:rPr lang="en-GB" i="1">
+                                    <a:rPr lang="en-GB" sz="1818" i="1">
                                       <a:solidFill>
                                         <a:srgbClr val="FF0000"/>
                                       </a:solidFill>
@@ -5427,7 +5410,7 @@
                                 </m:e>
                                 <m:sub>
                                   <m:r>
-                                    <a:rPr lang="en-GB" i="1">
+                                    <a:rPr lang="en-GB" sz="1818" i="1">
                                       <a:solidFill>
                                         <a:srgbClr val="FF0000"/>
                                       </a:solidFill>
@@ -5438,7 +5421,7 @@
                                 </m:sub>
                               </m:sSub>
                               <m:r>
-                                <a:rPr lang="en-GB" i="1">
+                                <a:rPr lang="en-GB" sz="1818" i="1">
                                   <a:solidFill>
                                     <a:srgbClr val="FF0000"/>
                                   </a:solidFill>
@@ -5449,7 +5432,7 @@
                               <m:sSub>
                                 <m:sSubPr>
                                   <m:ctrlPr>
-                                    <a:rPr lang="en-GB" i="1">
+                                    <a:rPr lang="en-GB" sz="1818" i="1">
                                       <a:solidFill>
                                         <a:srgbClr val="FF0000"/>
                                       </a:solidFill>
@@ -5459,7 +5442,7 @@
                                 </m:sSubPr>
                                 <m:e>
                                   <m:r>
-                                    <a:rPr lang="en-GB" i="1">
+                                    <a:rPr lang="en-GB" sz="1818" i="1">
                                       <a:solidFill>
                                         <a:srgbClr val="FF0000"/>
                                       </a:solidFill>
@@ -5470,7 +5453,7 @@
                                 </m:e>
                                 <m:sub>
                                   <m:r>
-                                    <a:rPr lang="en-GB" i="1">
+                                    <a:rPr lang="en-GB" sz="1818" i="1">
                                       <a:solidFill>
                                         <a:srgbClr val="FF0000"/>
                                       </a:solidFill>
@@ -5481,7 +5464,7 @@
                                 </m:sub>
                               </m:sSub>
                               <m:r>
-                                <a:rPr lang="en-GB" i="1">
+                                <a:rPr lang="en-GB" sz="1818" i="1">
                                   <a:solidFill>
                                     <a:srgbClr val="FF0000"/>
                                   </a:solidFill>
@@ -5492,7 +5475,7 @@
                               <m:sSub>
                                 <m:sSubPr>
                                   <m:ctrlPr>
-                                    <a:rPr lang="en-GB" i="1">
+                                    <a:rPr lang="en-GB" sz="1818" i="1">
                                       <a:solidFill>
                                         <a:srgbClr val="FF0000"/>
                                       </a:solidFill>
@@ -5502,7 +5485,7 @@
                                 </m:sSubPr>
                                 <m:e>
                                   <m:r>
-                                    <a:rPr lang="en-GB" i="1">
+                                    <a:rPr lang="en-GB" sz="1818" i="1">
                                       <a:solidFill>
                                         <a:srgbClr val="FF0000"/>
                                       </a:solidFill>
@@ -5513,7 +5496,7 @@
                                 </m:e>
                                 <m:sub>
                                   <m:r>
-                                    <a:rPr lang="en-GB" i="1">
+                                    <a:rPr lang="en-GB" sz="1818" i="1">
                                       <a:solidFill>
                                         <a:srgbClr val="FF0000"/>
                                       </a:solidFill>
@@ -5524,7 +5507,7 @@
                                 </m:sub>
                               </m:sSub>
                               <m:r>
-                                <a:rPr lang="en-GB" i="1">
+                                <a:rPr lang="en-GB" sz="1818" i="1">
                                   <a:solidFill>
                                     <a:srgbClr val="FF0000"/>
                                   </a:solidFill>
@@ -5539,7 +5522,7 @@
                     </m:oMath>
                   </m:oMathPara>
                 </a14:m>
-                <a:endParaRPr lang="de-CH" dirty="0"/>
+                <a:endParaRPr lang="de-CH" sz="1818" dirty="0"/>
               </a:p>
             </p:txBody>
           </p:sp>
@@ -5561,8 +5544,8 @@
             </p:nvSpPr>
             <p:spPr>
               <a:xfrm>
-                <a:off x="2718083" y="4788582"/>
-                <a:ext cx="2902974" cy="529697"/>
+                <a:off x="2888651" y="4791442"/>
+                <a:ext cx="3030193" cy="540507"/>
               </a:xfrm>
               <a:prstGeom prst="rect">
                 <a:avLst/>
@@ -5605,8 +5588,8 @@
         </p:nvCxnSpPr>
         <p:spPr>
           <a:xfrm flipV="1">
-            <a:off x="8479797" y="1641026"/>
-            <a:ext cx="801997" cy="667096"/>
+            <a:off x="8707382" y="1612738"/>
+            <a:ext cx="809933" cy="673697"/>
           </a:xfrm>
           <a:prstGeom prst="straightConnector1">
             <a:avLst/>
@@ -5647,8 +5630,8 @@
         </p:nvSpPr>
         <p:spPr>
           <a:xfrm>
-            <a:off x="7677800" y="2248702"/>
-            <a:ext cx="1603994" cy="369332"/>
+            <a:off x="7897448" y="2226426"/>
+            <a:ext cx="1619867" cy="372090"/>
           </a:xfrm>
           <a:prstGeom prst="rect">
             <a:avLst/>
@@ -5662,10 +5645,10 @@
           <a:lstStyle/>
           <a:p>
             <a:r>
-              <a:rPr lang="en-GB" b="1" dirty="0"/>
+              <a:rPr lang="en-GB" sz="1818" b="1" dirty="0"/>
               <a:t>peak of season</a:t>
             </a:r>
-            <a:endParaRPr lang="de-CH" b="1" dirty="0"/>
+            <a:endParaRPr lang="de-CH" sz="1818" b="1" dirty="0"/>
           </a:p>
         </p:txBody>
       </p:sp>
@@ -5673,6 +5656,768 @@
     <p:extLst>
       <p:ext uri="{BB962C8B-B14F-4D97-AF65-F5344CB8AC3E}">
         <p14:creationId xmlns:p14="http://schemas.microsoft.com/office/powerpoint/2010/main" val="3674435732"/>
+      </p:ext>
+    </p:extLst>
+  </p:cSld>
+  <p:clrMapOvr>
+    <a:masterClrMapping/>
+  </p:clrMapOvr>
+</p:sld>
+</file>
+
+<file path=ppt/slides/slide3.xml><?xml version="1.0" encoding="utf-8"?>
+<p:sld xmlns:a="http://schemas.openxmlformats.org/drawingml/2006/main" xmlns:r="http://schemas.openxmlformats.org/officeDocument/2006/relationships" xmlns:p="http://schemas.openxmlformats.org/presentationml/2006/main">
+  <p:cSld>
+    <p:spTree>
+      <p:nvGrpSpPr>
+        <p:cNvPr id="1" name=""/>
+        <p:cNvGrpSpPr/>
+        <p:nvPr/>
+      </p:nvGrpSpPr>
+      <p:grpSpPr>
+        <a:xfrm>
+          <a:off x="0" y="0"/>
+          <a:ext cx="0" cy="0"/>
+          <a:chOff x="0" y="0"/>
+          <a:chExt cx="0" cy="0"/>
+        </a:xfrm>
+      </p:grpSpPr>
+      <p:pic>
+        <p:nvPicPr>
+          <p:cNvPr id="5" name="Picture 4">
+            <a:extLst>
+              <a:ext uri="{FF2B5EF4-FFF2-40B4-BE49-F238E27FC236}">
+                <a16:creationId xmlns:a16="http://schemas.microsoft.com/office/drawing/2014/main" id="{9A349AFA-A4F7-4850-BB41-A327B0CFD408}"/>
+              </a:ext>
+            </a:extLst>
+          </p:cNvPr>
+          <p:cNvPicPr>
+            <a:picLocks noChangeAspect="1"/>
+          </p:cNvPicPr>
+          <p:nvPr/>
+        </p:nvPicPr>
+        <p:blipFill>
+          <a:blip r:embed="rId2">
+            <a:extLst>
+              <a:ext uri="{28A0092B-C50C-407E-A947-70E740481C1C}">
+                <a14:useLocalDpi xmlns:a14="http://schemas.microsoft.com/office/drawing/2010/main" val="0"/>
+              </a:ext>
+            </a:extLst>
+          </a:blip>
+          <a:stretch>
+            <a:fillRect/>
+          </a:stretch>
+        </p:blipFill>
+        <p:spPr>
+          <a:xfrm>
+            <a:off x="139774" y="1419659"/>
+            <a:ext cx="12460213" cy="6230108"/>
+          </a:xfrm>
+          <a:prstGeom prst="rect">
+            <a:avLst/>
+          </a:prstGeom>
+        </p:spPr>
+      </p:pic>
+      <mc:AlternateContent xmlns:mc="http://schemas.openxmlformats.org/markup-compatibility/2006">
+        <mc:Choice xmlns:a14="http://schemas.microsoft.com/office/drawing/2010/main" Requires="a14">
+          <p:sp>
+            <p:nvSpPr>
+              <p:cNvPr id="7" name="TextBox 6">
+                <a:extLst>
+                  <a:ext uri="{FF2B5EF4-FFF2-40B4-BE49-F238E27FC236}">
+                    <a16:creationId xmlns:a16="http://schemas.microsoft.com/office/drawing/2014/main" id="{6A0B7257-3753-4583-ACC4-109FF55ABC57}"/>
+                  </a:ext>
+                </a:extLst>
+              </p:cNvPr>
+              <p:cNvSpPr txBox="1"/>
+              <p:nvPr/>
+            </p:nvSpPr>
+            <p:spPr>
+              <a:xfrm>
+                <a:off x="2128049" y="2170581"/>
+                <a:ext cx="2501710" cy="470835"/>
+              </a:xfrm>
+              <a:prstGeom prst="rect">
+                <a:avLst/>
+              </a:prstGeom>
+              <a:noFill/>
+            </p:spPr>
+            <p:txBody>
+              <a:bodyPr wrap="none" lIns="0" tIns="0" rIns="0" bIns="0" rtlCol="0">
+                <a:spAutoFit/>
+              </a:bodyPr>
+              <a:lstStyle/>
+              <a:p>
+                <a:pPr/>
+                <a14:m>
+                  <m:oMathPara xmlns:m="http://schemas.openxmlformats.org/officeDocument/2006/math">
+                    <m:oMathParaPr>
+                      <m:jc m:val="centerGroup"/>
+                    </m:oMathParaPr>
+                    <m:oMath xmlns:m="http://schemas.openxmlformats.org/officeDocument/2006/math">
+                      <m:r>
+                        <a:rPr lang="en-GB" sz="1600" i="1">
+                          <a:solidFill>
+                            <a:srgbClr val="FF0000"/>
+                          </a:solidFill>
+                          <a:latin typeface="Cambria Math" panose="02040503050406030204" pitchFamily="18" charset="0"/>
+                        </a:rPr>
+                        <m:t>𝑓</m:t>
+                      </m:r>
+                      <m:r>
+                        <a:rPr lang="en-GB" sz="1600" i="1" baseline="-25000">
+                          <a:solidFill>
+                            <a:srgbClr val="FF0000"/>
+                          </a:solidFill>
+                          <a:latin typeface="Cambria Math" panose="02040503050406030204" pitchFamily="18" charset="0"/>
+                        </a:rPr>
+                        <m:t>1</m:t>
+                      </m:r>
+                      <m:r>
+                        <a:rPr lang="en-GB" sz="1600" i="1">
+                          <a:solidFill>
+                            <a:srgbClr val="FF0000"/>
+                          </a:solidFill>
+                          <a:latin typeface="Cambria Math" panose="02040503050406030204" pitchFamily="18" charset="0"/>
+                        </a:rPr>
+                        <m:t>(</m:t>
+                      </m:r>
+                      <m:r>
+                        <a:rPr lang="de-CH" sz="1600" i="1">
+                          <a:solidFill>
+                            <a:srgbClr val="FF0000"/>
+                          </a:solidFill>
+                          <a:latin typeface="Cambria Math" panose="02040503050406030204" pitchFamily="18" charset="0"/>
+                        </a:rPr>
+                        <m:t>𝑡</m:t>
+                      </m:r>
+                      <m:r>
+                        <a:rPr lang="en-GB" sz="1600" i="1">
+                          <a:solidFill>
+                            <a:srgbClr val="FF0000"/>
+                          </a:solidFill>
+                          <a:latin typeface="Cambria Math" panose="02040503050406030204" pitchFamily="18" charset="0"/>
+                        </a:rPr>
+                        <m:t>)</m:t>
+                      </m:r>
+                      <m:r>
+                        <a:rPr lang="en-US" sz="1600" i="1">
+                          <a:solidFill>
+                            <a:srgbClr val="FF0000"/>
+                          </a:solidFill>
+                          <a:latin typeface="Cambria Math" panose="02040503050406030204" pitchFamily="18" charset="0"/>
+                        </a:rPr>
+                        <m:t>=</m:t>
+                      </m:r>
+                      <m:f>
+                        <m:fPr>
+                          <m:ctrlPr>
+                            <a:rPr lang="en-US" sz="1600" i="1">
+                              <a:solidFill>
+                                <a:srgbClr val="FF0000"/>
+                              </a:solidFill>
+                              <a:latin typeface="Cambria Math" panose="02040503050406030204" pitchFamily="18" charset="0"/>
+                            </a:rPr>
+                          </m:ctrlPr>
+                        </m:fPr>
+                        <m:num>
+                          <m:r>
+                            <a:rPr lang="en-GB" sz="1600" i="1">
+                              <a:solidFill>
+                                <a:srgbClr val="FF0000"/>
+                              </a:solidFill>
+                              <a:latin typeface="Cambria Math" panose="02040503050406030204" pitchFamily="18" charset="0"/>
+                            </a:rPr>
+                            <m:t>1</m:t>
+                          </m:r>
+                        </m:num>
+                        <m:den>
+                          <m:r>
+                            <a:rPr lang="en-GB" sz="1600" i="1">
+                              <a:solidFill>
+                                <a:srgbClr val="FF0000"/>
+                              </a:solidFill>
+                              <a:latin typeface="Cambria Math" panose="02040503050406030204" pitchFamily="18" charset="0"/>
+                            </a:rPr>
+                            <m:t>1+</m:t>
+                          </m:r>
+                          <m:sSup>
+                            <m:sSupPr>
+                              <m:ctrlPr>
+                                <a:rPr lang="en-GB" sz="1600" i="1">
+                                  <a:solidFill>
+                                    <a:srgbClr val="FF0000"/>
+                                  </a:solidFill>
+                                  <a:latin typeface="Cambria Math" panose="02040503050406030204" pitchFamily="18" charset="0"/>
+                                </a:rPr>
+                              </m:ctrlPr>
+                            </m:sSupPr>
+                            <m:e>
+                              <m:r>
+                                <a:rPr lang="en-GB" sz="1600" i="1">
+                                  <a:solidFill>
+                                    <a:srgbClr val="FF0000"/>
+                                  </a:solidFill>
+                                  <a:latin typeface="Cambria Math" panose="02040503050406030204" pitchFamily="18" charset="0"/>
+                                </a:rPr>
+                                <m:t>𝑒</m:t>
+                              </m:r>
+                            </m:e>
+                            <m:sup>
+                              <m:r>
+                                <a:rPr lang="en-GB" sz="1600" i="1">
+                                  <a:solidFill>
+                                    <a:srgbClr val="FF0000"/>
+                                  </a:solidFill>
+                                  <a:latin typeface="Cambria Math" panose="02040503050406030204" pitchFamily="18" charset="0"/>
+                                </a:rPr>
+                                <m:t>−</m:t>
+                              </m:r>
+                              <m:sSub>
+                                <m:sSubPr>
+                                  <m:ctrlPr>
+                                    <a:rPr lang="en-GB" sz="1600" i="1">
+                                      <a:solidFill>
+                                        <a:srgbClr val="FF0000"/>
+                                      </a:solidFill>
+                                      <a:latin typeface="Cambria Math" panose="02040503050406030204" pitchFamily="18" charset="0"/>
+                                    </a:rPr>
+                                  </m:ctrlPr>
+                                </m:sSubPr>
+                                <m:e>
+                                  <m:r>
+                                    <a:rPr lang="en-GB" sz="1600" i="1">
+                                      <a:solidFill>
+                                        <a:srgbClr val="FF0000"/>
+                                      </a:solidFill>
+                                      <a:latin typeface="Cambria Math" panose="02040503050406030204" pitchFamily="18" charset="0"/>
+                                    </a:rPr>
+                                    <m:t>𝑏</m:t>
+                                  </m:r>
+                                </m:e>
+                                <m:sub>
+                                  <m:r>
+                                    <a:rPr lang="en-GB" sz="1600" i="1">
+                                      <a:solidFill>
+                                        <a:srgbClr val="FF0000"/>
+                                      </a:solidFill>
+                                      <a:latin typeface="Cambria Math" panose="02040503050406030204" pitchFamily="18" charset="0"/>
+                                    </a:rPr>
+                                    <m:t>1</m:t>
+                                  </m:r>
+                                </m:sub>
+                              </m:sSub>
+                              <m:r>
+                                <a:rPr lang="en-GB" sz="1600" i="1">
+                                  <a:solidFill>
+                                    <a:srgbClr val="FF0000"/>
+                                  </a:solidFill>
+                                  <a:latin typeface="Cambria Math" panose="02040503050406030204" pitchFamily="18" charset="0"/>
+                                </a:rPr>
+                                <m:t>(</m:t>
+                              </m:r>
+                              <m:sSub>
+                                <m:sSubPr>
+                                  <m:ctrlPr>
+                                    <a:rPr lang="en-GB" sz="1600" i="1">
+                                      <a:solidFill>
+                                        <a:srgbClr val="FF0000"/>
+                                      </a:solidFill>
+                                      <a:latin typeface="Cambria Math" panose="02040503050406030204" pitchFamily="18" charset="0"/>
+                                    </a:rPr>
+                                  </m:ctrlPr>
+                                </m:sSubPr>
+                                <m:e>
+                                  <m:r>
+                                    <a:rPr lang="en-GB" sz="1600" i="1">
+                                      <a:solidFill>
+                                        <a:srgbClr val="FF0000"/>
+                                      </a:solidFill>
+                                      <a:latin typeface="Cambria Math" panose="02040503050406030204" pitchFamily="18" charset="0"/>
+                                    </a:rPr>
+                                    <m:t>𝑇</m:t>
+                                  </m:r>
+                                </m:e>
+                                <m:sub>
+                                  <m:r>
+                                    <a:rPr lang="en-GB" sz="1600" i="1">
+                                      <a:solidFill>
+                                        <a:srgbClr val="FF0000"/>
+                                      </a:solidFill>
+                                      <a:latin typeface="Cambria Math" panose="02040503050406030204" pitchFamily="18" charset="0"/>
+                                    </a:rPr>
+                                    <m:t>𝑚𝑖𝑛</m:t>
+                                  </m:r>
+                                </m:sub>
+                              </m:sSub>
+                              <m:r>
+                                <a:rPr lang="de-CH" sz="1600" i="1">
+                                  <a:solidFill>
+                                    <a:srgbClr val="FF0000"/>
+                                  </a:solidFill>
+                                  <a:latin typeface="Cambria Math" panose="02040503050406030204" pitchFamily="18" charset="0"/>
+                                </a:rPr>
+                                <m:t>(</m:t>
+                              </m:r>
+                              <m:r>
+                                <a:rPr lang="de-CH" sz="1600" i="1">
+                                  <a:solidFill>
+                                    <a:srgbClr val="FF0000"/>
+                                  </a:solidFill>
+                                  <a:latin typeface="Cambria Math" panose="02040503050406030204" pitchFamily="18" charset="0"/>
+                                </a:rPr>
+                                <m:t>𝑡</m:t>
+                              </m:r>
+                              <m:r>
+                                <a:rPr lang="de-CH" sz="1600" i="1">
+                                  <a:solidFill>
+                                    <a:srgbClr val="FF0000"/>
+                                  </a:solidFill>
+                                  <a:latin typeface="Cambria Math" panose="02040503050406030204" pitchFamily="18" charset="0"/>
+                                </a:rPr>
+                                <m:t>) −</m:t>
+                              </m:r>
+                              <m:sSub>
+                                <m:sSubPr>
+                                  <m:ctrlPr>
+                                    <a:rPr lang="en-GB" sz="1600" i="1">
+                                      <a:solidFill>
+                                        <a:srgbClr val="FF0000"/>
+                                      </a:solidFill>
+                                      <a:latin typeface="Cambria Math" panose="02040503050406030204" pitchFamily="18" charset="0"/>
+                                    </a:rPr>
+                                  </m:ctrlPr>
+                                </m:sSubPr>
+                                <m:e>
+                                  <m:r>
+                                    <a:rPr lang="en-GB" sz="1600" i="1">
+                                      <a:solidFill>
+                                        <a:srgbClr val="FF0000"/>
+                                      </a:solidFill>
+                                      <a:latin typeface="Cambria Math" panose="02040503050406030204" pitchFamily="18" charset="0"/>
+                                    </a:rPr>
+                                    <m:t>𝑎</m:t>
+                                  </m:r>
+                                </m:e>
+                                <m:sub>
+                                  <m:r>
+                                    <a:rPr lang="en-GB" sz="1600" i="1">
+                                      <a:solidFill>
+                                        <a:srgbClr val="FF0000"/>
+                                      </a:solidFill>
+                                      <a:latin typeface="Cambria Math" panose="02040503050406030204" pitchFamily="18" charset="0"/>
+                                    </a:rPr>
+                                    <m:t>1</m:t>
+                                  </m:r>
+                                </m:sub>
+                              </m:sSub>
+                              <m:r>
+                                <a:rPr lang="en-GB" sz="1600" i="1">
+                                  <a:solidFill>
+                                    <a:srgbClr val="FF0000"/>
+                                  </a:solidFill>
+                                  <a:latin typeface="Cambria Math" panose="02040503050406030204" pitchFamily="18" charset="0"/>
+                                </a:rPr>
+                                <m:t>)</m:t>
+                              </m:r>
+                            </m:sup>
+                          </m:sSup>
+                        </m:den>
+                      </m:f>
+                    </m:oMath>
+                  </m:oMathPara>
+                </a14:m>
+                <a:endParaRPr lang="de-CH" sz="1600" dirty="0"/>
+              </a:p>
+            </p:txBody>
+          </p:sp>
+        </mc:Choice>
+        <mc:Fallback>
+          <p:sp>
+            <p:nvSpPr>
+              <p:cNvPr id="7" name="TextBox 6">
+                <a:extLst>
+                  <a:ext uri="{FF2B5EF4-FFF2-40B4-BE49-F238E27FC236}">
+                    <a16:creationId xmlns:a16="http://schemas.microsoft.com/office/drawing/2014/main" id="{6A0B7257-3753-4583-ACC4-109FF55ABC57}"/>
+                  </a:ext>
+                </a:extLst>
+              </p:cNvPr>
+              <p:cNvSpPr txBox="1">
+                <a:spLocks noRot="1" noChangeAspect="1" noMove="1" noResize="1" noEditPoints="1" noAdjustHandles="1" noChangeArrowheads="1" noChangeShapeType="1" noTextEdit="1"/>
+              </p:cNvSpPr>
+              <p:nvPr/>
+            </p:nvSpPr>
+            <p:spPr>
+              <a:xfrm>
+                <a:off x="2128049" y="2170581"/>
+                <a:ext cx="2501710" cy="470835"/>
+              </a:xfrm>
+              <a:prstGeom prst="rect">
+                <a:avLst/>
+              </a:prstGeom>
+              <a:blipFill>
+                <a:blip r:embed="rId3"/>
+                <a:stretch>
+                  <a:fillRect/>
+                </a:stretch>
+              </a:blipFill>
+            </p:spPr>
+            <p:txBody>
+              <a:bodyPr/>
+              <a:lstStyle/>
+              <a:p>
+                <a:r>
+                  <a:rPr lang="de-CH">
+                    <a:noFill/>
+                  </a:rPr>
+                  <a:t> </a:t>
+                </a:r>
+              </a:p>
+            </p:txBody>
+          </p:sp>
+        </mc:Fallback>
+      </mc:AlternateContent>
+      <mc:AlternateContent xmlns:mc="http://schemas.openxmlformats.org/markup-compatibility/2006">
+        <mc:Choice xmlns:a14="http://schemas.microsoft.com/office/drawing/2010/main" Requires="a14">
+          <p:sp>
+            <p:nvSpPr>
+              <p:cNvPr id="8" name="TextBox 7">
+                <a:extLst>
+                  <a:ext uri="{FF2B5EF4-FFF2-40B4-BE49-F238E27FC236}">
+                    <a16:creationId xmlns:a16="http://schemas.microsoft.com/office/drawing/2014/main" id="{2BE6DB2C-8882-4EFD-8901-B37FF0F7DB64}"/>
+                  </a:ext>
+                </a:extLst>
+              </p:cNvPr>
+              <p:cNvSpPr txBox="1"/>
+              <p:nvPr/>
+            </p:nvSpPr>
+            <p:spPr>
+              <a:xfrm>
+                <a:off x="8174073" y="2170582"/>
+                <a:ext cx="2770350" cy="470835"/>
+              </a:xfrm>
+              <a:prstGeom prst="rect">
+                <a:avLst/>
+              </a:prstGeom>
+              <a:noFill/>
+            </p:spPr>
+            <p:txBody>
+              <a:bodyPr wrap="square" lIns="0" tIns="0" rIns="0" bIns="0" rtlCol="0">
+                <a:spAutoFit/>
+              </a:bodyPr>
+              <a:lstStyle/>
+              <a:p>
+                <a:pPr/>
+                <a14:m>
+                  <m:oMathPara xmlns:m="http://schemas.openxmlformats.org/officeDocument/2006/math">
+                    <m:oMathParaPr>
+                      <m:jc m:val="centerGroup"/>
+                    </m:oMathParaPr>
+                    <m:oMath xmlns:m="http://schemas.openxmlformats.org/officeDocument/2006/math">
+                      <m:r>
+                        <a:rPr lang="en-GB" sz="1600" i="1">
+                          <a:solidFill>
+                            <a:srgbClr val="339933"/>
+                          </a:solidFill>
+                          <a:latin typeface="Cambria Math" panose="02040503050406030204" pitchFamily="18" charset="0"/>
+                        </a:rPr>
+                        <m:t>𝑓</m:t>
+                      </m:r>
+                      <m:r>
+                        <a:rPr lang="en-GB" sz="1600" i="1" baseline="-25000">
+                          <a:solidFill>
+                            <a:srgbClr val="339933"/>
+                          </a:solidFill>
+                          <a:latin typeface="Cambria Math" panose="02040503050406030204" pitchFamily="18" charset="0"/>
+                        </a:rPr>
+                        <m:t>2</m:t>
+                      </m:r>
+                      <m:r>
+                        <a:rPr lang="en-GB" sz="1600" i="1">
+                          <a:solidFill>
+                            <a:srgbClr val="339933"/>
+                          </a:solidFill>
+                          <a:latin typeface="Cambria Math" panose="02040503050406030204" pitchFamily="18" charset="0"/>
+                        </a:rPr>
+                        <m:t>(</m:t>
+                      </m:r>
+                      <m:r>
+                        <a:rPr lang="de-CH" sz="1600" i="1">
+                          <a:solidFill>
+                            <a:srgbClr val="339933"/>
+                          </a:solidFill>
+                          <a:latin typeface="Cambria Math" panose="02040503050406030204" pitchFamily="18" charset="0"/>
+                        </a:rPr>
+                        <m:t>𝑡</m:t>
+                      </m:r>
+                      <m:r>
+                        <a:rPr lang="en-GB" sz="1600" i="1">
+                          <a:solidFill>
+                            <a:srgbClr val="339933"/>
+                          </a:solidFill>
+                          <a:latin typeface="Cambria Math" panose="02040503050406030204" pitchFamily="18" charset="0"/>
+                        </a:rPr>
+                        <m:t>)</m:t>
+                      </m:r>
+                      <m:r>
+                        <a:rPr lang="en-US" sz="1600" i="1">
+                          <a:solidFill>
+                            <a:srgbClr val="339933"/>
+                          </a:solidFill>
+                          <a:latin typeface="Cambria Math" panose="02040503050406030204" pitchFamily="18" charset="0"/>
+                        </a:rPr>
+                        <m:t>=</m:t>
+                      </m:r>
+                      <m:f>
+                        <m:fPr>
+                          <m:ctrlPr>
+                            <a:rPr lang="en-US" sz="1600" i="1">
+                              <a:solidFill>
+                                <a:srgbClr val="339933"/>
+                              </a:solidFill>
+                              <a:latin typeface="Cambria Math" panose="02040503050406030204" pitchFamily="18" charset="0"/>
+                            </a:rPr>
+                          </m:ctrlPr>
+                        </m:fPr>
+                        <m:num>
+                          <m:r>
+                            <a:rPr lang="en-GB" sz="1600" i="1">
+                              <a:solidFill>
+                                <a:srgbClr val="339933"/>
+                              </a:solidFill>
+                              <a:latin typeface="Cambria Math" panose="02040503050406030204" pitchFamily="18" charset="0"/>
+                            </a:rPr>
+                            <m:t>1</m:t>
+                          </m:r>
+                        </m:num>
+                        <m:den>
+                          <m:r>
+                            <a:rPr lang="en-GB" sz="1600" i="1">
+                              <a:solidFill>
+                                <a:srgbClr val="339933"/>
+                              </a:solidFill>
+                              <a:latin typeface="Cambria Math" panose="02040503050406030204" pitchFamily="18" charset="0"/>
+                            </a:rPr>
+                            <m:t>1+</m:t>
+                          </m:r>
+                          <m:sSup>
+                            <m:sSupPr>
+                              <m:ctrlPr>
+                                <a:rPr lang="en-GB" sz="1600" i="1">
+                                  <a:solidFill>
+                                    <a:srgbClr val="339933"/>
+                                  </a:solidFill>
+                                  <a:latin typeface="Cambria Math" panose="02040503050406030204" pitchFamily="18" charset="0"/>
+                                </a:rPr>
+                              </m:ctrlPr>
+                            </m:sSupPr>
+                            <m:e>
+                              <m:r>
+                                <a:rPr lang="en-GB" sz="1600" i="1">
+                                  <a:solidFill>
+                                    <a:srgbClr val="339933"/>
+                                  </a:solidFill>
+                                  <a:latin typeface="Cambria Math" panose="02040503050406030204" pitchFamily="18" charset="0"/>
+                                </a:rPr>
+                                <m:t>𝑒</m:t>
+                              </m:r>
+                            </m:e>
+                            <m:sup>
+                              <m:r>
+                                <a:rPr lang="en-GB" sz="1600" i="1">
+                                  <a:solidFill>
+                                    <a:srgbClr val="339933"/>
+                                  </a:solidFill>
+                                  <a:latin typeface="Cambria Math" panose="02040503050406030204" pitchFamily="18" charset="0"/>
+                                </a:rPr>
+                                <m:t>−</m:t>
+                              </m:r>
+                              <m:sSub>
+                                <m:sSubPr>
+                                  <m:ctrlPr>
+                                    <a:rPr lang="en-GB" sz="1600" i="1">
+                                      <a:solidFill>
+                                        <a:srgbClr val="339933"/>
+                                      </a:solidFill>
+                                      <a:latin typeface="Cambria Math" panose="02040503050406030204" pitchFamily="18" charset="0"/>
+                                    </a:rPr>
+                                  </m:ctrlPr>
+                                </m:sSubPr>
+                                <m:e>
+                                  <m:r>
+                                    <a:rPr lang="en-GB" sz="1600" i="1">
+                                      <a:solidFill>
+                                        <a:srgbClr val="339933"/>
+                                      </a:solidFill>
+                                      <a:latin typeface="Cambria Math" panose="02040503050406030204" pitchFamily="18" charset="0"/>
+                                    </a:rPr>
+                                    <m:t>𝑏</m:t>
+                                  </m:r>
+                                </m:e>
+                                <m:sub>
+                                  <m:r>
+                                    <a:rPr lang="en-GB" sz="1600" i="1">
+                                      <a:solidFill>
+                                        <a:srgbClr val="339933"/>
+                                      </a:solidFill>
+                                      <a:latin typeface="Cambria Math" panose="02040503050406030204" pitchFamily="18" charset="0"/>
+                                    </a:rPr>
+                                    <m:t>2</m:t>
+                                  </m:r>
+                                </m:sub>
+                              </m:sSub>
+                              <m:r>
+                                <a:rPr lang="en-GB" sz="1600" i="1">
+                                  <a:solidFill>
+                                    <a:srgbClr val="339933"/>
+                                  </a:solidFill>
+                                  <a:latin typeface="Cambria Math" panose="02040503050406030204" pitchFamily="18" charset="0"/>
+                                </a:rPr>
+                                <m:t>(</m:t>
+                              </m:r>
+                              <m:r>
+                                <m:rPr>
+                                  <m:sty m:val="p"/>
+                                </m:rPr>
+                                <a:rPr lang="de-DE" altLang="zh-CN" sz="1600" i="1">
+                                  <a:solidFill>
+                                    <a:srgbClr val="339933"/>
+                                  </a:solidFill>
+                                  <a:latin typeface="Cambria Math" panose="02040503050406030204" pitchFamily="18" charset="0"/>
+                                </a:rPr>
+                                <m:t>GDD</m:t>
+                              </m:r>
+                              <m:r>
+                                <a:rPr lang="de-CH" altLang="zh-CN" sz="1600" i="1">
+                                  <a:solidFill>
+                                    <a:srgbClr val="339933"/>
+                                  </a:solidFill>
+                                  <a:latin typeface="Cambria Math" panose="02040503050406030204" pitchFamily="18" charset="0"/>
+                                </a:rPr>
+                                <m:t>(</m:t>
+                              </m:r>
+                              <m:r>
+                                <a:rPr lang="de-CH" altLang="zh-CN" sz="1600" i="1">
+                                  <a:solidFill>
+                                    <a:srgbClr val="339933"/>
+                                  </a:solidFill>
+                                  <a:latin typeface="Cambria Math" panose="02040503050406030204" pitchFamily="18" charset="0"/>
+                                </a:rPr>
+                                <m:t>𝑡</m:t>
+                              </m:r>
+                              <m:r>
+                                <a:rPr lang="de-CH" altLang="zh-CN" sz="1600" i="1">
+                                  <a:solidFill>
+                                    <a:srgbClr val="339933"/>
+                                  </a:solidFill>
+                                  <a:latin typeface="Cambria Math" panose="02040503050406030204" pitchFamily="18" charset="0"/>
+                                </a:rPr>
+                                <m:t>)−</m:t>
+                              </m:r>
+                              <m:sSub>
+                                <m:sSubPr>
+                                  <m:ctrlPr>
+                                    <a:rPr lang="en-GB" sz="1600" i="1">
+                                      <a:solidFill>
+                                        <a:srgbClr val="339933"/>
+                                      </a:solidFill>
+                                      <a:latin typeface="Cambria Math" panose="02040503050406030204" pitchFamily="18" charset="0"/>
+                                    </a:rPr>
+                                  </m:ctrlPr>
+                                </m:sSubPr>
+                                <m:e>
+                                  <m:r>
+                                    <a:rPr lang="en-GB" sz="1600" i="1">
+                                      <a:solidFill>
+                                        <a:srgbClr val="339933"/>
+                                      </a:solidFill>
+                                      <a:latin typeface="Cambria Math" panose="02040503050406030204" pitchFamily="18" charset="0"/>
+                                    </a:rPr>
+                                    <m:t>𝑎</m:t>
+                                  </m:r>
+                                </m:e>
+                                <m:sub>
+                                  <m:r>
+                                    <a:rPr lang="en-GB" sz="1600" i="1">
+                                      <a:solidFill>
+                                        <a:srgbClr val="339933"/>
+                                      </a:solidFill>
+                                      <a:latin typeface="Cambria Math" panose="02040503050406030204" pitchFamily="18" charset="0"/>
+                                    </a:rPr>
+                                    <m:t>2</m:t>
+                                  </m:r>
+                                </m:sub>
+                              </m:sSub>
+                              <m:r>
+                                <a:rPr lang="en-GB" sz="1600" i="1">
+                                  <a:solidFill>
+                                    <a:srgbClr val="339933"/>
+                                  </a:solidFill>
+                                  <a:latin typeface="Cambria Math" panose="02040503050406030204" pitchFamily="18" charset="0"/>
+                                </a:rPr>
+                                <m:t>)</m:t>
+                              </m:r>
+                            </m:sup>
+                          </m:sSup>
+                        </m:den>
+                      </m:f>
+                    </m:oMath>
+                  </m:oMathPara>
+                </a14:m>
+                <a:endParaRPr lang="de-CH" sz="1600" dirty="0"/>
+              </a:p>
+            </p:txBody>
+          </p:sp>
+        </mc:Choice>
+        <mc:Fallback>
+          <p:sp>
+            <p:nvSpPr>
+              <p:cNvPr id="8" name="TextBox 7">
+                <a:extLst>
+                  <a:ext uri="{FF2B5EF4-FFF2-40B4-BE49-F238E27FC236}">
+                    <a16:creationId xmlns:a16="http://schemas.microsoft.com/office/drawing/2014/main" id="{2BE6DB2C-8882-4EFD-8901-B37FF0F7DB64}"/>
+                  </a:ext>
+                </a:extLst>
+              </p:cNvPr>
+              <p:cNvSpPr txBox="1">
+                <a:spLocks noRot="1" noChangeAspect="1" noMove="1" noResize="1" noEditPoints="1" noAdjustHandles="1" noChangeArrowheads="1" noChangeShapeType="1" noTextEdit="1"/>
+              </p:cNvSpPr>
+              <p:nvPr/>
+            </p:nvSpPr>
+            <p:spPr>
+              <a:xfrm>
+                <a:off x="8174073" y="2170582"/>
+                <a:ext cx="2770350" cy="470835"/>
+              </a:xfrm>
+              <a:prstGeom prst="rect">
+                <a:avLst/>
+              </a:prstGeom>
+              <a:blipFill>
+                <a:blip r:embed="rId4"/>
+                <a:stretch>
+                  <a:fillRect/>
+                </a:stretch>
+              </a:blipFill>
+            </p:spPr>
+            <p:txBody>
+              <a:bodyPr/>
+              <a:lstStyle/>
+              <a:p>
+                <a:r>
+                  <a:rPr lang="de-CH">
+                    <a:noFill/>
+                  </a:rPr>
+                  <a:t> </a:t>
+                </a:r>
+              </a:p>
+            </p:txBody>
+          </p:sp>
+        </mc:Fallback>
+      </mc:AlternateContent>
+    </p:spTree>
+    <p:extLst>
+      <p:ext uri="{BB962C8B-B14F-4D97-AF65-F5344CB8AC3E}">
+        <p14:creationId xmlns:p14="http://schemas.microsoft.com/office/powerpoint/2010/main" val="801173596"/>
       </p:ext>
     </p:extLst>
   </p:cSld>

</xml_diff>